<commit_message>
work on technical understanding
</commit_message>
<xml_diff>
--- a/presentations/A technical understanding of the web.pptx
+++ b/presentations/A technical understanding of the web.pptx
@@ -5,14 +5,21 @@
     <p:sldMasterId id="2147483648" r:id="rId1"/>
   </p:sldMasterIdLst>
   <p:notesMasterIdLst>
-    <p:notesMasterId r:id="rId7"/>
+    <p:notesMasterId r:id="rId14"/>
   </p:notesMasterIdLst>
   <p:sldIdLst>
     <p:sldId id="256" r:id="rId2"/>
     <p:sldId id="259" r:id="rId3"/>
     <p:sldId id="260" r:id="rId4"/>
     <p:sldId id="261" r:id="rId5"/>
-    <p:sldId id="262" r:id="rId6"/>
+    <p:sldId id="263" r:id="rId6"/>
+    <p:sldId id="262" r:id="rId7"/>
+    <p:sldId id="264" r:id="rId8"/>
+    <p:sldId id="265" r:id="rId9"/>
+    <p:sldId id="266" r:id="rId10"/>
+    <p:sldId id="267" r:id="rId11"/>
+    <p:sldId id="268" r:id="rId12"/>
+    <p:sldId id="270" r:id="rId13"/>
   </p:sldIdLst>
   <p:sldSz cx="9144000" cy="6858000" type="screen4x3"/>
   <p:notesSz cx="6858000" cy="9144000"/>
@@ -197,7 +204,7 @@
             <a:fld id="{9FD516BE-303C-4073-A4FC-07E358FC6551}" type="datetimeFigureOut">
               <a:rPr lang="en-US" smtClean="0"/>
               <a:pPr/>
-              <a:t>3/6/2013</a:t>
+              <a:t>3/7/2013</a:t>
             </a:fld>
             <a:endParaRPr lang="en-US"/>
           </a:p>
@@ -552,6 +559,366 @@
 </p:notes>
 </file>
 
+<file path=ppt/notesSlides/notesSlide10.xml><?xml version="1.0" encoding="utf-8"?>
+<p:notes xmlns:a="http://schemas.openxmlformats.org/drawingml/2006/main" xmlns:r="http://schemas.openxmlformats.org/officeDocument/2006/relationships" xmlns:p="http://schemas.openxmlformats.org/presentationml/2006/main">
+  <p:cSld>
+    <p:spTree>
+      <p:nvGrpSpPr>
+        <p:cNvPr id="1" name=""/>
+        <p:cNvGrpSpPr/>
+        <p:nvPr/>
+      </p:nvGrpSpPr>
+      <p:grpSpPr>
+        <a:xfrm>
+          <a:off x="0" y="0"/>
+          <a:ext cx="0" cy="0"/>
+          <a:chOff x="0" y="0"/>
+          <a:chExt cx="0" cy="0"/>
+        </a:xfrm>
+      </p:grpSpPr>
+      <p:sp>
+        <p:nvSpPr>
+          <p:cNvPr id="2" name="Slide Image Placeholder 1"/>
+          <p:cNvSpPr>
+            <a:spLocks noGrp="1" noRot="1" noChangeAspect="1"/>
+          </p:cNvSpPr>
+          <p:nvPr>
+            <p:ph type="sldImg"/>
+          </p:nvPr>
+        </p:nvSpPr>
+        <p:spPr/>
+      </p:sp>
+      <p:sp>
+        <p:nvSpPr>
+          <p:cNvPr id="3" name="Notes Placeholder 2"/>
+          <p:cNvSpPr>
+            <a:spLocks noGrp="1"/>
+          </p:cNvSpPr>
+          <p:nvPr>
+            <p:ph type="body" idx="1"/>
+          </p:nvPr>
+        </p:nvSpPr>
+        <p:spPr/>
+        <p:txBody>
+          <a:bodyPr>
+            <a:normAutofit lnSpcReduction="10000"/>
+          </a:bodyPr>
+          <a:lstStyle/>
+          <a:p>
+            <a:pPr lvl="0"/>
+            <a:r>
+              <a:rPr lang="en-US" baseline="0" dirty="0" smtClean="0"/>
+              <a:t>TCP/IP is the standard  protocol for delivering information over the internet.</a:t>
+            </a:r>
+          </a:p>
+          <a:p>
+            <a:pPr lvl="0"/>
+            <a:endParaRPr lang="en-US" baseline="0" dirty="0" smtClean="0"/>
+          </a:p>
+          <a:p>
+            <a:pPr lvl="0"/>
+            <a:r>
+              <a:rPr lang="en-US" baseline="0" dirty="0" smtClean="0"/>
+              <a:t>IP is responsible for routing between systems and TCP is responsible for delivering data.</a:t>
+            </a:r>
+          </a:p>
+          <a:p>
+            <a:pPr lvl="0"/>
+            <a:endParaRPr lang="en-US" baseline="0" dirty="0" smtClean="0"/>
+          </a:p>
+          <a:p>
+            <a:pPr lvl="0"/>
+            <a:r>
+              <a:rPr lang="en-US" baseline="0" dirty="0" smtClean="0"/>
+              <a:t>You can see from this diagram of a TCP/IP packet, the IP Header has the source and destination address.</a:t>
+            </a:r>
+          </a:p>
+          <a:p>
+            <a:pPr lvl="0"/>
+            <a:r>
+              <a:rPr lang="en-US" baseline="0" dirty="0" smtClean="0"/>
+              <a:t>The IP address that routers use to transport a packet </a:t>
+            </a:r>
+            <a:r>
+              <a:rPr lang="en-US" baseline="0" smtClean="0"/>
+              <a:t>between networks.</a:t>
+            </a:r>
+            <a:endParaRPr lang="en-US" baseline="0" dirty="0" smtClean="0"/>
+          </a:p>
+        </p:txBody>
+      </p:sp>
+      <p:sp>
+        <p:nvSpPr>
+          <p:cNvPr id="4" name="Slide Number Placeholder 3"/>
+          <p:cNvSpPr>
+            <a:spLocks noGrp="1"/>
+          </p:cNvSpPr>
+          <p:nvPr>
+            <p:ph type="sldNum" sz="quarter" idx="10"/>
+          </p:nvPr>
+        </p:nvSpPr>
+        <p:spPr/>
+        <p:txBody>
+          <a:bodyPr/>
+          <a:lstStyle/>
+          <a:p>
+            <a:fld id="{2468E330-6F11-4EB8-9125-0BEE82D16730}" type="slidenum">
+              <a:rPr lang="en-US" smtClean="0"/>
+              <a:pPr/>
+              <a:t>10</a:t>
+            </a:fld>
+            <a:endParaRPr lang="en-US"/>
+          </a:p>
+        </p:txBody>
+      </p:sp>
+    </p:spTree>
+  </p:cSld>
+  <p:clrMapOvr>
+    <a:masterClrMapping/>
+  </p:clrMapOvr>
+</p:notes>
+</file>
+
+<file path=ppt/notesSlides/notesSlide11.xml><?xml version="1.0" encoding="utf-8"?>
+<p:notes xmlns:a="http://schemas.openxmlformats.org/drawingml/2006/main" xmlns:r="http://schemas.openxmlformats.org/officeDocument/2006/relationships" xmlns:p="http://schemas.openxmlformats.org/presentationml/2006/main">
+  <p:cSld>
+    <p:spTree>
+      <p:nvGrpSpPr>
+        <p:cNvPr id="1" name=""/>
+        <p:cNvGrpSpPr/>
+        <p:nvPr/>
+      </p:nvGrpSpPr>
+      <p:grpSpPr>
+        <a:xfrm>
+          <a:off x="0" y="0"/>
+          <a:ext cx="0" cy="0"/>
+          <a:chOff x="0" y="0"/>
+          <a:chExt cx="0" cy="0"/>
+        </a:xfrm>
+      </p:grpSpPr>
+      <p:sp>
+        <p:nvSpPr>
+          <p:cNvPr id="2" name="Slide Image Placeholder 1"/>
+          <p:cNvSpPr>
+            <a:spLocks noGrp="1" noRot="1" noChangeAspect="1"/>
+          </p:cNvSpPr>
+          <p:nvPr>
+            <p:ph type="sldImg"/>
+          </p:nvPr>
+        </p:nvSpPr>
+        <p:spPr/>
+      </p:sp>
+      <p:sp>
+        <p:nvSpPr>
+          <p:cNvPr id="3" name="Notes Placeholder 2"/>
+          <p:cNvSpPr>
+            <a:spLocks noGrp="1"/>
+          </p:cNvSpPr>
+          <p:nvPr>
+            <p:ph type="body" idx="1"/>
+          </p:nvPr>
+        </p:nvSpPr>
+        <p:spPr/>
+        <p:txBody>
+          <a:bodyPr>
+            <a:normAutofit lnSpcReduction="10000"/>
+          </a:bodyPr>
+          <a:lstStyle/>
+          <a:p>
+            <a:pPr lvl="0"/>
+            <a:r>
+              <a:rPr lang="en-US" baseline="0" dirty="0" smtClean="0"/>
+              <a:t>TCP/IP is the standard  protocol for delivering information over the internet.</a:t>
+            </a:r>
+          </a:p>
+          <a:p>
+            <a:pPr lvl="0"/>
+            <a:endParaRPr lang="en-US" baseline="0" dirty="0" smtClean="0"/>
+          </a:p>
+          <a:p>
+            <a:pPr lvl="0"/>
+            <a:r>
+              <a:rPr lang="en-US" baseline="0" dirty="0" smtClean="0"/>
+              <a:t>IP is responsible for routing between systems and TCP is responsible for delivering data.</a:t>
+            </a:r>
+          </a:p>
+          <a:p>
+            <a:pPr lvl="0"/>
+            <a:endParaRPr lang="en-US" baseline="0" dirty="0" smtClean="0"/>
+          </a:p>
+          <a:p>
+            <a:pPr lvl="0"/>
+            <a:r>
+              <a:rPr lang="en-US" baseline="0" dirty="0" smtClean="0"/>
+              <a:t>You can see from this diagram of a TCP/IP packet, the IP Header has the source and destination address.</a:t>
+            </a:r>
+          </a:p>
+          <a:p>
+            <a:pPr lvl="0"/>
+            <a:r>
+              <a:rPr lang="en-US" baseline="0" dirty="0" smtClean="0"/>
+              <a:t>The IP address that routers use to transport a packet </a:t>
+            </a:r>
+            <a:r>
+              <a:rPr lang="en-US" baseline="0" smtClean="0"/>
+              <a:t>between networks.</a:t>
+            </a:r>
+            <a:endParaRPr lang="en-US" baseline="0" dirty="0" smtClean="0"/>
+          </a:p>
+        </p:txBody>
+      </p:sp>
+      <p:sp>
+        <p:nvSpPr>
+          <p:cNvPr id="4" name="Slide Number Placeholder 3"/>
+          <p:cNvSpPr>
+            <a:spLocks noGrp="1"/>
+          </p:cNvSpPr>
+          <p:nvPr>
+            <p:ph type="sldNum" sz="quarter" idx="10"/>
+          </p:nvPr>
+        </p:nvSpPr>
+        <p:spPr/>
+        <p:txBody>
+          <a:bodyPr/>
+          <a:lstStyle/>
+          <a:p>
+            <a:fld id="{2468E330-6F11-4EB8-9125-0BEE82D16730}" type="slidenum">
+              <a:rPr lang="en-US" smtClean="0"/>
+              <a:pPr/>
+              <a:t>11</a:t>
+            </a:fld>
+            <a:endParaRPr lang="en-US"/>
+          </a:p>
+        </p:txBody>
+      </p:sp>
+    </p:spTree>
+  </p:cSld>
+  <p:clrMapOvr>
+    <a:masterClrMapping/>
+  </p:clrMapOvr>
+</p:notes>
+</file>
+
+<file path=ppt/notesSlides/notesSlide12.xml><?xml version="1.0" encoding="utf-8"?>
+<p:notes xmlns:a="http://schemas.openxmlformats.org/drawingml/2006/main" xmlns:r="http://schemas.openxmlformats.org/officeDocument/2006/relationships" xmlns:p="http://schemas.openxmlformats.org/presentationml/2006/main">
+  <p:cSld>
+    <p:spTree>
+      <p:nvGrpSpPr>
+        <p:cNvPr id="1" name=""/>
+        <p:cNvGrpSpPr/>
+        <p:nvPr/>
+      </p:nvGrpSpPr>
+      <p:grpSpPr>
+        <a:xfrm>
+          <a:off x="0" y="0"/>
+          <a:ext cx="0" cy="0"/>
+          <a:chOff x="0" y="0"/>
+          <a:chExt cx="0" cy="0"/>
+        </a:xfrm>
+      </p:grpSpPr>
+      <p:sp>
+        <p:nvSpPr>
+          <p:cNvPr id="2" name="Slide Image Placeholder 1"/>
+          <p:cNvSpPr>
+            <a:spLocks noGrp="1" noRot="1" noChangeAspect="1"/>
+          </p:cNvSpPr>
+          <p:nvPr>
+            <p:ph type="sldImg"/>
+          </p:nvPr>
+        </p:nvSpPr>
+        <p:spPr/>
+      </p:sp>
+      <p:sp>
+        <p:nvSpPr>
+          <p:cNvPr id="3" name="Notes Placeholder 2"/>
+          <p:cNvSpPr>
+            <a:spLocks noGrp="1"/>
+          </p:cNvSpPr>
+          <p:nvPr>
+            <p:ph type="body" idx="1"/>
+          </p:nvPr>
+        </p:nvSpPr>
+        <p:spPr/>
+        <p:txBody>
+          <a:bodyPr>
+            <a:normAutofit lnSpcReduction="10000"/>
+          </a:bodyPr>
+          <a:lstStyle/>
+          <a:p>
+            <a:pPr lvl="0"/>
+            <a:r>
+              <a:rPr lang="en-US" baseline="0" dirty="0" smtClean="0"/>
+              <a:t>TCP/IP is the standard  protocol for delivering information over the internet.</a:t>
+            </a:r>
+          </a:p>
+          <a:p>
+            <a:pPr lvl="0"/>
+            <a:endParaRPr lang="en-US" baseline="0" dirty="0" smtClean="0"/>
+          </a:p>
+          <a:p>
+            <a:pPr lvl="0"/>
+            <a:r>
+              <a:rPr lang="en-US" baseline="0" dirty="0" smtClean="0"/>
+              <a:t>IP is responsible for routing between systems and TCP is responsible for delivering data.</a:t>
+            </a:r>
+          </a:p>
+          <a:p>
+            <a:pPr lvl="0"/>
+            <a:endParaRPr lang="en-US" baseline="0" dirty="0" smtClean="0"/>
+          </a:p>
+          <a:p>
+            <a:pPr lvl="0"/>
+            <a:r>
+              <a:rPr lang="en-US" baseline="0" dirty="0" smtClean="0"/>
+              <a:t>You can see from this diagram of a TCP/IP packet, the IP Header has the source and destination address.</a:t>
+            </a:r>
+          </a:p>
+          <a:p>
+            <a:pPr lvl="0"/>
+            <a:r>
+              <a:rPr lang="en-US" baseline="0" dirty="0" smtClean="0"/>
+              <a:t>The IP address that routers use to transport a packet </a:t>
+            </a:r>
+            <a:r>
+              <a:rPr lang="en-US" baseline="0" smtClean="0"/>
+              <a:t>between networks.</a:t>
+            </a:r>
+            <a:endParaRPr lang="en-US" baseline="0" dirty="0" smtClean="0"/>
+          </a:p>
+        </p:txBody>
+      </p:sp>
+      <p:sp>
+        <p:nvSpPr>
+          <p:cNvPr id="4" name="Slide Number Placeholder 3"/>
+          <p:cNvSpPr>
+            <a:spLocks noGrp="1"/>
+          </p:cNvSpPr>
+          <p:nvPr>
+            <p:ph type="sldNum" sz="quarter" idx="10"/>
+          </p:nvPr>
+        </p:nvSpPr>
+        <p:spPr/>
+        <p:txBody>
+          <a:bodyPr/>
+          <a:lstStyle/>
+          <a:p>
+            <a:fld id="{2468E330-6F11-4EB8-9125-0BEE82D16730}" type="slidenum">
+              <a:rPr lang="en-US" smtClean="0"/>
+              <a:pPr/>
+              <a:t>12</a:t>
+            </a:fld>
+            <a:endParaRPr lang="en-US"/>
+          </a:p>
+        </p:txBody>
+      </p:sp>
+    </p:spTree>
+  </p:cSld>
+  <p:clrMapOvr>
+    <a:masterClrMapping/>
+  </p:clrMapOvr>
+</p:notes>
+</file>
+
 <file path=ppt/notesSlides/notesSlide2.xml><?xml version="1.0" encoding="utf-8"?>
 <p:notes xmlns:a="http://schemas.openxmlformats.org/drawingml/2006/main" xmlns:r="http://schemas.openxmlformats.org/officeDocument/2006/relationships" xmlns:p="http://schemas.openxmlformats.org/presentationml/2006/main">
   <p:cSld>
@@ -606,11 +973,6 @@
               </a:rPr>
               <a:t>This is a note</a:t>
             </a:r>
-            <a:endParaRPr lang="en-US" sz="1400" baseline="0" dirty="0" smtClean="0">
-              <a:solidFill>
-                <a:srgbClr val="FF0000"/>
-              </a:solidFill>
-            </a:endParaRPr>
           </a:p>
         </p:txBody>
       </p:sp>
@@ -738,7 +1100,6 @@
               <a:rPr lang="en-US" baseline="0" dirty="0" smtClean="0"/>
               <a:t>1978 – Spam </a:t>
             </a:r>
-            <a:endParaRPr lang="en-US" baseline="0" dirty="0" smtClean="0"/>
           </a:p>
         </p:txBody>
       </p:sp>
@@ -925,6 +1286,1142 @@
               <a:rPr lang="en-US" smtClean="0"/>
               <a:pPr/>
               <a:t>5</a:t>
+            </a:fld>
+            <a:endParaRPr lang="en-US"/>
+          </a:p>
+        </p:txBody>
+      </p:sp>
+    </p:spTree>
+  </p:cSld>
+  <p:clrMapOvr>
+    <a:masterClrMapping/>
+  </p:clrMapOvr>
+</p:notes>
+</file>
+
+<file path=ppt/notesSlides/notesSlide6.xml><?xml version="1.0" encoding="utf-8"?>
+<p:notes xmlns:a="http://schemas.openxmlformats.org/drawingml/2006/main" xmlns:r="http://schemas.openxmlformats.org/officeDocument/2006/relationships" xmlns:p="http://schemas.openxmlformats.org/presentationml/2006/main">
+  <p:cSld>
+    <p:spTree>
+      <p:nvGrpSpPr>
+        <p:cNvPr id="1" name=""/>
+        <p:cNvGrpSpPr/>
+        <p:nvPr/>
+      </p:nvGrpSpPr>
+      <p:grpSpPr>
+        <a:xfrm>
+          <a:off x="0" y="0"/>
+          <a:ext cx="0" cy="0"/>
+          <a:chOff x="0" y="0"/>
+          <a:chExt cx="0" cy="0"/>
+        </a:xfrm>
+      </p:grpSpPr>
+      <p:sp>
+        <p:nvSpPr>
+          <p:cNvPr id="2" name="Slide Image Placeholder 1"/>
+          <p:cNvSpPr>
+            <a:spLocks noGrp="1" noRot="1" noChangeAspect="1"/>
+          </p:cNvSpPr>
+          <p:nvPr>
+            <p:ph type="sldImg"/>
+          </p:nvPr>
+        </p:nvSpPr>
+        <p:spPr/>
+      </p:sp>
+      <p:sp>
+        <p:nvSpPr>
+          <p:cNvPr id="3" name="Notes Placeholder 2"/>
+          <p:cNvSpPr>
+            <a:spLocks noGrp="1"/>
+          </p:cNvSpPr>
+          <p:nvPr>
+            <p:ph type="body" idx="1"/>
+          </p:nvPr>
+        </p:nvSpPr>
+        <p:spPr/>
+        <p:txBody>
+          <a:bodyPr>
+            <a:normAutofit lnSpcReduction="10000"/>
+          </a:bodyPr>
+          <a:lstStyle/>
+          <a:p>
+            <a:pPr lvl="0"/>
+            <a:r>
+              <a:rPr lang="en-US" sz="1200" kern="1200" dirty="0" smtClean="0">
+                <a:solidFill>
+                  <a:schemeClr val="tx1"/>
+                </a:solidFill>
+                <a:latin typeface="+mn-lt"/>
+                <a:ea typeface="+mn-ea"/>
+                <a:cs typeface="+mn-cs"/>
+              </a:rPr>
+              <a:t>The</a:t>
+            </a:r>
+            <a:r>
+              <a:rPr lang="en-US" sz="1200" kern="1200" baseline="0" dirty="0" smtClean="0">
+                <a:solidFill>
+                  <a:schemeClr val="tx1"/>
+                </a:solidFill>
+                <a:latin typeface="+mn-lt"/>
+                <a:ea typeface="+mn-ea"/>
+                <a:cs typeface="+mn-cs"/>
+              </a:rPr>
+              <a:t> OSI model is a standard that was developed by a committee called </a:t>
+            </a:r>
+          </a:p>
+          <a:p>
+            <a:pPr lvl="0"/>
+            <a:endParaRPr lang="en-US" sz="1200" kern="1200" baseline="0" dirty="0" smtClean="0">
+              <a:solidFill>
+                <a:schemeClr val="tx1"/>
+              </a:solidFill>
+              <a:latin typeface="+mn-lt"/>
+              <a:ea typeface="+mn-ea"/>
+              <a:cs typeface="+mn-cs"/>
+            </a:endParaRPr>
+          </a:p>
+          <a:p>
+            <a:pPr lvl="0"/>
+            <a:r>
+              <a:rPr lang="en-US" sz="1200" kern="1200" baseline="0" dirty="0" smtClean="0">
+                <a:solidFill>
+                  <a:schemeClr val="tx1"/>
+                </a:solidFill>
+                <a:latin typeface="+mn-lt"/>
+                <a:ea typeface="+mn-ea"/>
+                <a:cs typeface="+mn-cs"/>
+              </a:rPr>
+              <a:t>It describes 7 layers of communication over a network, from the hardware to the application.</a:t>
+            </a:r>
+          </a:p>
+          <a:p>
+            <a:pPr lvl="0"/>
+            <a:endParaRPr lang="en-US" sz="1200" kern="1200" baseline="0" dirty="0" smtClean="0">
+              <a:solidFill>
+                <a:schemeClr val="tx1"/>
+              </a:solidFill>
+              <a:latin typeface="+mn-lt"/>
+              <a:ea typeface="+mn-ea"/>
+              <a:cs typeface="+mn-cs"/>
+            </a:endParaRPr>
+          </a:p>
+          <a:p>
+            <a:pPr lvl="0"/>
+            <a:r>
+              <a:rPr lang="en-US" sz="1200" kern="1200" baseline="0" dirty="0" smtClean="0">
+                <a:solidFill>
+                  <a:schemeClr val="tx1"/>
+                </a:solidFill>
+                <a:latin typeface="+mn-lt"/>
+                <a:ea typeface="+mn-ea"/>
+                <a:cs typeface="+mn-cs"/>
+              </a:rPr>
+              <a:t>The physical layer is at the bottom.  It describes the electrical and physical specifications for devices.</a:t>
+            </a:r>
+          </a:p>
+          <a:p>
+            <a:pPr lvl="0"/>
+            <a:r>
+              <a:rPr lang="en-US" sz="1200" kern="1200" baseline="0" dirty="0" smtClean="0">
+                <a:solidFill>
+                  <a:schemeClr val="tx1"/>
+                </a:solidFill>
+                <a:latin typeface="+mn-lt"/>
+                <a:ea typeface="+mn-ea"/>
+                <a:cs typeface="+mn-cs"/>
+              </a:rPr>
+              <a:t>It establishes and terminates a connection</a:t>
+            </a:r>
+          </a:p>
+          <a:p>
+            <a:pPr lvl="0"/>
+            <a:r>
+              <a:rPr lang="en-US" sz="1200" kern="1200" baseline="0" dirty="0" smtClean="0">
+                <a:solidFill>
+                  <a:schemeClr val="tx1"/>
+                </a:solidFill>
+                <a:latin typeface="+mn-lt"/>
+                <a:ea typeface="+mn-ea"/>
+                <a:cs typeface="+mn-cs"/>
+              </a:rPr>
+              <a:t>It handles things like modulation (like AM/FM radios) and conversion from analog to digital (via modem.)</a:t>
+            </a:r>
+          </a:p>
+          <a:p>
+            <a:pPr lvl="0"/>
+            <a:r>
+              <a:rPr lang="en-US" sz="1200" kern="1200" baseline="0" dirty="0" smtClean="0">
+                <a:solidFill>
+                  <a:schemeClr val="tx1"/>
+                </a:solidFill>
+                <a:latin typeface="+mn-lt"/>
+                <a:ea typeface="+mn-ea"/>
+                <a:cs typeface="+mn-cs"/>
+              </a:rPr>
+              <a:t>In Morse code this would be the tapping switch and the receiving buzzer.</a:t>
+            </a:r>
+          </a:p>
+          <a:p>
+            <a:pPr lvl="0"/>
+            <a:endParaRPr lang="en-US" sz="1200" kern="1200" baseline="0" dirty="0" smtClean="0">
+              <a:solidFill>
+                <a:schemeClr val="tx1"/>
+              </a:solidFill>
+              <a:latin typeface="+mn-lt"/>
+              <a:ea typeface="+mn-ea"/>
+              <a:cs typeface="+mn-cs"/>
+            </a:endParaRPr>
+          </a:p>
+          <a:p>
+            <a:pPr lvl="0"/>
+            <a:r>
+              <a:rPr lang="en-US" sz="1200" kern="1200" baseline="0" dirty="0" smtClean="0">
+                <a:solidFill>
+                  <a:schemeClr val="tx1"/>
+                </a:solidFill>
+                <a:latin typeface="+mn-lt"/>
+                <a:ea typeface="+mn-ea"/>
+                <a:cs typeface="+mn-cs"/>
+              </a:rPr>
+              <a:t>The data link layer describes how the process for transferring data between systems on the network.</a:t>
+            </a:r>
+          </a:p>
+          <a:p>
+            <a:pPr lvl="0"/>
+            <a:r>
+              <a:rPr lang="en-US" sz="1200" kern="1200" baseline="0" dirty="0" smtClean="0">
+                <a:solidFill>
+                  <a:schemeClr val="tx1"/>
+                </a:solidFill>
+                <a:latin typeface="+mn-lt"/>
+                <a:ea typeface="+mn-ea"/>
+                <a:cs typeface="+mn-cs"/>
+              </a:rPr>
+              <a:t>In practice, this is usually just used for error correction.</a:t>
+            </a:r>
+          </a:p>
+          <a:p>
+            <a:pPr marL="0" marR="0" lvl="0" indent="0" algn="l" defTabSz="914400" rtl="0" eaLnBrk="1" fontAlgn="auto" latinLnBrk="0" hangingPunct="1">
+              <a:lnSpc>
+                <a:spcPct val="100000"/>
+              </a:lnSpc>
+              <a:spcBef>
+                <a:spcPts val="0"/>
+              </a:spcBef>
+              <a:spcAft>
+                <a:spcPts val="0"/>
+              </a:spcAft>
+              <a:buClrTx/>
+              <a:buSzTx/>
+              <a:buFontTx/>
+              <a:buNone/>
+              <a:tabLst/>
+              <a:defRPr/>
+            </a:pPr>
+            <a:r>
+              <a:rPr lang="en-US" sz="1200" kern="1200" baseline="0" dirty="0" smtClean="0">
+                <a:solidFill>
+                  <a:schemeClr val="tx1"/>
+                </a:solidFill>
+                <a:latin typeface="+mn-lt"/>
+                <a:ea typeface="+mn-ea"/>
+                <a:cs typeface="+mn-cs"/>
+              </a:rPr>
+              <a:t>PPP (Point to Point protocol) is at this layer</a:t>
+            </a:r>
+          </a:p>
+          <a:p>
+            <a:pPr lvl="0"/>
+            <a:r>
+              <a:rPr lang="en-US" sz="1200" kern="1200" baseline="0" dirty="0" smtClean="0">
+                <a:solidFill>
+                  <a:schemeClr val="tx1"/>
+                </a:solidFill>
+                <a:latin typeface="+mn-lt"/>
+                <a:ea typeface="+mn-ea"/>
+                <a:cs typeface="+mn-cs"/>
+              </a:rPr>
+              <a:t>MAC Address broadcast is also at this layer.</a:t>
+            </a:r>
+          </a:p>
+          <a:p>
+            <a:pPr marL="0" marR="0" lvl="0" indent="0" algn="l" defTabSz="914400" rtl="0" eaLnBrk="1" fontAlgn="auto" latinLnBrk="0" hangingPunct="1">
+              <a:lnSpc>
+                <a:spcPct val="100000"/>
+              </a:lnSpc>
+              <a:spcBef>
+                <a:spcPts val="0"/>
+              </a:spcBef>
+              <a:spcAft>
+                <a:spcPts val="0"/>
+              </a:spcAft>
+              <a:buClrTx/>
+              <a:buSzTx/>
+              <a:buFontTx/>
+              <a:buNone/>
+              <a:tabLst/>
+              <a:defRPr/>
+            </a:pPr>
+            <a:r>
+              <a:rPr lang="en-US" sz="1200" kern="1200" baseline="0" dirty="0" smtClean="0">
+                <a:solidFill>
+                  <a:schemeClr val="tx1"/>
+                </a:solidFill>
+                <a:latin typeface="+mn-lt"/>
+                <a:ea typeface="+mn-ea"/>
+                <a:cs typeface="+mn-cs"/>
+              </a:rPr>
+              <a:t>If it were Morse code, this would mean the electrical signals that sends the beeps over the wire</a:t>
+            </a:r>
+          </a:p>
+          <a:p>
+            <a:pPr lvl="0"/>
+            <a:endParaRPr lang="en-US" sz="1200" kern="1200" baseline="0" dirty="0" smtClean="0">
+              <a:solidFill>
+                <a:schemeClr val="tx1"/>
+              </a:solidFill>
+              <a:latin typeface="+mn-lt"/>
+              <a:ea typeface="+mn-ea"/>
+              <a:cs typeface="+mn-cs"/>
+            </a:endParaRPr>
+          </a:p>
+          <a:p>
+            <a:pPr lvl="0"/>
+            <a:r>
+              <a:rPr lang="en-US" sz="1200" kern="1200" baseline="0" dirty="0" smtClean="0">
+                <a:solidFill>
+                  <a:schemeClr val="tx1"/>
+                </a:solidFill>
+                <a:latin typeface="+mn-lt"/>
+                <a:ea typeface="+mn-ea"/>
+                <a:cs typeface="+mn-cs"/>
+              </a:rPr>
+              <a:t>The network layer describes how messages are sent.</a:t>
+            </a:r>
+          </a:p>
+          <a:p>
+            <a:pPr lvl="0"/>
+            <a:r>
+              <a:rPr lang="en-US" sz="1200" kern="1200" baseline="0" dirty="0" smtClean="0">
+                <a:solidFill>
+                  <a:schemeClr val="tx1"/>
+                </a:solidFill>
+                <a:latin typeface="+mn-lt"/>
+                <a:ea typeface="+mn-ea"/>
+                <a:cs typeface="+mn-cs"/>
+              </a:rPr>
+              <a:t>Routers operate at this level.</a:t>
+            </a:r>
+          </a:p>
+          <a:p>
+            <a:pPr lvl="0"/>
+            <a:r>
+              <a:rPr lang="en-US" sz="1200" kern="1200" baseline="0" dirty="0" smtClean="0">
+                <a:solidFill>
+                  <a:schemeClr val="tx1"/>
+                </a:solidFill>
+                <a:latin typeface="+mn-lt"/>
+                <a:ea typeface="+mn-ea"/>
+                <a:cs typeface="+mn-cs"/>
+              </a:rPr>
+              <a:t>In our Morse code example this doesn’t have a direct correlation because Norse code is sent over a single wire (or frequency)</a:t>
+            </a:r>
+          </a:p>
+          <a:p>
+            <a:pPr lvl="0"/>
+            <a:endParaRPr lang="en-US" sz="1200" kern="1200" baseline="0" dirty="0" smtClean="0">
+              <a:solidFill>
+                <a:schemeClr val="tx1"/>
+              </a:solidFill>
+              <a:latin typeface="+mn-lt"/>
+              <a:ea typeface="+mn-ea"/>
+              <a:cs typeface="+mn-cs"/>
+            </a:endParaRPr>
+          </a:p>
+          <a:p>
+            <a:pPr lvl="0"/>
+            <a:r>
+              <a:rPr lang="en-US" sz="1200" kern="1200" baseline="0" dirty="0" smtClean="0">
+                <a:solidFill>
+                  <a:schemeClr val="tx1"/>
+                </a:solidFill>
+                <a:latin typeface="+mn-lt"/>
+                <a:ea typeface="+mn-ea"/>
+                <a:cs typeface="+mn-cs"/>
+              </a:rPr>
+              <a:t>The transport layer describes how packets are sent</a:t>
+            </a:r>
+          </a:p>
+          <a:p>
+            <a:pPr lvl="0"/>
+            <a:r>
+              <a:rPr lang="en-US" sz="1200" kern="1200" baseline="0" dirty="0" smtClean="0">
+                <a:solidFill>
+                  <a:schemeClr val="tx1"/>
+                </a:solidFill>
+                <a:latin typeface="+mn-lt"/>
+                <a:ea typeface="+mn-ea"/>
+                <a:cs typeface="+mn-cs"/>
+              </a:rPr>
+              <a:t>In Morse code this would describe the short and long signals.</a:t>
+            </a:r>
+          </a:p>
+          <a:p>
+            <a:pPr lvl="0"/>
+            <a:r>
+              <a:rPr lang="en-US" sz="1200" kern="1200" baseline="0" dirty="0" smtClean="0">
+                <a:solidFill>
+                  <a:schemeClr val="tx1"/>
+                </a:solidFill>
+                <a:latin typeface="+mn-lt"/>
+                <a:ea typeface="+mn-ea"/>
+                <a:cs typeface="+mn-cs"/>
+              </a:rPr>
+              <a:t>TCP/IP lives at this level.</a:t>
+            </a:r>
+          </a:p>
+          <a:p>
+            <a:pPr lvl="0"/>
+            <a:r>
+              <a:rPr lang="en-US" sz="1200" kern="1200" baseline="0" dirty="0" smtClean="0">
+                <a:solidFill>
+                  <a:schemeClr val="tx1"/>
+                </a:solidFill>
+                <a:latin typeface="+mn-lt"/>
+                <a:ea typeface="+mn-ea"/>
+                <a:cs typeface="+mn-cs"/>
+              </a:rPr>
+              <a:t> </a:t>
+            </a:r>
+            <a:endParaRPr lang="en-US" sz="1200" kern="1200" dirty="0" smtClean="0">
+              <a:solidFill>
+                <a:schemeClr val="tx1"/>
+              </a:solidFill>
+              <a:latin typeface="+mn-lt"/>
+              <a:ea typeface="+mn-ea"/>
+              <a:cs typeface="+mn-cs"/>
+            </a:endParaRPr>
+          </a:p>
+          <a:p>
+            <a:r>
+              <a:rPr lang="en-US" baseline="0" dirty="0" smtClean="0"/>
+              <a:t>The session layer controls the connections between </a:t>
+            </a:r>
+            <a:r>
+              <a:rPr lang="en-US" baseline="0" dirty="0" err="1" smtClean="0"/>
+              <a:t>comptuers</a:t>
+            </a:r>
+            <a:r>
+              <a:rPr lang="en-US" baseline="0" dirty="0" smtClean="0"/>
+              <a:t>.  It establishes, maintains, and terminates the connection.  </a:t>
+            </a:r>
+          </a:p>
+          <a:p>
+            <a:r>
+              <a:rPr lang="en-US" baseline="0" dirty="0" smtClean="0"/>
+              <a:t>The carrier signal and </a:t>
+            </a:r>
+            <a:r>
+              <a:rPr lang="en-US" baseline="0" dirty="0" err="1" smtClean="0"/>
+              <a:t>hangup</a:t>
+            </a:r>
+            <a:r>
+              <a:rPr lang="en-US" baseline="0" dirty="0" smtClean="0"/>
+              <a:t> for a phone are roughly at this layer.</a:t>
+            </a:r>
+            <a:br>
+              <a:rPr lang="en-US" baseline="0" dirty="0" smtClean="0"/>
+            </a:br>
+            <a:r>
+              <a:rPr lang="en-US" baseline="0" dirty="0" smtClean="0"/>
+              <a:t>When you get “the remote connection has terminated” that’s a closed session.</a:t>
+            </a:r>
+          </a:p>
+          <a:p>
+            <a:endParaRPr lang="en-US" baseline="0" dirty="0" smtClean="0"/>
+          </a:p>
+          <a:p>
+            <a:r>
+              <a:rPr lang="en-US" baseline="0" dirty="0" smtClean="0"/>
+              <a:t>The application layer is closest to the user, but it’s not really that close.</a:t>
+            </a:r>
+          </a:p>
+          <a:p>
+            <a:r>
+              <a:rPr lang="en-US" baseline="0" dirty="0" smtClean="0"/>
+              <a:t>This is things like HTTP, FTP, TELNET SMTP protocols.</a:t>
+            </a:r>
+          </a:p>
+        </p:txBody>
+      </p:sp>
+      <p:sp>
+        <p:nvSpPr>
+          <p:cNvPr id="4" name="Slide Number Placeholder 3"/>
+          <p:cNvSpPr>
+            <a:spLocks noGrp="1"/>
+          </p:cNvSpPr>
+          <p:nvPr>
+            <p:ph type="sldNum" sz="quarter" idx="10"/>
+          </p:nvPr>
+        </p:nvSpPr>
+        <p:spPr/>
+        <p:txBody>
+          <a:bodyPr/>
+          <a:lstStyle/>
+          <a:p>
+            <a:fld id="{2468E330-6F11-4EB8-9125-0BEE82D16730}" type="slidenum">
+              <a:rPr lang="en-US" smtClean="0"/>
+              <a:pPr/>
+              <a:t>6</a:t>
+            </a:fld>
+            <a:endParaRPr lang="en-US"/>
+          </a:p>
+        </p:txBody>
+      </p:sp>
+    </p:spTree>
+  </p:cSld>
+  <p:clrMapOvr>
+    <a:masterClrMapping/>
+  </p:clrMapOvr>
+</p:notes>
+</file>
+
+<file path=ppt/notesSlides/notesSlide7.xml><?xml version="1.0" encoding="utf-8"?>
+<p:notes xmlns:a="http://schemas.openxmlformats.org/drawingml/2006/main" xmlns:r="http://schemas.openxmlformats.org/officeDocument/2006/relationships" xmlns:p="http://schemas.openxmlformats.org/presentationml/2006/main">
+  <p:cSld>
+    <p:spTree>
+      <p:nvGrpSpPr>
+        <p:cNvPr id="1" name=""/>
+        <p:cNvGrpSpPr/>
+        <p:nvPr/>
+      </p:nvGrpSpPr>
+      <p:grpSpPr>
+        <a:xfrm>
+          <a:off x="0" y="0"/>
+          <a:ext cx="0" cy="0"/>
+          <a:chOff x="0" y="0"/>
+          <a:chExt cx="0" cy="0"/>
+        </a:xfrm>
+      </p:grpSpPr>
+      <p:sp>
+        <p:nvSpPr>
+          <p:cNvPr id="2" name="Slide Image Placeholder 1"/>
+          <p:cNvSpPr>
+            <a:spLocks noGrp="1" noRot="1" noChangeAspect="1"/>
+          </p:cNvSpPr>
+          <p:nvPr>
+            <p:ph type="sldImg"/>
+          </p:nvPr>
+        </p:nvSpPr>
+        <p:spPr/>
+      </p:sp>
+      <p:sp>
+        <p:nvSpPr>
+          <p:cNvPr id="3" name="Notes Placeholder 2"/>
+          <p:cNvSpPr>
+            <a:spLocks noGrp="1"/>
+          </p:cNvSpPr>
+          <p:nvPr>
+            <p:ph type="body" idx="1"/>
+          </p:nvPr>
+        </p:nvSpPr>
+        <p:spPr/>
+        <p:txBody>
+          <a:bodyPr>
+            <a:normAutofit lnSpcReduction="10000"/>
+          </a:bodyPr>
+          <a:lstStyle/>
+          <a:p>
+            <a:r>
+              <a:rPr lang="en-US" baseline="0" dirty="0" smtClean="0"/>
+              <a:t>But the OSI layer isn’t really practical.  The internet, in practice, uses a much simpler model.</a:t>
+            </a:r>
+          </a:p>
+          <a:p>
+            <a:endParaRPr lang="en-US" baseline="0" dirty="0" smtClean="0"/>
+          </a:p>
+          <a:p>
+            <a:pPr lvl="0"/>
+            <a:r>
+              <a:rPr lang="en-US" sz="1200" kern="1200" dirty="0" smtClean="0">
+                <a:solidFill>
+                  <a:schemeClr val="tx1"/>
+                </a:solidFill>
+                <a:latin typeface="+mn-lt"/>
+                <a:ea typeface="+mn-ea"/>
+                <a:cs typeface="+mn-cs"/>
+              </a:rPr>
+              <a:t>TCP/IP describes</a:t>
+            </a:r>
+            <a:r>
+              <a:rPr lang="en-US" sz="1200" kern="1200" baseline="0" dirty="0" smtClean="0">
+                <a:solidFill>
+                  <a:schemeClr val="tx1"/>
+                </a:solidFill>
+                <a:latin typeface="+mn-lt"/>
+                <a:ea typeface="+mn-ea"/>
+                <a:cs typeface="+mn-cs"/>
+              </a:rPr>
+              <a:t> a simpler model the </a:t>
+            </a:r>
+            <a:r>
+              <a:rPr lang="en-US" sz="1200" kern="1200" baseline="0" dirty="0" err="1" smtClean="0">
+                <a:solidFill>
+                  <a:schemeClr val="tx1"/>
+                </a:solidFill>
+                <a:latin typeface="+mn-lt"/>
+                <a:ea typeface="+mn-ea"/>
+                <a:cs typeface="+mn-cs"/>
+              </a:rPr>
+              <a:t>the</a:t>
+            </a:r>
+            <a:r>
+              <a:rPr lang="en-US" sz="1200" kern="1200" baseline="0" dirty="0" smtClean="0">
+                <a:solidFill>
+                  <a:schemeClr val="tx1"/>
+                </a:solidFill>
+                <a:latin typeface="+mn-lt"/>
+                <a:ea typeface="+mn-ea"/>
+                <a:cs typeface="+mn-cs"/>
+              </a:rPr>
+              <a:t> OSI, which was, after all designed by a committee.</a:t>
+            </a:r>
+          </a:p>
+          <a:p>
+            <a:pPr lvl="0"/>
+            <a:endParaRPr lang="en-US" sz="1200" kern="1200" baseline="0" dirty="0" smtClean="0">
+              <a:solidFill>
+                <a:schemeClr val="tx1"/>
+              </a:solidFill>
+              <a:latin typeface="+mn-lt"/>
+              <a:ea typeface="+mn-ea"/>
+              <a:cs typeface="+mn-cs"/>
+            </a:endParaRPr>
+          </a:p>
+          <a:p>
+            <a:pPr lvl="0"/>
+            <a:r>
+              <a:rPr lang="en-US" sz="1200" kern="1200" baseline="0" dirty="0" smtClean="0">
+                <a:solidFill>
+                  <a:schemeClr val="tx1"/>
+                </a:solidFill>
+                <a:latin typeface="+mn-lt"/>
+                <a:ea typeface="+mn-ea"/>
+                <a:cs typeface="+mn-cs"/>
+              </a:rPr>
+              <a:t>The link layer is for communication on a local network.</a:t>
+            </a:r>
+          </a:p>
+          <a:p>
+            <a:pPr lvl="0"/>
+            <a:r>
+              <a:rPr lang="en-US" sz="1200" kern="1200" baseline="0" dirty="0" smtClean="0">
+                <a:solidFill>
+                  <a:schemeClr val="tx1"/>
+                </a:solidFill>
+                <a:latin typeface="+mn-lt"/>
+                <a:ea typeface="+mn-ea"/>
+                <a:cs typeface="+mn-cs"/>
+              </a:rPr>
+              <a:t>Ethernet lives at this layer .  </a:t>
+            </a:r>
+          </a:p>
+          <a:p>
+            <a:pPr lvl="0"/>
+            <a:endParaRPr lang="en-US" sz="1200" kern="1200" baseline="0" dirty="0" smtClean="0">
+              <a:solidFill>
+                <a:schemeClr val="tx1"/>
+              </a:solidFill>
+              <a:latin typeface="+mn-lt"/>
+              <a:ea typeface="+mn-ea"/>
+              <a:cs typeface="+mn-cs"/>
+            </a:endParaRPr>
+          </a:p>
+          <a:p>
+            <a:pPr lvl="0"/>
+            <a:r>
+              <a:rPr lang="en-US" sz="1200" kern="1200" baseline="0" dirty="0" smtClean="0">
+                <a:solidFill>
+                  <a:schemeClr val="tx1"/>
+                </a:solidFill>
+                <a:latin typeface="+mn-lt"/>
+                <a:ea typeface="+mn-ea"/>
+                <a:cs typeface="+mn-cs"/>
+              </a:rPr>
+              <a:t>The internet layer connects networks creating an internetwork.</a:t>
+            </a:r>
+          </a:p>
+          <a:p>
+            <a:pPr lvl="0"/>
+            <a:r>
+              <a:rPr lang="en-US" sz="1200" kern="1200" baseline="0" dirty="0" smtClean="0">
+                <a:solidFill>
+                  <a:schemeClr val="tx1"/>
+                </a:solidFill>
+                <a:latin typeface="+mn-lt"/>
+                <a:ea typeface="+mn-ea"/>
+                <a:cs typeface="+mn-cs"/>
+              </a:rPr>
+              <a:t>The internet protocol (IP of TCP/IP) lives at this layer.  It handles routing.</a:t>
+            </a:r>
+          </a:p>
+          <a:p>
+            <a:pPr lvl="0"/>
+            <a:endParaRPr lang="en-US" sz="1200" kern="1200" baseline="0" dirty="0" smtClean="0">
+              <a:solidFill>
+                <a:schemeClr val="tx1"/>
+              </a:solidFill>
+              <a:latin typeface="+mn-lt"/>
+              <a:ea typeface="+mn-ea"/>
+              <a:cs typeface="+mn-cs"/>
+            </a:endParaRPr>
+          </a:p>
+          <a:p>
+            <a:pPr lvl="0"/>
+            <a:r>
+              <a:rPr lang="en-US" sz="1200" kern="1200" baseline="0" dirty="0" smtClean="0">
+                <a:solidFill>
+                  <a:schemeClr val="tx1"/>
+                </a:solidFill>
+                <a:latin typeface="+mn-lt"/>
+                <a:ea typeface="+mn-ea"/>
+                <a:cs typeface="+mn-cs"/>
+              </a:rPr>
+              <a:t>The transport layer handles communication between hosts.</a:t>
+            </a:r>
+          </a:p>
+          <a:p>
+            <a:pPr lvl="0"/>
+            <a:r>
+              <a:rPr lang="en-US" sz="1200" kern="1200" baseline="0" dirty="0" smtClean="0">
+                <a:solidFill>
+                  <a:schemeClr val="tx1"/>
+                </a:solidFill>
+                <a:latin typeface="+mn-lt"/>
+                <a:ea typeface="+mn-ea"/>
+                <a:cs typeface="+mn-cs"/>
+              </a:rPr>
+              <a:t>There is no session maintenance.</a:t>
+            </a:r>
+          </a:p>
+          <a:p>
+            <a:pPr lvl="0"/>
+            <a:r>
+              <a:rPr lang="en-US" sz="1200" kern="1200" baseline="0" dirty="0" smtClean="0">
+                <a:solidFill>
+                  <a:schemeClr val="tx1"/>
+                </a:solidFill>
+                <a:latin typeface="+mn-lt"/>
+                <a:ea typeface="+mn-ea"/>
+                <a:cs typeface="+mn-cs"/>
+              </a:rPr>
+              <a:t>TCP (or UDP) packets are formed and received.</a:t>
+            </a:r>
+          </a:p>
+          <a:p>
+            <a:pPr lvl="0"/>
+            <a:r>
+              <a:rPr lang="en-US" sz="1200" kern="1200" baseline="0" dirty="0" smtClean="0">
+                <a:solidFill>
+                  <a:schemeClr val="tx1"/>
+                </a:solidFill>
+                <a:latin typeface="+mn-lt"/>
+                <a:ea typeface="+mn-ea"/>
+                <a:cs typeface="+mn-cs"/>
+              </a:rPr>
+              <a:t>Error correction is build into the protocol (or left out, as in UDP which is less concerned if some packets are lost , for example, when streaming)</a:t>
+            </a:r>
+          </a:p>
+          <a:p>
+            <a:pPr lvl="0"/>
+            <a:endParaRPr lang="en-US" sz="1200" kern="1200" baseline="0" dirty="0" smtClean="0">
+              <a:solidFill>
+                <a:schemeClr val="tx1"/>
+              </a:solidFill>
+              <a:latin typeface="+mn-lt"/>
+              <a:ea typeface="+mn-ea"/>
+              <a:cs typeface="+mn-cs"/>
+            </a:endParaRPr>
+          </a:p>
+          <a:p>
+            <a:pPr lvl="0"/>
+            <a:r>
+              <a:rPr lang="en-US" sz="1200" kern="1200" baseline="0" dirty="0" err="1" smtClean="0">
+                <a:solidFill>
+                  <a:schemeClr val="tx1"/>
+                </a:solidFill>
+                <a:latin typeface="+mn-lt"/>
+                <a:ea typeface="+mn-ea"/>
+                <a:cs typeface="+mn-cs"/>
+              </a:rPr>
+              <a:t>Transmision</a:t>
+            </a:r>
+            <a:r>
+              <a:rPr lang="en-US" sz="1200" kern="1200" baseline="0" dirty="0" smtClean="0">
+                <a:solidFill>
+                  <a:schemeClr val="tx1"/>
+                </a:solidFill>
+                <a:latin typeface="+mn-lt"/>
+                <a:ea typeface="+mn-ea"/>
+                <a:cs typeface="+mn-cs"/>
+              </a:rPr>
+              <a:t> Control Protocol</a:t>
+            </a:r>
+          </a:p>
+          <a:p>
+            <a:pPr lvl="0"/>
+            <a:r>
+              <a:rPr lang="en-US" sz="1200" kern="1200" baseline="0" dirty="0" smtClean="0">
+                <a:solidFill>
+                  <a:schemeClr val="tx1"/>
+                </a:solidFill>
+                <a:latin typeface="+mn-lt"/>
+                <a:ea typeface="+mn-ea"/>
+                <a:cs typeface="+mn-cs"/>
+              </a:rPr>
+              <a:t>User Datagram Protocol</a:t>
+            </a:r>
+          </a:p>
+          <a:p>
+            <a:pPr lvl="0"/>
+            <a:endParaRPr lang="en-US" sz="1200" kern="1200" baseline="0" dirty="0" smtClean="0">
+              <a:solidFill>
+                <a:schemeClr val="tx1"/>
+              </a:solidFill>
+              <a:latin typeface="+mn-lt"/>
+              <a:ea typeface="+mn-ea"/>
+              <a:cs typeface="+mn-cs"/>
+            </a:endParaRPr>
+          </a:p>
+          <a:p>
+            <a:pPr lvl="0"/>
+            <a:endParaRPr lang="en-US" sz="1200" kern="1200" baseline="0" dirty="0" smtClean="0">
+              <a:solidFill>
+                <a:schemeClr val="tx1"/>
+              </a:solidFill>
+              <a:latin typeface="+mn-lt"/>
+              <a:ea typeface="+mn-ea"/>
+              <a:cs typeface="+mn-cs"/>
+            </a:endParaRPr>
+          </a:p>
+          <a:p>
+            <a:pPr lvl="0"/>
+            <a:r>
+              <a:rPr lang="en-US" sz="1200" kern="1200" baseline="0" dirty="0" smtClean="0">
+                <a:solidFill>
+                  <a:schemeClr val="tx1"/>
+                </a:solidFill>
+                <a:latin typeface="+mn-lt"/>
+                <a:ea typeface="+mn-ea"/>
+                <a:cs typeface="+mn-cs"/>
+              </a:rPr>
+              <a:t>The physical layer is not described, since TCP/IP  is designed to be  hardware independent.</a:t>
+            </a:r>
+          </a:p>
+          <a:p>
+            <a:pPr lvl="0"/>
+            <a:endParaRPr lang="en-US" sz="1200" kern="1200" baseline="0" dirty="0" smtClean="0">
+              <a:solidFill>
+                <a:schemeClr val="tx1"/>
+              </a:solidFill>
+              <a:latin typeface="+mn-lt"/>
+              <a:ea typeface="+mn-ea"/>
+              <a:cs typeface="+mn-cs"/>
+            </a:endParaRPr>
+          </a:p>
+          <a:p>
+            <a:pPr lvl="0"/>
+            <a:endParaRPr lang="en-US" sz="1200" kern="1200" baseline="0" dirty="0" smtClean="0">
+              <a:solidFill>
+                <a:schemeClr val="tx1"/>
+              </a:solidFill>
+              <a:latin typeface="+mn-lt"/>
+              <a:ea typeface="+mn-ea"/>
+              <a:cs typeface="+mn-cs"/>
+            </a:endParaRPr>
+          </a:p>
+          <a:p>
+            <a:pPr lvl="0"/>
+            <a:endParaRPr lang="en-US" sz="1200" kern="1200" baseline="0" dirty="0" smtClean="0">
+              <a:solidFill>
+                <a:schemeClr val="tx1"/>
+              </a:solidFill>
+              <a:latin typeface="+mn-lt"/>
+              <a:ea typeface="+mn-ea"/>
+              <a:cs typeface="+mn-cs"/>
+            </a:endParaRPr>
+          </a:p>
+          <a:p>
+            <a:pPr lvl="0"/>
+            <a:endParaRPr lang="en-US" sz="1200" kern="1200" baseline="0" dirty="0" smtClean="0">
+              <a:solidFill>
+                <a:schemeClr val="tx1"/>
+              </a:solidFill>
+              <a:latin typeface="+mn-lt"/>
+              <a:ea typeface="+mn-ea"/>
+              <a:cs typeface="+mn-cs"/>
+            </a:endParaRPr>
+          </a:p>
+          <a:p>
+            <a:pPr lvl="0"/>
+            <a:endParaRPr lang="en-US" baseline="0" dirty="0" smtClean="0"/>
+          </a:p>
+        </p:txBody>
+      </p:sp>
+      <p:sp>
+        <p:nvSpPr>
+          <p:cNvPr id="4" name="Slide Number Placeholder 3"/>
+          <p:cNvSpPr>
+            <a:spLocks noGrp="1"/>
+          </p:cNvSpPr>
+          <p:nvPr>
+            <p:ph type="sldNum" sz="quarter" idx="10"/>
+          </p:nvPr>
+        </p:nvSpPr>
+        <p:spPr/>
+        <p:txBody>
+          <a:bodyPr/>
+          <a:lstStyle/>
+          <a:p>
+            <a:fld id="{2468E330-6F11-4EB8-9125-0BEE82D16730}" type="slidenum">
+              <a:rPr lang="en-US" smtClean="0"/>
+              <a:pPr/>
+              <a:t>7</a:t>
+            </a:fld>
+            <a:endParaRPr lang="en-US"/>
+          </a:p>
+        </p:txBody>
+      </p:sp>
+    </p:spTree>
+  </p:cSld>
+  <p:clrMapOvr>
+    <a:masterClrMapping/>
+  </p:clrMapOvr>
+</p:notes>
+</file>
+
+<file path=ppt/notesSlides/notesSlide8.xml><?xml version="1.0" encoding="utf-8"?>
+<p:notes xmlns:a="http://schemas.openxmlformats.org/drawingml/2006/main" xmlns:r="http://schemas.openxmlformats.org/officeDocument/2006/relationships" xmlns:p="http://schemas.openxmlformats.org/presentationml/2006/main">
+  <p:cSld>
+    <p:spTree>
+      <p:nvGrpSpPr>
+        <p:cNvPr id="1" name=""/>
+        <p:cNvGrpSpPr/>
+        <p:nvPr/>
+      </p:nvGrpSpPr>
+      <p:grpSpPr>
+        <a:xfrm>
+          <a:off x="0" y="0"/>
+          <a:ext cx="0" cy="0"/>
+          <a:chOff x="0" y="0"/>
+          <a:chExt cx="0" cy="0"/>
+        </a:xfrm>
+      </p:grpSpPr>
+      <p:sp>
+        <p:nvSpPr>
+          <p:cNvPr id="2" name="Slide Image Placeholder 1"/>
+          <p:cNvSpPr>
+            <a:spLocks noGrp="1" noRot="1" noChangeAspect="1"/>
+          </p:cNvSpPr>
+          <p:nvPr>
+            <p:ph type="sldImg"/>
+          </p:nvPr>
+        </p:nvSpPr>
+        <p:spPr/>
+      </p:sp>
+      <p:sp>
+        <p:nvSpPr>
+          <p:cNvPr id="3" name="Notes Placeholder 2"/>
+          <p:cNvSpPr>
+            <a:spLocks noGrp="1"/>
+          </p:cNvSpPr>
+          <p:nvPr>
+            <p:ph type="body" idx="1"/>
+          </p:nvPr>
+        </p:nvSpPr>
+        <p:spPr/>
+        <p:txBody>
+          <a:bodyPr>
+            <a:normAutofit lnSpcReduction="10000"/>
+          </a:bodyPr>
+          <a:lstStyle/>
+          <a:p>
+            <a:pPr lvl="0"/>
+            <a:r>
+              <a:rPr lang="en-US" baseline="0" dirty="0" smtClean="0"/>
+              <a:t>TCP/IP is the standard  protocol for delivering information over the internet.</a:t>
+            </a:r>
+          </a:p>
+          <a:p>
+            <a:pPr lvl="0"/>
+            <a:endParaRPr lang="en-US" baseline="0" dirty="0" smtClean="0"/>
+          </a:p>
+          <a:p>
+            <a:pPr lvl="0"/>
+            <a:r>
+              <a:rPr lang="en-US" baseline="0" dirty="0" smtClean="0"/>
+              <a:t>IP is responsible for routing between systems and TCP is responsible for delivering data.</a:t>
+            </a:r>
+          </a:p>
+          <a:p>
+            <a:pPr lvl="0"/>
+            <a:endParaRPr lang="en-US" baseline="0" dirty="0" smtClean="0"/>
+          </a:p>
+          <a:p>
+            <a:pPr lvl="0"/>
+            <a:r>
+              <a:rPr lang="en-US" baseline="0" dirty="0" smtClean="0"/>
+              <a:t>You can see from this diagram of a TCP/IP packet, the IP Header has the source and destination address.</a:t>
+            </a:r>
+          </a:p>
+          <a:p>
+            <a:pPr lvl="0"/>
+            <a:r>
+              <a:rPr lang="en-US" baseline="0" dirty="0" smtClean="0"/>
+              <a:t>The IP address that routers use to transport a packet between networks.</a:t>
+            </a:r>
+          </a:p>
+        </p:txBody>
+      </p:sp>
+      <p:sp>
+        <p:nvSpPr>
+          <p:cNvPr id="4" name="Slide Number Placeholder 3"/>
+          <p:cNvSpPr>
+            <a:spLocks noGrp="1"/>
+          </p:cNvSpPr>
+          <p:nvPr>
+            <p:ph type="sldNum" sz="quarter" idx="10"/>
+          </p:nvPr>
+        </p:nvSpPr>
+        <p:spPr/>
+        <p:txBody>
+          <a:bodyPr/>
+          <a:lstStyle/>
+          <a:p>
+            <a:fld id="{2468E330-6F11-4EB8-9125-0BEE82D16730}" type="slidenum">
+              <a:rPr lang="en-US" smtClean="0"/>
+              <a:pPr/>
+              <a:t>8</a:t>
+            </a:fld>
+            <a:endParaRPr lang="en-US"/>
+          </a:p>
+        </p:txBody>
+      </p:sp>
+    </p:spTree>
+  </p:cSld>
+  <p:clrMapOvr>
+    <a:masterClrMapping/>
+  </p:clrMapOvr>
+</p:notes>
+</file>
+
+<file path=ppt/notesSlides/notesSlide9.xml><?xml version="1.0" encoding="utf-8"?>
+<p:notes xmlns:a="http://schemas.openxmlformats.org/drawingml/2006/main" xmlns:r="http://schemas.openxmlformats.org/officeDocument/2006/relationships" xmlns:p="http://schemas.openxmlformats.org/presentationml/2006/main">
+  <p:cSld>
+    <p:spTree>
+      <p:nvGrpSpPr>
+        <p:cNvPr id="1" name=""/>
+        <p:cNvGrpSpPr/>
+        <p:nvPr/>
+      </p:nvGrpSpPr>
+      <p:grpSpPr>
+        <a:xfrm>
+          <a:off x="0" y="0"/>
+          <a:ext cx="0" cy="0"/>
+          <a:chOff x="0" y="0"/>
+          <a:chExt cx="0" cy="0"/>
+        </a:xfrm>
+      </p:grpSpPr>
+      <p:sp>
+        <p:nvSpPr>
+          <p:cNvPr id="2" name="Slide Image Placeholder 1"/>
+          <p:cNvSpPr>
+            <a:spLocks noGrp="1" noRot="1" noChangeAspect="1"/>
+          </p:cNvSpPr>
+          <p:nvPr>
+            <p:ph type="sldImg"/>
+          </p:nvPr>
+        </p:nvSpPr>
+        <p:spPr/>
+      </p:sp>
+      <p:sp>
+        <p:nvSpPr>
+          <p:cNvPr id="3" name="Notes Placeholder 2"/>
+          <p:cNvSpPr>
+            <a:spLocks noGrp="1"/>
+          </p:cNvSpPr>
+          <p:nvPr>
+            <p:ph type="body" idx="1"/>
+          </p:nvPr>
+        </p:nvSpPr>
+        <p:spPr/>
+        <p:txBody>
+          <a:bodyPr>
+            <a:normAutofit lnSpcReduction="10000"/>
+          </a:bodyPr>
+          <a:lstStyle/>
+          <a:p>
+            <a:pPr lvl="0"/>
+            <a:r>
+              <a:rPr lang="en-US" baseline="0" dirty="0" smtClean="0"/>
+              <a:t>TCP/IP is the standard  protocol for delivering information over the internet.</a:t>
+            </a:r>
+          </a:p>
+          <a:p>
+            <a:pPr lvl="0"/>
+            <a:endParaRPr lang="en-US" baseline="0" dirty="0" smtClean="0"/>
+          </a:p>
+          <a:p>
+            <a:pPr lvl="0"/>
+            <a:r>
+              <a:rPr lang="en-US" baseline="0" dirty="0" smtClean="0"/>
+              <a:t>IP is responsible for routing between systems and TCP is responsible for delivering data.</a:t>
+            </a:r>
+          </a:p>
+          <a:p>
+            <a:pPr lvl="0"/>
+            <a:endParaRPr lang="en-US" baseline="0" dirty="0" smtClean="0"/>
+          </a:p>
+          <a:p>
+            <a:pPr lvl="0"/>
+            <a:r>
+              <a:rPr lang="en-US" baseline="0" dirty="0" smtClean="0"/>
+              <a:t>You can see from this diagram of a TCP/IP packet, the IP Header has the source and destination address.</a:t>
+            </a:r>
+          </a:p>
+          <a:p>
+            <a:pPr lvl="0"/>
+            <a:r>
+              <a:rPr lang="en-US" baseline="0" dirty="0" smtClean="0"/>
+              <a:t>The IP address that routers use to transport a packet </a:t>
+            </a:r>
+            <a:r>
+              <a:rPr lang="en-US" baseline="0" smtClean="0"/>
+              <a:t>between networks.</a:t>
+            </a:r>
+            <a:endParaRPr lang="en-US" baseline="0" dirty="0" smtClean="0"/>
+          </a:p>
+        </p:txBody>
+      </p:sp>
+      <p:sp>
+        <p:nvSpPr>
+          <p:cNvPr id="4" name="Slide Number Placeholder 3"/>
+          <p:cNvSpPr>
+            <a:spLocks noGrp="1"/>
+          </p:cNvSpPr>
+          <p:nvPr>
+            <p:ph type="sldNum" sz="quarter" idx="10"/>
+          </p:nvPr>
+        </p:nvSpPr>
+        <p:spPr/>
+        <p:txBody>
+          <a:bodyPr/>
+          <a:lstStyle/>
+          <a:p>
+            <a:fld id="{2468E330-6F11-4EB8-9125-0BEE82D16730}" type="slidenum">
+              <a:rPr lang="en-US" smtClean="0"/>
+              <a:pPr/>
+              <a:t>9</a:t>
             </a:fld>
             <a:endParaRPr lang="en-US"/>
           </a:p>
@@ -1120,7 +2617,7 @@
             <a:fld id="{D6E9E5ED-425F-4E07-BCD6-7E079AD34B1B}" type="datetimeFigureOut">
               <a:rPr lang="en-US" smtClean="0"/>
               <a:pPr/>
-              <a:t>3/6/2013</a:t>
+              <a:t>3/7/2013</a:t>
             </a:fld>
             <a:endParaRPr lang="en-US"/>
           </a:p>
@@ -1287,7 +2784,7 @@
             <a:fld id="{D6E9E5ED-425F-4E07-BCD6-7E079AD34B1B}" type="datetimeFigureOut">
               <a:rPr lang="en-US" smtClean="0"/>
               <a:pPr/>
-              <a:t>3/6/2013</a:t>
+              <a:t>3/7/2013</a:t>
             </a:fld>
             <a:endParaRPr lang="en-US"/>
           </a:p>
@@ -1464,7 +2961,7 @@
             <a:fld id="{D6E9E5ED-425F-4E07-BCD6-7E079AD34B1B}" type="datetimeFigureOut">
               <a:rPr lang="en-US" smtClean="0"/>
               <a:pPr/>
-              <a:t>3/6/2013</a:t>
+              <a:t>3/7/2013</a:t>
             </a:fld>
             <a:endParaRPr lang="en-US"/>
           </a:p>
@@ -1631,7 +3128,7 @@
             <a:fld id="{D6E9E5ED-425F-4E07-BCD6-7E079AD34B1B}" type="datetimeFigureOut">
               <a:rPr lang="en-US" smtClean="0"/>
               <a:pPr/>
-              <a:t>3/6/2013</a:t>
+              <a:t>3/7/2013</a:t>
             </a:fld>
             <a:endParaRPr lang="en-US"/>
           </a:p>
@@ -1874,7 +3371,7 @@
             <a:fld id="{D6E9E5ED-425F-4E07-BCD6-7E079AD34B1B}" type="datetimeFigureOut">
               <a:rPr lang="en-US" smtClean="0"/>
               <a:pPr/>
-              <a:t>3/6/2013</a:t>
+              <a:t>3/7/2013</a:t>
             </a:fld>
             <a:endParaRPr lang="en-US"/>
           </a:p>
@@ -2159,7 +3656,7 @@
             <a:fld id="{D6E9E5ED-425F-4E07-BCD6-7E079AD34B1B}" type="datetimeFigureOut">
               <a:rPr lang="en-US" smtClean="0"/>
               <a:pPr/>
-              <a:t>3/6/2013</a:t>
+              <a:t>3/7/2013</a:t>
             </a:fld>
             <a:endParaRPr lang="en-US"/>
           </a:p>
@@ -2578,7 +4075,7 @@
             <a:fld id="{D6E9E5ED-425F-4E07-BCD6-7E079AD34B1B}" type="datetimeFigureOut">
               <a:rPr lang="en-US" smtClean="0"/>
               <a:pPr/>
-              <a:t>3/6/2013</a:t>
+              <a:t>3/7/2013</a:t>
             </a:fld>
             <a:endParaRPr lang="en-US"/>
           </a:p>
@@ -2693,7 +4190,7 @@
             <a:fld id="{D6E9E5ED-425F-4E07-BCD6-7E079AD34B1B}" type="datetimeFigureOut">
               <a:rPr lang="en-US" smtClean="0"/>
               <a:pPr/>
-              <a:t>3/6/2013</a:t>
+              <a:t>3/7/2013</a:t>
             </a:fld>
             <a:endParaRPr lang="en-US"/>
           </a:p>
@@ -2785,7 +4282,7 @@
             <a:fld id="{D6E9E5ED-425F-4E07-BCD6-7E079AD34B1B}" type="datetimeFigureOut">
               <a:rPr lang="en-US" smtClean="0"/>
               <a:pPr/>
-              <a:t>3/6/2013</a:t>
+              <a:t>3/7/2013</a:t>
             </a:fld>
             <a:endParaRPr lang="en-US"/>
           </a:p>
@@ -3059,7 +4556,7 @@
             <a:fld id="{D6E9E5ED-425F-4E07-BCD6-7E079AD34B1B}" type="datetimeFigureOut">
               <a:rPr lang="en-US" smtClean="0"/>
               <a:pPr/>
-              <a:t>3/6/2013</a:t>
+              <a:t>3/7/2013</a:t>
             </a:fld>
             <a:endParaRPr lang="en-US"/>
           </a:p>
@@ -3309,7 +4806,7 @@
             <a:fld id="{D6E9E5ED-425F-4E07-BCD6-7E079AD34B1B}" type="datetimeFigureOut">
               <a:rPr lang="en-US" smtClean="0"/>
               <a:pPr/>
-              <a:t>3/6/2013</a:t>
+              <a:t>3/7/2013</a:t>
             </a:fld>
             <a:endParaRPr lang="en-US"/>
           </a:p>
@@ -3519,7 +5016,7 @@
             <a:fld id="{D6E9E5ED-425F-4E07-BCD6-7E079AD34B1B}" type="datetimeFigureOut">
               <a:rPr lang="en-US" smtClean="0"/>
               <a:pPr/>
-              <a:t>3/6/2013</a:t>
+              <a:t>3/7/2013</a:t>
             </a:fld>
             <a:endParaRPr lang="en-US"/>
           </a:p>
@@ -4130,6 +5627,836 @@
 </p:sld>
 </file>
 
+<file path=ppt/slides/slide10.xml><?xml version="1.0" encoding="utf-8"?>
+<p:sld xmlns:a="http://schemas.openxmlformats.org/drawingml/2006/main" xmlns:r="http://schemas.openxmlformats.org/officeDocument/2006/relationships" xmlns:p="http://schemas.openxmlformats.org/presentationml/2006/main">
+  <p:cSld>
+    <p:spTree>
+      <p:nvGrpSpPr>
+        <p:cNvPr id="1" name=""/>
+        <p:cNvGrpSpPr/>
+        <p:nvPr/>
+      </p:nvGrpSpPr>
+      <p:grpSpPr>
+        <a:xfrm>
+          <a:off x="0" y="0"/>
+          <a:ext cx="0" cy="0"/>
+          <a:chOff x="0" y="0"/>
+          <a:chExt cx="0" cy="0"/>
+        </a:xfrm>
+      </p:grpSpPr>
+      <p:sp>
+        <p:nvSpPr>
+          <p:cNvPr id="4" name="Rectangle 3"/>
+          <p:cNvSpPr/>
+          <p:nvPr/>
+        </p:nvSpPr>
+        <p:spPr>
+          <a:xfrm>
+            <a:off x="0" y="6096000"/>
+            <a:ext cx="9144000" cy="762000"/>
+          </a:xfrm>
+          <a:prstGeom prst="rect">
+            <a:avLst/>
+          </a:prstGeom>
+          <a:solidFill>
+            <a:schemeClr val="tx1">
+              <a:lumMod val="85000"/>
+              <a:lumOff val="15000"/>
+            </a:schemeClr>
+          </a:solidFill>
+        </p:spPr>
+        <p:style>
+          <a:lnRef idx="2">
+            <a:schemeClr val="accent1">
+              <a:shade val="50000"/>
+            </a:schemeClr>
+          </a:lnRef>
+          <a:fillRef idx="1">
+            <a:schemeClr val="accent1"/>
+          </a:fillRef>
+          <a:effectRef idx="0">
+            <a:schemeClr val="accent1"/>
+          </a:effectRef>
+          <a:fontRef idx="minor">
+            <a:schemeClr val="lt1"/>
+          </a:fontRef>
+        </p:style>
+        <p:txBody>
+          <a:bodyPr rtlCol="0" anchor="ctr"/>
+          <a:lstStyle/>
+          <a:p>
+            <a:pPr algn="ctr"/>
+            <a:endParaRPr lang="en-US"/>
+          </a:p>
+        </p:txBody>
+      </p:sp>
+      <p:pic>
+        <p:nvPicPr>
+          <p:cNvPr id="1027" name="Picture 3"/>
+          <p:cNvPicPr>
+            <a:picLocks noChangeAspect="1" noChangeArrowheads="1"/>
+          </p:cNvPicPr>
+          <p:nvPr/>
+        </p:nvPicPr>
+        <p:blipFill>
+          <a:blip r:embed="rId3" cstate="print"/>
+          <a:srcRect/>
+          <a:stretch>
+            <a:fillRect/>
+          </a:stretch>
+        </p:blipFill>
+        <p:spPr bwMode="auto">
+          <a:xfrm>
+            <a:off x="228600" y="6248400"/>
+            <a:ext cx="1371600" cy="410346"/>
+          </a:xfrm>
+          <a:prstGeom prst="rect">
+            <a:avLst/>
+          </a:prstGeom>
+          <a:noFill/>
+          <a:ln w="9525">
+            <a:noFill/>
+            <a:miter lim="800000"/>
+            <a:headEnd/>
+            <a:tailEnd/>
+          </a:ln>
+          <a:effectLst/>
+        </p:spPr>
+      </p:pic>
+      <p:sp>
+        <p:nvSpPr>
+          <p:cNvPr id="10" name="TextBox 9"/>
+          <p:cNvSpPr txBox="1"/>
+          <p:nvPr/>
+        </p:nvSpPr>
+        <p:spPr>
+          <a:xfrm>
+            <a:off x="2057400" y="6324600"/>
+            <a:ext cx="4419600" cy="369332"/>
+          </a:xfrm>
+          <a:prstGeom prst="rect">
+            <a:avLst/>
+          </a:prstGeom>
+          <a:noFill/>
+        </p:spPr>
+        <p:txBody>
+          <a:bodyPr wrap="square" rtlCol="0">
+            <a:spAutoFit/>
+          </a:bodyPr>
+          <a:lstStyle/>
+          <a:p>
+            <a:r>
+              <a:rPr lang="en-US" dirty="0" smtClean="0">
+                <a:solidFill>
+                  <a:schemeClr val="bg1"/>
+                </a:solidFill>
+                <a:latin typeface="Verdana" pitchFamily="34" charset="0"/>
+                <a:ea typeface="Verdana" pitchFamily="34" charset="0"/>
+                <a:cs typeface="Verdana" pitchFamily="34" charset="0"/>
+              </a:rPr>
+              <a:t>Testing web applications &amp; services</a:t>
+            </a:r>
+            <a:endParaRPr lang="en-US" dirty="0">
+              <a:solidFill>
+                <a:schemeClr val="bg1"/>
+              </a:solidFill>
+              <a:latin typeface="Verdana" pitchFamily="34" charset="0"/>
+              <a:ea typeface="Verdana" pitchFamily="34" charset="0"/>
+              <a:cs typeface="Verdana" pitchFamily="34" charset="0"/>
+            </a:endParaRPr>
+          </a:p>
+        </p:txBody>
+      </p:sp>
+      <p:pic>
+        <p:nvPicPr>
+          <p:cNvPr id="1033" name="Picture 9"/>
+          <p:cNvPicPr>
+            <a:picLocks noChangeAspect="1" noChangeArrowheads="1"/>
+          </p:cNvPicPr>
+          <p:nvPr/>
+        </p:nvPicPr>
+        <p:blipFill>
+          <a:blip r:embed="rId4" cstate="print"/>
+          <a:srcRect/>
+          <a:stretch>
+            <a:fillRect/>
+          </a:stretch>
+        </p:blipFill>
+        <p:spPr bwMode="auto">
+          <a:xfrm>
+            <a:off x="6934202" y="6248400"/>
+            <a:ext cx="1981195" cy="431239"/>
+          </a:xfrm>
+          <a:prstGeom prst="rect">
+            <a:avLst/>
+          </a:prstGeom>
+          <a:noFill/>
+          <a:ln w="9525">
+            <a:noFill/>
+            <a:miter lim="800000"/>
+            <a:headEnd/>
+            <a:tailEnd/>
+          </a:ln>
+          <a:effectLst/>
+        </p:spPr>
+      </p:pic>
+      <p:sp>
+        <p:nvSpPr>
+          <p:cNvPr id="13" name="TextBox 12"/>
+          <p:cNvSpPr txBox="1"/>
+          <p:nvPr/>
+        </p:nvSpPr>
+        <p:spPr>
+          <a:xfrm>
+            <a:off x="7315200" y="0"/>
+            <a:ext cx="1828800" cy="584775"/>
+          </a:xfrm>
+          <a:prstGeom prst="rect">
+            <a:avLst/>
+          </a:prstGeom>
+          <a:solidFill>
+            <a:schemeClr val="bg2">
+              <a:lumMod val="75000"/>
+            </a:schemeClr>
+          </a:solidFill>
+        </p:spPr>
+        <p:txBody>
+          <a:bodyPr wrap="square" rtlCol="0">
+            <a:spAutoFit/>
+          </a:bodyPr>
+          <a:lstStyle/>
+          <a:p>
+            <a:r>
+              <a:rPr lang="en-US" sz="3200" dirty="0" smtClean="0"/>
+              <a:t>Networks</a:t>
+            </a:r>
+            <a:endParaRPr lang="en-US" sz="3200" dirty="0"/>
+          </a:p>
+        </p:txBody>
+      </p:sp>
+      <p:sp>
+        <p:nvSpPr>
+          <p:cNvPr id="8" name="TextBox 7"/>
+          <p:cNvSpPr txBox="1"/>
+          <p:nvPr/>
+        </p:nvSpPr>
+        <p:spPr>
+          <a:xfrm>
+            <a:off x="0" y="990600"/>
+            <a:ext cx="9144000" cy="830997"/>
+          </a:xfrm>
+          <a:prstGeom prst="rect">
+            <a:avLst/>
+          </a:prstGeom>
+          <a:noFill/>
+        </p:spPr>
+        <p:txBody>
+          <a:bodyPr wrap="square" rtlCol="0">
+            <a:spAutoFit/>
+          </a:bodyPr>
+          <a:lstStyle/>
+          <a:p>
+            <a:pPr algn="ctr"/>
+            <a:r>
+              <a:rPr lang="en-US" sz="4800" dirty="0" smtClean="0"/>
+              <a:t>DNS</a:t>
+            </a:r>
+            <a:endParaRPr lang="en-US" sz="4800" dirty="0"/>
+          </a:p>
+        </p:txBody>
+      </p:sp>
+    </p:spTree>
+  </p:cSld>
+  <p:clrMapOvr>
+    <a:masterClrMapping/>
+  </p:clrMapOvr>
+  <p:timing>
+    <p:tnLst>
+      <p:par>
+        <p:cTn id="1" dur="indefinite" restart="never" nodeType="tmRoot"/>
+      </p:par>
+    </p:tnLst>
+  </p:timing>
+</p:sld>
+</file>
+
+<file path=ppt/slides/slide11.xml><?xml version="1.0" encoding="utf-8"?>
+<p:sld xmlns:a="http://schemas.openxmlformats.org/drawingml/2006/main" xmlns:r="http://schemas.openxmlformats.org/officeDocument/2006/relationships" xmlns:p="http://schemas.openxmlformats.org/presentationml/2006/main">
+  <p:cSld>
+    <p:spTree>
+      <p:nvGrpSpPr>
+        <p:cNvPr id="1" name=""/>
+        <p:cNvGrpSpPr/>
+        <p:nvPr/>
+      </p:nvGrpSpPr>
+      <p:grpSpPr>
+        <a:xfrm>
+          <a:off x="0" y="0"/>
+          <a:ext cx="0" cy="0"/>
+          <a:chOff x="0" y="0"/>
+          <a:chExt cx="0" cy="0"/>
+        </a:xfrm>
+      </p:grpSpPr>
+      <p:sp>
+        <p:nvSpPr>
+          <p:cNvPr id="4" name="Rectangle 3"/>
+          <p:cNvSpPr/>
+          <p:nvPr/>
+        </p:nvSpPr>
+        <p:spPr>
+          <a:xfrm>
+            <a:off x="0" y="6096000"/>
+            <a:ext cx="9144000" cy="762000"/>
+          </a:xfrm>
+          <a:prstGeom prst="rect">
+            <a:avLst/>
+          </a:prstGeom>
+          <a:solidFill>
+            <a:schemeClr val="tx1">
+              <a:lumMod val="85000"/>
+              <a:lumOff val="15000"/>
+            </a:schemeClr>
+          </a:solidFill>
+        </p:spPr>
+        <p:style>
+          <a:lnRef idx="2">
+            <a:schemeClr val="accent1">
+              <a:shade val="50000"/>
+            </a:schemeClr>
+          </a:lnRef>
+          <a:fillRef idx="1">
+            <a:schemeClr val="accent1"/>
+          </a:fillRef>
+          <a:effectRef idx="0">
+            <a:schemeClr val="accent1"/>
+          </a:effectRef>
+          <a:fontRef idx="minor">
+            <a:schemeClr val="lt1"/>
+          </a:fontRef>
+        </p:style>
+        <p:txBody>
+          <a:bodyPr rtlCol="0" anchor="ctr"/>
+          <a:lstStyle/>
+          <a:p>
+            <a:pPr algn="ctr"/>
+            <a:endParaRPr lang="en-US"/>
+          </a:p>
+        </p:txBody>
+      </p:sp>
+      <p:pic>
+        <p:nvPicPr>
+          <p:cNvPr id="1027" name="Picture 3"/>
+          <p:cNvPicPr>
+            <a:picLocks noChangeAspect="1" noChangeArrowheads="1"/>
+          </p:cNvPicPr>
+          <p:nvPr/>
+        </p:nvPicPr>
+        <p:blipFill>
+          <a:blip r:embed="rId3" cstate="print"/>
+          <a:srcRect/>
+          <a:stretch>
+            <a:fillRect/>
+          </a:stretch>
+        </p:blipFill>
+        <p:spPr bwMode="auto">
+          <a:xfrm>
+            <a:off x="228600" y="6248400"/>
+            <a:ext cx="1371600" cy="410346"/>
+          </a:xfrm>
+          <a:prstGeom prst="rect">
+            <a:avLst/>
+          </a:prstGeom>
+          <a:noFill/>
+          <a:ln w="9525">
+            <a:noFill/>
+            <a:miter lim="800000"/>
+            <a:headEnd/>
+            <a:tailEnd/>
+          </a:ln>
+          <a:effectLst/>
+        </p:spPr>
+      </p:pic>
+      <p:sp>
+        <p:nvSpPr>
+          <p:cNvPr id="10" name="TextBox 9"/>
+          <p:cNvSpPr txBox="1"/>
+          <p:nvPr/>
+        </p:nvSpPr>
+        <p:spPr>
+          <a:xfrm>
+            <a:off x="2057400" y="6324600"/>
+            <a:ext cx="4419600" cy="369332"/>
+          </a:xfrm>
+          <a:prstGeom prst="rect">
+            <a:avLst/>
+          </a:prstGeom>
+          <a:noFill/>
+        </p:spPr>
+        <p:txBody>
+          <a:bodyPr wrap="square" rtlCol="0">
+            <a:spAutoFit/>
+          </a:bodyPr>
+          <a:lstStyle/>
+          <a:p>
+            <a:r>
+              <a:rPr lang="en-US" dirty="0" smtClean="0">
+                <a:solidFill>
+                  <a:schemeClr val="bg1"/>
+                </a:solidFill>
+                <a:latin typeface="Verdana" pitchFamily="34" charset="0"/>
+                <a:ea typeface="Verdana" pitchFamily="34" charset="0"/>
+                <a:cs typeface="Verdana" pitchFamily="34" charset="0"/>
+              </a:rPr>
+              <a:t>Testing web applications &amp; services</a:t>
+            </a:r>
+            <a:endParaRPr lang="en-US" dirty="0">
+              <a:solidFill>
+                <a:schemeClr val="bg1"/>
+              </a:solidFill>
+              <a:latin typeface="Verdana" pitchFamily="34" charset="0"/>
+              <a:ea typeface="Verdana" pitchFamily="34" charset="0"/>
+              <a:cs typeface="Verdana" pitchFamily="34" charset="0"/>
+            </a:endParaRPr>
+          </a:p>
+        </p:txBody>
+      </p:sp>
+      <p:pic>
+        <p:nvPicPr>
+          <p:cNvPr id="1033" name="Picture 9"/>
+          <p:cNvPicPr>
+            <a:picLocks noChangeAspect="1" noChangeArrowheads="1"/>
+          </p:cNvPicPr>
+          <p:nvPr/>
+        </p:nvPicPr>
+        <p:blipFill>
+          <a:blip r:embed="rId4" cstate="print"/>
+          <a:srcRect/>
+          <a:stretch>
+            <a:fillRect/>
+          </a:stretch>
+        </p:blipFill>
+        <p:spPr bwMode="auto">
+          <a:xfrm>
+            <a:off x="6934202" y="6248400"/>
+            <a:ext cx="1981195" cy="431239"/>
+          </a:xfrm>
+          <a:prstGeom prst="rect">
+            <a:avLst/>
+          </a:prstGeom>
+          <a:noFill/>
+          <a:ln w="9525">
+            <a:noFill/>
+            <a:miter lim="800000"/>
+            <a:headEnd/>
+            <a:tailEnd/>
+          </a:ln>
+          <a:effectLst/>
+        </p:spPr>
+      </p:pic>
+      <p:sp>
+        <p:nvSpPr>
+          <p:cNvPr id="13" name="TextBox 12"/>
+          <p:cNvSpPr txBox="1"/>
+          <p:nvPr/>
+        </p:nvSpPr>
+        <p:spPr>
+          <a:xfrm>
+            <a:off x="7315200" y="0"/>
+            <a:ext cx="1828800" cy="584775"/>
+          </a:xfrm>
+          <a:prstGeom prst="rect">
+            <a:avLst/>
+          </a:prstGeom>
+          <a:solidFill>
+            <a:schemeClr val="bg2">
+              <a:lumMod val="75000"/>
+            </a:schemeClr>
+          </a:solidFill>
+        </p:spPr>
+        <p:txBody>
+          <a:bodyPr wrap="square" rtlCol="0">
+            <a:spAutoFit/>
+          </a:bodyPr>
+          <a:lstStyle/>
+          <a:p>
+            <a:r>
+              <a:rPr lang="en-US" sz="3200" dirty="0" smtClean="0"/>
+              <a:t>Networks</a:t>
+            </a:r>
+            <a:endParaRPr lang="en-US" sz="3200" dirty="0"/>
+          </a:p>
+        </p:txBody>
+      </p:sp>
+      <p:sp>
+        <p:nvSpPr>
+          <p:cNvPr id="8" name="TextBox 7"/>
+          <p:cNvSpPr txBox="1"/>
+          <p:nvPr/>
+        </p:nvSpPr>
+        <p:spPr>
+          <a:xfrm>
+            <a:off x="0" y="990600"/>
+            <a:ext cx="9144000" cy="830997"/>
+          </a:xfrm>
+          <a:prstGeom prst="rect">
+            <a:avLst/>
+          </a:prstGeom>
+          <a:noFill/>
+        </p:spPr>
+        <p:txBody>
+          <a:bodyPr wrap="square" rtlCol="0">
+            <a:spAutoFit/>
+          </a:bodyPr>
+          <a:lstStyle/>
+          <a:p>
+            <a:pPr algn="ctr"/>
+            <a:r>
+              <a:rPr lang="en-US" sz="4800" dirty="0" smtClean="0"/>
+              <a:t>Exercise:</a:t>
+            </a:r>
+          </a:p>
+        </p:txBody>
+      </p:sp>
+      <p:sp>
+        <p:nvSpPr>
+          <p:cNvPr id="9" name="TextBox 8"/>
+          <p:cNvSpPr txBox="1"/>
+          <p:nvPr/>
+        </p:nvSpPr>
+        <p:spPr>
+          <a:xfrm>
+            <a:off x="0" y="2209800"/>
+            <a:ext cx="9144000" cy="830997"/>
+          </a:xfrm>
+          <a:prstGeom prst="rect">
+            <a:avLst/>
+          </a:prstGeom>
+          <a:noFill/>
+        </p:spPr>
+        <p:txBody>
+          <a:bodyPr wrap="square" rtlCol="0">
+            <a:spAutoFit/>
+          </a:bodyPr>
+          <a:lstStyle/>
+          <a:p>
+            <a:pPr algn="ctr"/>
+            <a:r>
+              <a:rPr lang="en-US" sz="4800" dirty="0" smtClean="0"/>
+              <a:t>Using </a:t>
+            </a:r>
+            <a:r>
+              <a:rPr lang="en-US" sz="4800" dirty="0" err="1" smtClean="0"/>
+              <a:t>Wireshark</a:t>
+            </a:r>
+            <a:r>
+              <a:rPr lang="en-US" sz="4800" dirty="0" smtClean="0"/>
+              <a:t> to view packets</a:t>
+            </a:r>
+          </a:p>
+        </p:txBody>
+      </p:sp>
+    </p:spTree>
+  </p:cSld>
+  <p:clrMapOvr>
+    <a:masterClrMapping/>
+  </p:clrMapOvr>
+  <p:timing>
+    <p:tnLst>
+      <p:par>
+        <p:cTn id="1" dur="indefinite" restart="never" nodeType="tmRoot"/>
+      </p:par>
+    </p:tnLst>
+  </p:timing>
+</p:sld>
+</file>
+
+<file path=ppt/slides/slide12.xml><?xml version="1.0" encoding="utf-8"?>
+<p:sld xmlns:a="http://schemas.openxmlformats.org/drawingml/2006/main" xmlns:r="http://schemas.openxmlformats.org/officeDocument/2006/relationships" xmlns:p="http://schemas.openxmlformats.org/presentationml/2006/main">
+  <p:cSld>
+    <p:spTree>
+      <p:nvGrpSpPr>
+        <p:cNvPr id="1" name=""/>
+        <p:cNvGrpSpPr/>
+        <p:nvPr/>
+      </p:nvGrpSpPr>
+      <p:grpSpPr>
+        <a:xfrm>
+          <a:off x="0" y="0"/>
+          <a:ext cx="0" cy="0"/>
+          <a:chOff x="0" y="0"/>
+          <a:chExt cx="0" cy="0"/>
+        </a:xfrm>
+      </p:grpSpPr>
+      <p:sp>
+        <p:nvSpPr>
+          <p:cNvPr id="4" name="Rectangle 3"/>
+          <p:cNvSpPr/>
+          <p:nvPr/>
+        </p:nvSpPr>
+        <p:spPr>
+          <a:xfrm>
+            <a:off x="0" y="6096000"/>
+            <a:ext cx="9144000" cy="762000"/>
+          </a:xfrm>
+          <a:prstGeom prst="rect">
+            <a:avLst/>
+          </a:prstGeom>
+          <a:solidFill>
+            <a:schemeClr val="tx1">
+              <a:lumMod val="85000"/>
+              <a:lumOff val="15000"/>
+            </a:schemeClr>
+          </a:solidFill>
+        </p:spPr>
+        <p:style>
+          <a:lnRef idx="2">
+            <a:schemeClr val="accent1">
+              <a:shade val="50000"/>
+            </a:schemeClr>
+          </a:lnRef>
+          <a:fillRef idx="1">
+            <a:schemeClr val="accent1"/>
+          </a:fillRef>
+          <a:effectRef idx="0">
+            <a:schemeClr val="accent1"/>
+          </a:effectRef>
+          <a:fontRef idx="minor">
+            <a:schemeClr val="lt1"/>
+          </a:fontRef>
+        </p:style>
+        <p:txBody>
+          <a:bodyPr rtlCol="0" anchor="ctr"/>
+          <a:lstStyle/>
+          <a:p>
+            <a:pPr algn="ctr"/>
+            <a:endParaRPr lang="en-US"/>
+          </a:p>
+        </p:txBody>
+      </p:sp>
+      <p:pic>
+        <p:nvPicPr>
+          <p:cNvPr id="1027" name="Picture 3"/>
+          <p:cNvPicPr>
+            <a:picLocks noChangeAspect="1" noChangeArrowheads="1"/>
+          </p:cNvPicPr>
+          <p:nvPr/>
+        </p:nvPicPr>
+        <p:blipFill>
+          <a:blip r:embed="rId3" cstate="print"/>
+          <a:srcRect/>
+          <a:stretch>
+            <a:fillRect/>
+          </a:stretch>
+        </p:blipFill>
+        <p:spPr bwMode="auto">
+          <a:xfrm>
+            <a:off x="228600" y="6248400"/>
+            <a:ext cx="1371600" cy="410346"/>
+          </a:xfrm>
+          <a:prstGeom prst="rect">
+            <a:avLst/>
+          </a:prstGeom>
+          <a:noFill/>
+          <a:ln w="9525">
+            <a:noFill/>
+            <a:miter lim="800000"/>
+            <a:headEnd/>
+            <a:tailEnd/>
+          </a:ln>
+          <a:effectLst/>
+        </p:spPr>
+      </p:pic>
+      <p:sp>
+        <p:nvSpPr>
+          <p:cNvPr id="10" name="TextBox 9"/>
+          <p:cNvSpPr txBox="1"/>
+          <p:nvPr/>
+        </p:nvSpPr>
+        <p:spPr>
+          <a:xfrm>
+            <a:off x="2057400" y="6324600"/>
+            <a:ext cx="4419600" cy="369332"/>
+          </a:xfrm>
+          <a:prstGeom prst="rect">
+            <a:avLst/>
+          </a:prstGeom>
+          <a:noFill/>
+        </p:spPr>
+        <p:txBody>
+          <a:bodyPr wrap="square" rtlCol="0">
+            <a:spAutoFit/>
+          </a:bodyPr>
+          <a:lstStyle/>
+          <a:p>
+            <a:r>
+              <a:rPr lang="en-US" dirty="0" smtClean="0">
+                <a:solidFill>
+                  <a:schemeClr val="bg1"/>
+                </a:solidFill>
+                <a:latin typeface="Verdana" pitchFamily="34" charset="0"/>
+                <a:ea typeface="Verdana" pitchFamily="34" charset="0"/>
+                <a:cs typeface="Verdana" pitchFamily="34" charset="0"/>
+              </a:rPr>
+              <a:t>Testing web applications &amp; services</a:t>
+            </a:r>
+            <a:endParaRPr lang="en-US" dirty="0">
+              <a:solidFill>
+                <a:schemeClr val="bg1"/>
+              </a:solidFill>
+              <a:latin typeface="Verdana" pitchFamily="34" charset="0"/>
+              <a:ea typeface="Verdana" pitchFamily="34" charset="0"/>
+              <a:cs typeface="Verdana" pitchFamily="34" charset="0"/>
+            </a:endParaRPr>
+          </a:p>
+        </p:txBody>
+      </p:sp>
+      <p:pic>
+        <p:nvPicPr>
+          <p:cNvPr id="1033" name="Picture 9"/>
+          <p:cNvPicPr>
+            <a:picLocks noChangeAspect="1" noChangeArrowheads="1"/>
+          </p:cNvPicPr>
+          <p:nvPr/>
+        </p:nvPicPr>
+        <p:blipFill>
+          <a:blip r:embed="rId4" cstate="print"/>
+          <a:srcRect/>
+          <a:stretch>
+            <a:fillRect/>
+          </a:stretch>
+        </p:blipFill>
+        <p:spPr bwMode="auto">
+          <a:xfrm>
+            <a:off x="6934202" y="6248400"/>
+            <a:ext cx="1981195" cy="431239"/>
+          </a:xfrm>
+          <a:prstGeom prst="rect">
+            <a:avLst/>
+          </a:prstGeom>
+          <a:noFill/>
+          <a:ln w="9525">
+            <a:noFill/>
+            <a:miter lim="800000"/>
+            <a:headEnd/>
+            <a:tailEnd/>
+          </a:ln>
+          <a:effectLst/>
+        </p:spPr>
+      </p:pic>
+      <p:sp>
+        <p:nvSpPr>
+          <p:cNvPr id="13" name="TextBox 12"/>
+          <p:cNvSpPr txBox="1"/>
+          <p:nvPr/>
+        </p:nvSpPr>
+        <p:spPr>
+          <a:xfrm>
+            <a:off x="7315200" y="0"/>
+            <a:ext cx="1828800" cy="584775"/>
+          </a:xfrm>
+          <a:prstGeom prst="rect">
+            <a:avLst/>
+          </a:prstGeom>
+          <a:solidFill>
+            <a:schemeClr val="bg2">
+              <a:lumMod val="75000"/>
+            </a:schemeClr>
+          </a:solidFill>
+        </p:spPr>
+        <p:txBody>
+          <a:bodyPr wrap="square" rtlCol="0">
+            <a:spAutoFit/>
+          </a:bodyPr>
+          <a:lstStyle/>
+          <a:p>
+            <a:r>
+              <a:rPr lang="en-US" sz="3200" dirty="0" smtClean="0"/>
+              <a:t>Networks</a:t>
+            </a:r>
+            <a:endParaRPr lang="en-US" sz="3200" dirty="0"/>
+          </a:p>
+        </p:txBody>
+      </p:sp>
+      <p:sp>
+        <p:nvSpPr>
+          <p:cNvPr id="8" name="TextBox 7"/>
+          <p:cNvSpPr txBox="1"/>
+          <p:nvPr/>
+        </p:nvSpPr>
+        <p:spPr>
+          <a:xfrm>
+            <a:off x="0" y="990600"/>
+            <a:ext cx="9144000" cy="830997"/>
+          </a:xfrm>
+          <a:prstGeom prst="rect">
+            <a:avLst/>
+          </a:prstGeom>
+          <a:noFill/>
+        </p:spPr>
+        <p:txBody>
+          <a:bodyPr wrap="square" rtlCol="0">
+            <a:spAutoFit/>
+          </a:bodyPr>
+          <a:lstStyle/>
+          <a:p>
+            <a:pPr algn="ctr"/>
+            <a:r>
+              <a:rPr lang="en-US" sz="4800" dirty="0" smtClean="0"/>
+              <a:t>Exercise:</a:t>
+            </a:r>
+          </a:p>
+        </p:txBody>
+      </p:sp>
+      <p:sp>
+        <p:nvSpPr>
+          <p:cNvPr id="9" name="TextBox 8"/>
+          <p:cNvSpPr txBox="1"/>
+          <p:nvPr/>
+        </p:nvSpPr>
+        <p:spPr>
+          <a:xfrm>
+            <a:off x="0" y="2209800"/>
+            <a:ext cx="9144000" cy="1569660"/>
+          </a:xfrm>
+          <a:prstGeom prst="rect">
+            <a:avLst/>
+          </a:prstGeom>
+          <a:noFill/>
+        </p:spPr>
+        <p:txBody>
+          <a:bodyPr wrap="square" rtlCol="0">
+            <a:spAutoFit/>
+          </a:bodyPr>
+          <a:lstStyle/>
+          <a:p>
+            <a:pPr algn="ctr"/>
+            <a:r>
+              <a:rPr lang="en-US" sz="4800" dirty="0" smtClean="0"/>
+              <a:t>Using ping, traceroute, and </a:t>
+            </a:r>
+            <a:r>
+              <a:rPr lang="en-US" sz="4800" dirty="0" err="1" smtClean="0"/>
+              <a:t>nslookup</a:t>
+            </a:r>
+            <a:endParaRPr lang="en-US" sz="4800" dirty="0" smtClean="0"/>
+          </a:p>
+        </p:txBody>
+      </p:sp>
+    </p:spTree>
+  </p:cSld>
+  <p:clrMapOvr>
+    <a:masterClrMapping/>
+  </p:clrMapOvr>
+  <p:timing>
+    <p:tnLst>
+      <p:par>
+        <p:cTn id="1" dur="indefinite" restart="never" nodeType="tmRoot"/>
+      </p:par>
+    </p:tnLst>
+  </p:timing>
+</p:sld>
+</file>
+
 <file path=ppt/slides/slide2.xml><?xml version="1.0" encoding="utf-8"?>
 <p:sld xmlns:a="http://schemas.openxmlformats.org/drawingml/2006/main" xmlns:r="http://schemas.openxmlformats.org/officeDocument/2006/relationships" xmlns:p="http://schemas.openxmlformats.org/presentationml/2006/main">
   <p:cSld>
@@ -4686,48 +7013,25 @@
           <a:p>
             <a:r>
               <a:rPr lang="en-US" sz="3600" dirty="0" smtClean="0"/>
-              <a:t>1920s </a:t>
-            </a:r>
+              <a:t>1920s – Teletypes invented</a:t>
+            </a:r>
+          </a:p>
+          <a:p>
             <a:r>
               <a:rPr lang="en-US" sz="3600" dirty="0" smtClean="0"/>
-              <a:t>– </a:t>
-            </a:r>
+              <a:t>1957 – Timesharing systems</a:t>
+            </a:r>
+          </a:p>
+          <a:p>
             <a:r>
               <a:rPr lang="en-US" sz="3600" dirty="0" smtClean="0"/>
-              <a:t>Teletypes invented</a:t>
-            </a:r>
-            <a:endParaRPr lang="en-US" sz="3600" dirty="0" smtClean="0"/>
+              <a:t>1958 – DARPA founded in response to Sputnik</a:t>
+            </a:r>
           </a:p>
           <a:p>
             <a:r>
               <a:rPr lang="en-US" sz="3600" dirty="0" smtClean="0"/>
-              <a:t>1957 – </a:t>
-            </a:r>
-            <a:r>
-              <a:rPr lang="en-US" sz="3600" dirty="0" smtClean="0"/>
-              <a:t>Timesharing systems</a:t>
-            </a:r>
-            <a:endParaRPr lang="en-US" sz="3600" dirty="0" smtClean="0"/>
-          </a:p>
-          <a:p>
-            <a:r>
-              <a:rPr lang="en-US" sz="3600" dirty="0" smtClean="0"/>
-              <a:t>1958 – DARPA </a:t>
-            </a:r>
-            <a:r>
-              <a:rPr lang="en-US" sz="3600" dirty="0" smtClean="0"/>
-              <a:t>founded in response to Sputnik</a:t>
-            </a:r>
-            <a:endParaRPr lang="en-US" sz="3600" dirty="0" smtClean="0"/>
-          </a:p>
-          <a:p>
-            <a:r>
-              <a:rPr lang="en-US" sz="3600" dirty="0" smtClean="0"/>
-              <a:t>1961 – Packet </a:t>
-            </a:r>
-            <a:r>
-              <a:rPr lang="en-US" sz="3600" dirty="0" smtClean="0"/>
-              <a:t>switching invented</a:t>
+              <a:t>1961 – Packet switching invented</a:t>
             </a:r>
           </a:p>
           <a:p>
@@ -4739,15 +7043,7 @@
           <a:p>
             <a:r>
               <a:rPr lang="en-US" sz="3600" dirty="0" smtClean="0"/>
-              <a:t>1969 </a:t>
-            </a:r>
-            <a:r>
-              <a:rPr lang="en-US" sz="3600" dirty="0" smtClean="0"/>
-              <a:t>– ARPANET </a:t>
-            </a:r>
-            <a:r>
-              <a:rPr lang="en-US" sz="3600" dirty="0" smtClean="0"/>
-              <a:t>created</a:t>
+              <a:t>1969 – ARPANET created</a:t>
             </a:r>
           </a:p>
           <a:p>
@@ -4755,7 +7051,6 @@
               <a:rPr lang="en-US" sz="3600" dirty="0" smtClean="0"/>
               <a:t>1969 – Unix operating system</a:t>
             </a:r>
-            <a:endParaRPr lang="en-US" sz="3600" dirty="0" smtClean="0"/>
           </a:p>
           <a:p>
             <a:r>
@@ -4768,7 +7063,6 @@
               <a:rPr lang="en-US" sz="3600" dirty="0" smtClean="0"/>
               <a:t>1982 – TCP/IP protocol developed</a:t>
             </a:r>
-            <a:endParaRPr lang="en-US" sz="3600" dirty="0" smtClean="0"/>
           </a:p>
         </p:txBody>
       </p:sp>
@@ -5018,17 +7312,8 @@
           <a:p>
             <a:r>
               <a:rPr lang="en-US" sz="3600" dirty="0" smtClean="0"/>
-              <a:t>1977 </a:t>
-            </a:r>
-            <a:r>
-              <a:rPr lang="en-US" sz="3600" dirty="0" smtClean="0"/>
-              <a:t>– The first modem for personal </a:t>
-            </a:r>
-            <a:r>
-              <a:rPr lang="en-US" sz="3600" dirty="0" smtClean="0"/>
-              <a:t>computers</a:t>
-            </a:r>
-            <a:endParaRPr lang="en-US" sz="3600" dirty="0" smtClean="0"/>
+              <a:t>1977 – The first modem for personal computers</a:t>
+            </a:r>
           </a:p>
           <a:p>
             <a:r>
@@ -5041,7 +7326,6 @@
               <a:rPr lang="en-US" sz="3600" dirty="0" smtClean="0"/>
               <a:t>1980s – Bulletin Board Systems</a:t>
             </a:r>
-            <a:endParaRPr lang="en-US" sz="3600" dirty="0" smtClean="0"/>
           </a:p>
           <a:p>
             <a:r>
@@ -5082,13 +7366,8 @@
           <a:p>
             <a:r>
               <a:rPr lang="en-US" sz="3600" dirty="0" smtClean="0"/>
-              <a:t>1995 – Commercialization of the </a:t>
-            </a:r>
-            <a:r>
-              <a:rPr lang="en-US" sz="3600" dirty="0" smtClean="0"/>
-              <a:t>internet</a:t>
-            </a:r>
-            <a:endParaRPr lang="en-US" sz="3600" dirty="0" smtClean="0"/>
+              <a:t>1995 – Commercialization of the internet</a:t>
+            </a:r>
           </a:p>
           <a:p>
             <a:endParaRPr lang="en-US" sz="3600" dirty="0"/>
@@ -5285,14 +7564,233 @@
       </p:pic>
       <p:sp>
         <p:nvSpPr>
+          <p:cNvPr id="8" name="TextBox 7"/>
+          <p:cNvSpPr txBox="1"/>
+          <p:nvPr/>
+        </p:nvSpPr>
+        <p:spPr>
+          <a:xfrm>
+            <a:off x="0" y="1752600"/>
+            <a:ext cx="9144000" cy="830997"/>
+          </a:xfrm>
+          <a:prstGeom prst="rect">
+            <a:avLst/>
+          </a:prstGeom>
+          <a:noFill/>
+        </p:spPr>
+        <p:txBody>
+          <a:bodyPr wrap="square" rtlCol="0">
+            <a:spAutoFit/>
+          </a:bodyPr>
+          <a:lstStyle/>
+          <a:p>
+            <a:pPr algn="ctr"/>
+            <a:r>
+              <a:rPr lang="en-US" sz="4800" dirty="0" smtClean="0"/>
+              <a:t>Networks</a:t>
+            </a:r>
+            <a:endParaRPr lang="en-US" sz="4800" dirty="0"/>
+          </a:p>
+        </p:txBody>
+      </p:sp>
+    </p:spTree>
+  </p:cSld>
+  <p:clrMapOvr>
+    <a:masterClrMapping/>
+  </p:clrMapOvr>
+  <p:timing>
+    <p:tnLst>
+      <p:par>
+        <p:cTn id="1" dur="indefinite" restart="never" nodeType="tmRoot"/>
+      </p:par>
+    </p:tnLst>
+  </p:timing>
+</p:sld>
+</file>
+
+<file path=ppt/slides/slide6.xml><?xml version="1.0" encoding="utf-8"?>
+<p:sld xmlns:a="http://schemas.openxmlformats.org/drawingml/2006/main" xmlns:r="http://schemas.openxmlformats.org/officeDocument/2006/relationships" xmlns:p="http://schemas.openxmlformats.org/presentationml/2006/main">
+  <p:cSld>
+    <p:spTree>
+      <p:nvGrpSpPr>
+        <p:cNvPr id="1" name=""/>
+        <p:cNvGrpSpPr/>
+        <p:nvPr/>
+      </p:nvGrpSpPr>
+      <p:grpSpPr>
+        <a:xfrm>
+          <a:off x="0" y="0"/>
+          <a:ext cx="0" cy="0"/>
+          <a:chOff x="0" y="0"/>
+          <a:chExt cx="0" cy="0"/>
+        </a:xfrm>
+      </p:grpSpPr>
+      <p:sp>
+        <p:nvSpPr>
+          <p:cNvPr id="4" name="Rectangle 3"/>
+          <p:cNvSpPr/>
+          <p:nvPr/>
+        </p:nvSpPr>
+        <p:spPr>
+          <a:xfrm>
+            <a:off x="0" y="6096000"/>
+            <a:ext cx="9144000" cy="762000"/>
+          </a:xfrm>
+          <a:prstGeom prst="rect">
+            <a:avLst/>
+          </a:prstGeom>
+          <a:solidFill>
+            <a:schemeClr val="tx1">
+              <a:lumMod val="85000"/>
+              <a:lumOff val="15000"/>
+            </a:schemeClr>
+          </a:solidFill>
+        </p:spPr>
+        <p:style>
+          <a:lnRef idx="2">
+            <a:schemeClr val="accent1">
+              <a:shade val="50000"/>
+            </a:schemeClr>
+          </a:lnRef>
+          <a:fillRef idx="1">
+            <a:schemeClr val="accent1"/>
+          </a:fillRef>
+          <a:effectRef idx="0">
+            <a:schemeClr val="accent1"/>
+          </a:effectRef>
+          <a:fontRef idx="minor">
+            <a:schemeClr val="lt1"/>
+          </a:fontRef>
+        </p:style>
+        <p:txBody>
+          <a:bodyPr rtlCol="0" anchor="ctr"/>
+          <a:lstStyle/>
+          <a:p>
+            <a:pPr algn="ctr"/>
+            <a:endParaRPr lang="en-US"/>
+          </a:p>
+        </p:txBody>
+      </p:sp>
+      <p:pic>
+        <p:nvPicPr>
+          <p:cNvPr id="1027" name="Picture 3"/>
+          <p:cNvPicPr>
+            <a:picLocks noChangeAspect="1" noChangeArrowheads="1"/>
+          </p:cNvPicPr>
+          <p:nvPr/>
+        </p:nvPicPr>
+        <p:blipFill>
+          <a:blip r:embed="rId3" cstate="print"/>
+          <a:srcRect/>
+          <a:stretch>
+            <a:fillRect/>
+          </a:stretch>
+        </p:blipFill>
+        <p:spPr bwMode="auto">
+          <a:xfrm>
+            <a:off x="228600" y="6248400"/>
+            <a:ext cx="1371600" cy="410346"/>
+          </a:xfrm>
+          <a:prstGeom prst="rect">
+            <a:avLst/>
+          </a:prstGeom>
+          <a:noFill/>
+          <a:ln w="9525">
+            <a:noFill/>
+            <a:miter lim="800000"/>
+            <a:headEnd/>
+            <a:tailEnd/>
+          </a:ln>
+          <a:effectLst/>
+        </p:spPr>
+      </p:pic>
+      <p:sp>
+        <p:nvSpPr>
+          <p:cNvPr id="10" name="TextBox 9"/>
+          <p:cNvSpPr txBox="1"/>
+          <p:nvPr/>
+        </p:nvSpPr>
+        <p:spPr>
+          <a:xfrm>
+            <a:off x="2057400" y="6324600"/>
+            <a:ext cx="4419600" cy="369332"/>
+          </a:xfrm>
+          <a:prstGeom prst="rect">
+            <a:avLst/>
+          </a:prstGeom>
+          <a:noFill/>
+        </p:spPr>
+        <p:txBody>
+          <a:bodyPr wrap="square" rtlCol="0">
+            <a:spAutoFit/>
+          </a:bodyPr>
+          <a:lstStyle/>
+          <a:p>
+            <a:r>
+              <a:rPr lang="en-US" dirty="0" smtClean="0">
+                <a:solidFill>
+                  <a:schemeClr val="bg1"/>
+                </a:solidFill>
+                <a:latin typeface="Verdana" pitchFamily="34" charset="0"/>
+                <a:ea typeface="Verdana" pitchFamily="34" charset="0"/>
+                <a:cs typeface="Verdana" pitchFamily="34" charset="0"/>
+              </a:rPr>
+              <a:t>Testing web applications &amp; services</a:t>
+            </a:r>
+            <a:endParaRPr lang="en-US" dirty="0">
+              <a:solidFill>
+                <a:schemeClr val="bg1"/>
+              </a:solidFill>
+              <a:latin typeface="Verdana" pitchFamily="34" charset="0"/>
+              <a:ea typeface="Verdana" pitchFamily="34" charset="0"/>
+              <a:cs typeface="Verdana" pitchFamily="34" charset="0"/>
+            </a:endParaRPr>
+          </a:p>
+        </p:txBody>
+      </p:sp>
+      <p:pic>
+        <p:nvPicPr>
+          <p:cNvPr id="1033" name="Picture 9"/>
+          <p:cNvPicPr>
+            <a:picLocks noChangeAspect="1" noChangeArrowheads="1"/>
+          </p:cNvPicPr>
+          <p:nvPr/>
+        </p:nvPicPr>
+        <p:blipFill>
+          <a:blip r:embed="rId4" cstate="print"/>
+          <a:srcRect/>
+          <a:stretch>
+            <a:fillRect/>
+          </a:stretch>
+        </p:blipFill>
+        <p:spPr bwMode="auto">
+          <a:xfrm>
+            <a:off x="6934202" y="6248400"/>
+            <a:ext cx="1981195" cy="431239"/>
+          </a:xfrm>
+          <a:prstGeom prst="rect">
+            <a:avLst/>
+          </a:prstGeom>
+          <a:noFill/>
+          <a:ln w="9525">
+            <a:noFill/>
+            <a:miter lim="800000"/>
+            <a:headEnd/>
+            <a:tailEnd/>
+          </a:ln>
+          <a:effectLst/>
+        </p:spPr>
+      </p:pic>
+      <p:sp>
+        <p:nvSpPr>
           <p:cNvPr id="13" name="TextBox 12"/>
           <p:cNvSpPr txBox="1"/>
           <p:nvPr/>
         </p:nvSpPr>
         <p:spPr>
           <a:xfrm>
-            <a:off x="7467600" y="0"/>
-            <a:ext cx="1676400" cy="584775"/>
+            <a:off x="7315200" y="0"/>
+            <a:ext cx="1828800" cy="584775"/>
           </a:xfrm>
           <a:prstGeom prst="rect">
             <a:avLst/>
@@ -5311,7 +7809,7 @@
           <a:p>
             <a:r>
               <a:rPr lang="en-US" sz="3200" dirty="0" smtClean="0"/>
-              <a:t>Timeline</a:t>
+              <a:t>Networks</a:t>
             </a:r>
             <a:endParaRPr lang="en-US" sz="3200" dirty="0"/>
           </a:p>
@@ -5325,7 +7823,7 @@
         </p:nvSpPr>
         <p:spPr>
           <a:xfrm>
-            <a:off x="0" y="914400"/>
+            <a:off x="0" y="990600"/>
             <a:ext cx="9144000" cy="830997"/>
           </a:xfrm>
           <a:prstGeom prst="rect">
@@ -5341,8 +7839,1039 @@
           <a:p>
             <a:pPr algn="ctr"/>
             <a:r>
+              <a:rPr lang="en-US" sz="4800" u="sng" dirty="0" smtClean="0"/>
+              <a:t>The OSI Model</a:t>
+            </a:r>
+            <a:endParaRPr lang="en-US" sz="4800" u="sng" dirty="0"/>
+          </a:p>
+        </p:txBody>
+      </p:sp>
+      <p:sp>
+        <p:nvSpPr>
+          <p:cNvPr id="9" name="TextBox 8"/>
+          <p:cNvSpPr txBox="1"/>
+          <p:nvPr/>
+        </p:nvSpPr>
+        <p:spPr>
+          <a:xfrm>
+            <a:off x="2819400" y="1981200"/>
+            <a:ext cx="3581400" cy="3970318"/>
+          </a:xfrm>
+          <a:prstGeom prst="rect">
+            <a:avLst/>
+          </a:prstGeom>
+          <a:noFill/>
+        </p:spPr>
+        <p:txBody>
+          <a:bodyPr wrap="square" rtlCol="0">
+            <a:spAutoFit/>
+          </a:bodyPr>
+          <a:lstStyle/>
+          <a:p>
+            <a:pPr marL="742950" lvl="0" indent="-742950">
+              <a:buFont typeface="+mj-lt"/>
+              <a:buAutoNum type="arabicPeriod"/>
+            </a:pPr>
+            <a:r>
+              <a:rPr lang="en-US" sz="3600" dirty="0" smtClean="0"/>
+              <a:t>Physical </a:t>
+            </a:r>
+          </a:p>
+          <a:p>
+            <a:pPr marL="742950" lvl="0" indent="-742950">
+              <a:buFont typeface="+mj-lt"/>
+              <a:buAutoNum type="arabicPeriod"/>
+            </a:pPr>
+            <a:r>
+              <a:rPr lang="en-US" sz="3600" dirty="0" smtClean="0"/>
+              <a:t>Data Link</a:t>
+            </a:r>
+          </a:p>
+          <a:p>
+            <a:pPr marL="742950" lvl="0" indent="-742950">
+              <a:buFont typeface="+mj-lt"/>
+              <a:buAutoNum type="arabicPeriod"/>
+            </a:pPr>
+            <a:r>
+              <a:rPr lang="en-US" sz="3600" dirty="0" smtClean="0"/>
+              <a:t>Network</a:t>
+            </a:r>
+          </a:p>
+          <a:p>
+            <a:pPr marL="742950" lvl="0" indent="-742950">
+              <a:buFont typeface="+mj-lt"/>
+              <a:buAutoNum type="arabicPeriod"/>
+            </a:pPr>
+            <a:r>
+              <a:rPr lang="en-US" sz="3600" dirty="0" smtClean="0"/>
+              <a:t>Transport</a:t>
+            </a:r>
+          </a:p>
+          <a:p>
+            <a:pPr marL="742950" lvl="0" indent="-742950">
+              <a:buFont typeface="+mj-lt"/>
+              <a:buAutoNum type="arabicPeriod"/>
+            </a:pPr>
+            <a:r>
+              <a:rPr lang="en-US" sz="3600" dirty="0" smtClean="0"/>
+              <a:t>Session </a:t>
+            </a:r>
+          </a:p>
+          <a:p>
+            <a:pPr marL="742950" lvl="0" indent="-742950">
+              <a:buFont typeface="+mj-lt"/>
+              <a:buAutoNum type="arabicPeriod"/>
+            </a:pPr>
+            <a:r>
+              <a:rPr lang="en-US" sz="3600" dirty="0" smtClean="0"/>
+              <a:t>Presentation</a:t>
+            </a:r>
+          </a:p>
+          <a:p>
+            <a:pPr marL="742950" lvl="0" indent="-742950">
+              <a:buFont typeface="+mj-lt"/>
+              <a:buAutoNum type="arabicPeriod"/>
+            </a:pPr>
+            <a:r>
+              <a:rPr lang="en-US" sz="3600" dirty="0" smtClean="0"/>
+              <a:t>Application</a:t>
+            </a:r>
+            <a:endParaRPr lang="en-US" sz="3600" dirty="0"/>
+          </a:p>
+        </p:txBody>
+      </p:sp>
+    </p:spTree>
+  </p:cSld>
+  <p:clrMapOvr>
+    <a:masterClrMapping/>
+  </p:clrMapOvr>
+  <p:timing>
+    <p:tnLst>
+      <p:par>
+        <p:cTn id="1" dur="indefinite" restart="never" nodeType="tmRoot"/>
+      </p:par>
+    </p:tnLst>
+  </p:timing>
+</p:sld>
+</file>
+
+<file path=ppt/slides/slide7.xml><?xml version="1.0" encoding="utf-8"?>
+<p:sld xmlns:a="http://schemas.openxmlformats.org/drawingml/2006/main" xmlns:r="http://schemas.openxmlformats.org/officeDocument/2006/relationships" xmlns:p="http://schemas.openxmlformats.org/presentationml/2006/main">
+  <p:cSld>
+    <p:spTree>
+      <p:nvGrpSpPr>
+        <p:cNvPr id="1" name=""/>
+        <p:cNvGrpSpPr/>
+        <p:nvPr/>
+      </p:nvGrpSpPr>
+      <p:grpSpPr>
+        <a:xfrm>
+          <a:off x="0" y="0"/>
+          <a:ext cx="0" cy="0"/>
+          <a:chOff x="0" y="0"/>
+          <a:chExt cx="0" cy="0"/>
+        </a:xfrm>
+      </p:grpSpPr>
+      <p:sp>
+        <p:nvSpPr>
+          <p:cNvPr id="4" name="Rectangle 3"/>
+          <p:cNvSpPr/>
+          <p:nvPr/>
+        </p:nvSpPr>
+        <p:spPr>
+          <a:xfrm>
+            <a:off x="0" y="6096000"/>
+            <a:ext cx="9144000" cy="762000"/>
+          </a:xfrm>
+          <a:prstGeom prst="rect">
+            <a:avLst/>
+          </a:prstGeom>
+          <a:solidFill>
+            <a:schemeClr val="tx1">
+              <a:lumMod val="85000"/>
+              <a:lumOff val="15000"/>
+            </a:schemeClr>
+          </a:solidFill>
+        </p:spPr>
+        <p:style>
+          <a:lnRef idx="2">
+            <a:schemeClr val="accent1">
+              <a:shade val="50000"/>
+            </a:schemeClr>
+          </a:lnRef>
+          <a:fillRef idx="1">
+            <a:schemeClr val="accent1"/>
+          </a:fillRef>
+          <a:effectRef idx="0">
+            <a:schemeClr val="accent1"/>
+          </a:effectRef>
+          <a:fontRef idx="minor">
+            <a:schemeClr val="lt1"/>
+          </a:fontRef>
+        </p:style>
+        <p:txBody>
+          <a:bodyPr rtlCol="0" anchor="ctr"/>
+          <a:lstStyle/>
+          <a:p>
+            <a:pPr algn="ctr"/>
+            <a:endParaRPr lang="en-US"/>
+          </a:p>
+        </p:txBody>
+      </p:sp>
+      <p:pic>
+        <p:nvPicPr>
+          <p:cNvPr id="1027" name="Picture 3"/>
+          <p:cNvPicPr>
+            <a:picLocks noChangeAspect="1" noChangeArrowheads="1"/>
+          </p:cNvPicPr>
+          <p:nvPr/>
+        </p:nvPicPr>
+        <p:blipFill>
+          <a:blip r:embed="rId3" cstate="print"/>
+          <a:srcRect/>
+          <a:stretch>
+            <a:fillRect/>
+          </a:stretch>
+        </p:blipFill>
+        <p:spPr bwMode="auto">
+          <a:xfrm>
+            <a:off x="228600" y="6248400"/>
+            <a:ext cx="1371600" cy="410346"/>
+          </a:xfrm>
+          <a:prstGeom prst="rect">
+            <a:avLst/>
+          </a:prstGeom>
+          <a:noFill/>
+          <a:ln w="9525">
+            <a:noFill/>
+            <a:miter lim="800000"/>
+            <a:headEnd/>
+            <a:tailEnd/>
+          </a:ln>
+          <a:effectLst/>
+        </p:spPr>
+      </p:pic>
+      <p:sp>
+        <p:nvSpPr>
+          <p:cNvPr id="10" name="TextBox 9"/>
+          <p:cNvSpPr txBox="1"/>
+          <p:nvPr/>
+        </p:nvSpPr>
+        <p:spPr>
+          <a:xfrm>
+            <a:off x="2057400" y="6324600"/>
+            <a:ext cx="4419600" cy="369332"/>
+          </a:xfrm>
+          <a:prstGeom prst="rect">
+            <a:avLst/>
+          </a:prstGeom>
+          <a:noFill/>
+        </p:spPr>
+        <p:txBody>
+          <a:bodyPr wrap="square" rtlCol="0">
+            <a:spAutoFit/>
+          </a:bodyPr>
+          <a:lstStyle/>
+          <a:p>
+            <a:r>
+              <a:rPr lang="en-US" dirty="0" smtClean="0">
+                <a:solidFill>
+                  <a:schemeClr val="bg1"/>
+                </a:solidFill>
+                <a:latin typeface="Verdana" pitchFamily="34" charset="0"/>
+                <a:ea typeface="Verdana" pitchFamily="34" charset="0"/>
+                <a:cs typeface="Verdana" pitchFamily="34" charset="0"/>
+              </a:rPr>
+              <a:t>Testing web applications &amp; services</a:t>
+            </a:r>
+            <a:endParaRPr lang="en-US" dirty="0">
+              <a:solidFill>
+                <a:schemeClr val="bg1"/>
+              </a:solidFill>
+              <a:latin typeface="Verdana" pitchFamily="34" charset="0"/>
+              <a:ea typeface="Verdana" pitchFamily="34" charset="0"/>
+              <a:cs typeface="Verdana" pitchFamily="34" charset="0"/>
+            </a:endParaRPr>
+          </a:p>
+        </p:txBody>
+      </p:sp>
+      <p:pic>
+        <p:nvPicPr>
+          <p:cNvPr id="1033" name="Picture 9"/>
+          <p:cNvPicPr>
+            <a:picLocks noChangeAspect="1" noChangeArrowheads="1"/>
+          </p:cNvPicPr>
+          <p:nvPr/>
+        </p:nvPicPr>
+        <p:blipFill>
+          <a:blip r:embed="rId4" cstate="print"/>
+          <a:srcRect/>
+          <a:stretch>
+            <a:fillRect/>
+          </a:stretch>
+        </p:blipFill>
+        <p:spPr bwMode="auto">
+          <a:xfrm>
+            <a:off x="6934202" y="6248400"/>
+            <a:ext cx="1981195" cy="431239"/>
+          </a:xfrm>
+          <a:prstGeom prst="rect">
+            <a:avLst/>
+          </a:prstGeom>
+          <a:noFill/>
+          <a:ln w="9525">
+            <a:noFill/>
+            <a:miter lim="800000"/>
+            <a:headEnd/>
+            <a:tailEnd/>
+          </a:ln>
+          <a:effectLst/>
+        </p:spPr>
+      </p:pic>
+      <p:sp>
+        <p:nvSpPr>
+          <p:cNvPr id="13" name="TextBox 12"/>
+          <p:cNvSpPr txBox="1"/>
+          <p:nvPr/>
+        </p:nvSpPr>
+        <p:spPr>
+          <a:xfrm>
+            <a:off x="7315200" y="0"/>
+            <a:ext cx="1828800" cy="584775"/>
+          </a:xfrm>
+          <a:prstGeom prst="rect">
+            <a:avLst/>
+          </a:prstGeom>
+          <a:solidFill>
+            <a:schemeClr val="bg2">
+              <a:lumMod val="75000"/>
+            </a:schemeClr>
+          </a:solidFill>
+        </p:spPr>
+        <p:txBody>
+          <a:bodyPr wrap="square" rtlCol="0">
+            <a:spAutoFit/>
+          </a:bodyPr>
+          <a:lstStyle/>
+          <a:p>
+            <a:r>
+              <a:rPr lang="en-US" sz="3200" dirty="0" smtClean="0"/>
+              <a:t>Networks</a:t>
+            </a:r>
+            <a:endParaRPr lang="en-US" sz="3200" dirty="0"/>
+          </a:p>
+        </p:txBody>
+      </p:sp>
+      <p:sp>
+        <p:nvSpPr>
+          <p:cNvPr id="8" name="TextBox 7"/>
+          <p:cNvSpPr txBox="1"/>
+          <p:nvPr/>
+        </p:nvSpPr>
+        <p:spPr>
+          <a:xfrm>
+            <a:off x="0" y="990600"/>
+            <a:ext cx="9144000" cy="830997"/>
+          </a:xfrm>
+          <a:prstGeom prst="rect">
+            <a:avLst/>
+          </a:prstGeom>
+          <a:noFill/>
+        </p:spPr>
+        <p:txBody>
+          <a:bodyPr wrap="square" rtlCol="0">
+            <a:spAutoFit/>
+          </a:bodyPr>
+          <a:lstStyle/>
+          <a:p>
+            <a:pPr algn="ctr"/>
+            <a:r>
+              <a:rPr lang="en-US" sz="4800" u="sng" dirty="0" smtClean="0"/>
+              <a:t>The </a:t>
+            </a:r>
+            <a:r>
+              <a:rPr lang="en-US" sz="4800" u="sng" dirty="0" smtClean="0"/>
+              <a:t>Internet </a:t>
+            </a:r>
+            <a:r>
+              <a:rPr lang="en-US" sz="4800" u="sng" dirty="0" smtClean="0"/>
+              <a:t>Model</a:t>
+            </a:r>
+            <a:endParaRPr lang="en-US" sz="4800" u="sng" dirty="0"/>
+          </a:p>
+        </p:txBody>
+      </p:sp>
+      <p:sp>
+        <p:nvSpPr>
+          <p:cNvPr id="9" name="TextBox 8"/>
+          <p:cNvSpPr txBox="1"/>
+          <p:nvPr/>
+        </p:nvSpPr>
+        <p:spPr>
+          <a:xfrm>
+            <a:off x="2286000" y="1981200"/>
+            <a:ext cx="4648200" cy="2862322"/>
+          </a:xfrm>
+          <a:prstGeom prst="rect">
+            <a:avLst/>
+          </a:prstGeom>
+          <a:noFill/>
+        </p:spPr>
+        <p:txBody>
+          <a:bodyPr wrap="square" rtlCol="0">
+            <a:spAutoFit/>
+          </a:bodyPr>
+          <a:lstStyle/>
+          <a:p>
+            <a:pPr marL="742950" lvl="0" indent="-742950">
+              <a:buFont typeface="+mj-lt"/>
+              <a:buAutoNum type="arabicPeriod"/>
+            </a:pPr>
+            <a:r>
+              <a:rPr lang="en-US" sz="3600" dirty="0" smtClean="0"/>
+              <a:t>Link Layer</a:t>
+            </a:r>
+          </a:p>
+          <a:p>
+            <a:pPr marL="742950" lvl="0" indent="-742950">
+              <a:buFont typeface="+mj-lt"/>
+              <a:buAutoNum type="arabicPeriod"/>
+            </a:pPr>
+            <a:r>
+              <a:rPr lang="en-US" sz="3600" dirty="0" smtClean="0"/>
+              <a:t>Internet Layer</a:t>
+            </a:r>
+          </a:p>
+          <a:p>
+            <a:pPr marL="742950" lvl="0" indent="-742950">
+              <a:buFont typeface="+mj-lt"/>
+              <a:buAutoNum type="arabicPeriod"/>
+            </a:pPr>
+            <a:r>
+              <a:rPr lang="en-US" sz="3600" dirty="0" smtClean="0"/>
+              <a:t>Transport Layer</a:t>
+            </a:r>
+          </a:p>
+          <a:p>
+            <a:pPr marL="742950" lvl="0" indent="-742950">
+              <a:buFont typeface="+mj-lt"/>
+              <a:buAutoNum type="arabicPeriod"/>
+            </a:pPr>
+            <a:r>
+              <a:rPr lang="en-US" sz="3600" dirty="0" smtClean="0"/>
+              <a:t>Application Layer</a:t>
+            </a:r>
+          </a:p>
+          <a:p>
+            <a:pPr marL="742950" lvl="0" indent="-742950">
+              <a:buFont typeface="+mj-lt"/>
+              <a:buAutoNum type="arabicPeriod"/>
+            </a:pPr>
+            <a:endParaRPr lang="en-US" sz="3600" dirty="0"/>
+          </a:p>
+        </p:txBody>
+      </p:sp>
+    </p:spTree>
+  </p:cSld>
+  <p:clrMapOvr>
+    <a:masterClrMapping/>
+  </p:clrMapOvr>
+  <p:timing>
+    <p:tnLst>
+      <p:par>
+        <p:cTn id="1" dur="indefinite" restart="never" nodeType="tmRoot"/>
+      </p:par>
+    </p:tnLst>
+  </p:timing>
+</p:sld>
+</file>
+
+<file path=ppt/slides/slide8.xml><?xml version="1.0" encoding="utf-8"?>
+<p:sld xmlns:a="http://schemas.openxmlformats.org/drawingml/2006/main" xmlns:r="http://schemas.openxmlformats.org/officeDocument/2006/relationships" xmlns:p="http://schemas.openxmlformats.org/presentationml/2006/main">
+  <p:cSld>
+    <p:spTree>
+      <p:nvGrpSpPr>
+        <p:cNvPr id="1" name=""/>
+        <p:cNvGrpSpPr/>
+        <p:nvPr/>
+      </p:nvGrpSpPr>
+      <p:grpSpPr>
+        <a:xfrm>
+          <a:off x="0" y="0"/>
+          <a:ext cx="0" cy="0"/>
+          <a:chOff x="0" y="0"/>
+          <a:chExt cx="0" cy="0"/>
+        </a:xfrm>
+      </p:grpSpPr>
+      <p:sp>
+        <p:nvSpPr>
+          <p:cNvPr id="4" name="Rectangle 3"/>
+          <p:cNvSpPr/>
+          <p:nvPr/>
+        </p:nvSpPr>
+        <p:spPr>
+          <a:xfrm>
+            <a:off x="0" y="6096000"/>
+            <a:ext cx="9144000" cy="762000"/>
+          </a:xfrm>
+          <a:prstGeom prst="rect">
+            <a:avLst/>
+          </a:prstGeom>
+          <a:solidFill>
+            <a:schemeClr val="tx1">
+              <a:lumMod val="85000"/>
+              <a:lumOff val="15000"/>
+            </a:schemeClr>
+          </a:solidFill>
+        </p:spPr>
+        <p:style>
+          <a:lnRef idx="2">
+            <a:schemeClr val="accent1">
+              <a:shade val="50000"/>
+            </a:schemeClr>
+          </a:lnRef>
+          <a:fillRef idx="1">
+            <a:schemeClr val="accent1"/>
+          </a:fillRef>
+          <a:effectRef idx="0">
+            <a:schemeClr val="accent1"/>
+          </a:effectRef>
+          <a:fontRef idx="minor">
+            <a:schemeClr val="lt1"/>
+          </a:fontRef>
+        </p:style>
+        <p:txBody>
+          <a:bodyPr rtlCol="0" anchor="ctr"/>
+          <a:lstStyle/>
+          <a:p>
+            <a:pPr algn="ctr"/>
+            <a:endParaRPr lang="en-US"/>
+          </a:p>
+        </p:txBody>
+      </p:sp>
+      <p:pic>
+        <p:nvPicPr>
+          <p:cNvPr id="1027" name="Picture 3"/>
+          <p:cNvPicPr>
+            <a:picLocks noChangeAspect="1" noChangeArrowheads="1"/>
+          </p:cNvPicPr>
+          <p:nvPr/>
+        </p:nvPicPr>
+        <p:blipFill>
+          <a:blip r:embed="rId3" cstate="print"/>
+          <a:srcRect/>
+          <a:stretch>
+            <a:fillRect/>
+          </a:stretch>
+        </p:blipFill>
+        <p:spPr bwMode="auto">
+          <a:xfrm>
+            <a:off x="228600" y="6248400"/>
+            <a:ext cx="1371600" cy="410346"/>
+          </a:xfrm>
+          <a:prstGeom prst="rect">
+            <a:avLst/>
+          </a:prstGeom>
+          <a:noFill/>
+          <a:ln w="9525">
+            <a:noFill/>
+            <a:miter lim="800000"/>
+            <a:headEnd/>
+            <a:tailEnd/>
+          </a:ln>
+          <a:effectLst/>
+        </p:spPr>
+      </p:pic>
+      <p:sp>
+        <p:nvSpPr>
+          <p:cNvPr id="10" name="TextBox 9"/>
+          <p:cNvSpPr txBox="1"/>
+          <p:nvPr/>
+        </p:nvSpPr>
+        <p:spPr>
+          <a:xfrm>
+            <a:off x="2057400" y="6324600"/>
+            <a:ext cx="4419600" cy="369332"/>
+          </a:xfrm>
+          <a:prstGeom prst="rect">
+            <a:avLst/>
+          </a:prstGeom>
+          <a:noFill/>
+        </p:spPr>
+        <p:txBody>
+          <a:bodyPr wrap="square" rtlCol="0">
+            <a:spAutoFit/>
+          </a:bodyPr>
+          <a:lstStyle/>
+          <a:p>
+            <a:r>
+              <a:rPr lang="en-US" dirty="0" smtClean="0">
+                <a:solidFill>
+                  <a:schemeClr val="bg1"/>
+                </a:solidFill>
+                <a:latin typeface="Verdana" pitchFamily="34" charset="0"/>
+                <a:ea typeface="Verdana" pitchFamily="34" charset="0"/>
+                <a:cs typeface="Verdana" pitchFamily="34" charset="0"/>
+              </a:rPr>
+              <a:t>Testing web applications &amp; services</a:t>
+            </a:r>
+            <a:endParaRPr lang="en-US" dirty="0">
+              <a:solidFill>
+                <a:schemeClr val="bg1"/>
+              </a:solidFill>
+              <a:latin typeface="Verdana" pitchFamily="34" charset="0"/>
+              <a:ea typeface="Verdana" pitchFamily="34" charset="0"/>
+              <a:cs typeface="Verdana" pitchFamily="34" charset="0"/>
+            </a:endParaRPr>
+          </a:p>
+        </p:txBody>
+      </p:sp>
+      <p:pic>
+        <p:nvPicPr>
+          <p:cNvPr id="1033" name="Picture 9"/>
+          <p:cNvPicPr>
+            <a:picLocks noChangeAspect="1" noChangeArrowheads="1"/>
+          </p:cNvPicPr>
+          <p:nvPr/>
+        </p:nvPicPr>
+        <p:blipFill>
+          <a:blip r:embed="rId4" cstate="print"/>
+          <a:srcRect/>
+          <a:stretch>
+            <a:fillRect/>
+          </a:stretch>
+        </p:blipFill>
+        <p:spPr bwMode="auto">
+          <a:xfrm>
+            <a:off x="6934202" y="6248400"/>
+            <a:ext cx="1981195" cy="431239"/>
+          </a:xfrm>
+          <a:prstGeom prst="rect">
+            <a:avLst/>
+          </a:prstGeom>
+          <a:noFill/>
+          <a:ln w="9525">
+            <a:noFill/>
+            <a:miter lim="800000"/>
+            <a:headEnd/>
+            <a:tailEnd/>
+          </a:ln>
+          <a:effectLst/>
+        </p:spPr>
+      </p:pic>
+      <p:sp>
+        <p:nvSpPr>
+          <p:cNvPr id="13" name="TextBox 12"/>
+          <p:cNvSpPr txBox="1"/>
+          <p:nvPr/>
+        </p:nvSpPr>
+        <p:spPr>
+          <a:xfrm>
+            <a:off x="7315200" y="0"/>
+            <a:ext cx="1828800" cy="584775"/>
+          </a:xfrm>
+          <a:prstGeom prst="rect">
+            <a:avLst/>
+          </a:prstGeom>
+          <a:solidFill>
+            <a:schemeClr val="bg2">
+              <a:lumMod val="75000"/>
+            </a:schemeClr>
+          </a:solidFill>
+        </p:spPr>
+        <p:txBody>
+          <a:bodyPr wrap="square" rtlCol="0">
+            <a:spAutoFit/>
+          </a:bodyPr>
+          <a:lstStyle/>
+          <a:p>
+            <a:r>
+              <a:rPr lang="en-US" sz="3200" dirty="0" smtClean="0"/>
+              <a:t>Networks</a:t>
+            </a:r>
+            <a:endParaRPr lang="en-US" sz="3200" dirty="0"/>
+          </a:p>
+        </p:txBody>
+      </p:sp>
+      <p:sp>
+        <p:nvSpPr>
+          <p:cNvPr id="8" name="TextBox 7"/>
+          <p:cNvSpPr txBox="1"/>
+          <p:nvPr/>
+        </p:nvSpPr>
+        <p:spPr>
+          <a:xfrm>
+            <a:off x="0" y="990600"/>
+            <a:ext cx="9144000" cy="830997"/>
+          </a:xfrm>
+          <a:prstGeom prst="rect">
+            <a:avLst/>
+          </a:prstGeom>
+          <a:noFill/>
+        </p:spPr>
+        <p:txBody>
+          <a:bodyPr wrap="square" rtlCol="0">
+            <a:spAutoFit/>
+          </a:bodyPr>
+          <a:lstStyle/>
+          <a:p>
+            <a:pPr algn="ctr"/>
+            <a:r>
               <a:rPr lang="en-US" sz="4800" dirty="0" smtClean="0"/>
+              <a:t>TCP/IP</a:t>
+            </a:r>
+            <a:endParaRPr lang="en-US" sz="4800" dirty="0"/>
+          </a:p>
+        </p:txBody>
+      </p:sp>
+      <p:pic>
+        <p:nvPicPr>
+          <p:cNvPr id="12" name="Picture 11" descr="tcpip-packet.jpg"/>
+          <p:cNvPicPr>
+            <a:picLocks noChangeAspect="1"/>
+          </p:cNvPicPr>
+          <p:nvPr/>
+        </p:nvPicPr>
+        <p:blipFill>
+          <a:blip r:embed="rId5" cstate="print"/>
+          <a:stretch>
+            <a:fillRect/>
+          </a:stretch>
+        </p:blipFill>
+        <p:spPr>
+          <a:xfrm>
+            <a:off x="1371600" y="1600200"/>
+            <a:ext cx="6019799" cy="4439003"/>
+          </a:xfrm>
+          <a:prstGeom prst="rect">
+            <a:avLst/>
+          </a:prstGeom>
+        </p:spPr>
+      </p:pic>
+    </p:spTree>
+  </p:cSld>
+  <p:clrMapOvr>
+    <a:masterClrMapping/>
+  </p:clrMapOvr>
+  <p:timing>
+    <p:tnLst>
+      <p:par>
+        <p:cTn id="1" dur="indefinite" restart="never" nodeType="tmRoot">
+          <p:childTnLst>
+            <p:seq concurrent="1" nextAc="seek">
+              <p:cTn id="2" dur="indefinite" nodeType="mainSeq">
+                <p:childTnLst>
+                  <p:par>
+                    <p:cTn id="3" fill="hold">
+                      <p:stCondLst>
+                        <p:cond delay="indefinite"/>
+                      </p:stCondLst>
+                      <p:childTnLst>
+                        <p:par>
+                          <p:cTn id="4" fill="hold">
+                            <p:stCondLst>
+                              <p:cond delay="0"/>
+                            </p:stCondLst>
+                            <p:childTnLst>
+                              <p:par>
+                                <p:cTn id="5" presetID="10" presetClass="entr" presetSubtype="0" fill="hold" nodeType="clickEffect">
+                                  <p:stCondLst>
+                                    <p:cond delay="0"/>
+                                  </p:stCondLst>
+                                  <p:childTnLst>
+                                    <p:set>
+                                      <p:cBhvr>
+                                        <p:cTn id="6" dur="1" fill="hold">
+                                          <p:stCondLst>
+                                            <p:cond delay="0"/>
+                                          </p:stCondLst>
+                                        </p:cTn>
+                                        <p:tgtEl>
+                                          <p:spTgt spid="12"/>
+                                        </p:tgtEl>
+                                        <p:attrNameLst>
+                                          <p:attrName>style.visibility</p:attrName>
+                                        </p:attrNameLst>
+                                      </p:cBhvr>
+                                      <p:to>
+                                        <p:strVal val="visible"/>
+                                      </p:to>
+                                    </p:set>
+                                    <p:animEffect transition="in" filter="fade">
+                                      <p:cBhvr>
+                                        <p:cTn id="7" dur="2000"/>
+                                        <p:tgtEl>
+                                          <p:spTgt spid="12"/>
+                                        </p:tgtEl>
+                                      </p:cBhvr>
+                                    </p:animEffect>
+                                  </p:childTnLst>
+                                </p:cTn>
+                              </p:par>
+                            </p:childTnLst>
+                          </p:cTn>
+                        </p:par>
+                      </p:childTnLst>
+                    </p:cTn>
+                  </p:par>
+                </p:childTnLst>
+              </p:cTn>
+              <p:prevCondLst>
+                <p:cond evt="onPrev" delay="0">
+                  <p:tgtEl>
+                    <p:sldTgt/>
+                  </p:tgtEl>
+                </p:cond>
+              </p:prevCondLst>
+              <p:nextCondLst>
+                <p:cond evt="onNext" delay="0">
+                  <p:tgtEl>
+                    <p:sldTgt/>
+                  </p:tgtEl>
+                </p:cond>
+              </p:nextCondLst>
+            </p:seq>
+          </p:childTnLst>
+        </p:cTn>
+      </p:par>
+    </p:tnLst>
+  </p:timing>
+</p:sld>
+</file>
+
+<file path=ppt/slides/slide9.xml><?xml version="1.0" encoding="utf-8"?>
+<p:sld xmlns:a="http://schemas.openxmlformats.org/drawingml/2006/main" xmlns:r="http://schemas.openxmlformats.org/officeDocument/2006/relationships" xmlns:p="http://schemas.openxmlformats.org/presentationml/2006/main">
+  <p:cSld>
+    <p:spTree>
+      <p:nvGrpSpPr>
+        <p:cNvPr id="1" name=""/>
+        <p:cNvGrpSpPr/>
+        <p:nvPr/>
+      </p:nvGrpSpPr>
+      <p:grpSpPr>
+        <a:xfrm>
+          <a:off x="0" y="0"/>
+          <a:ext cx="0" cy="0"/>
+          <a:chOff x="0" y="0"/>
+          <a:chExt cx="0" cy="0"/>
+        </a:xfrm>
+      </p:grpSpPr>
+      <p:sp>
+        <p:nvSpPr>
+          <p:cNvPr id="4" name="Rectangle 3"/>
+          <p:cNvSpPr/>
+          <p:nvPr/>
+        </p:nvSpPr>
+        <p:spPr>
+          <a:xfrm>
+            <a:off x="0" y="6096000"/>
+            <a:ext cx="9144000" cy="762000"/>
+          </a:xfrm>
+          <a:prstGeom prst="rect">
+            <a:avLst/>
+          </a:prstGeom>
+          <a:solidFill>
+            <a:schemeClr val="tx1">
+              <a:lumMod val="85000"/>
+              <a:lumOff val="15000"/>
+            </a:schemeClr>
+          </a:solidFill>
+        </p:spPr>
+        <p:style>
+          <a:lnRef idx="2">
+            <a:schemeClr val="accent1">
+              <a:shade val="50000"/>
+            </a:schemeClr>
+          </a:lnRef>
+          <a:fillRef idx="1">
+            <a:schemeClr val="accent1"/>
+          </a:fillRef>
+          <a:effectRef idx="0">
+            <a:schemeClr val="accent1"/>
+          </a:effectRef>
+          <a:fontRef idx="minor">
+            <a:schemeClr val="lt1"/>
+          </a:fontRef>
+        </p:style>
+        <p:txBody>
+          <a:bodyPr rtlCol="0" anchor="ctr"/>
+          <a:lstStyle/>
+          <a:p>
+            <a:pPr algn="ctr"/>
+            <a:endParaRPr lang="en-US"/>
+          </a:p>
+        </p:txBody>
+      </p:sp>
+      <p:pic>
+        <p:nvPicPr>
+          <p:cNvPr id="1027" name="Picture 3"/>
+          <p:cNvPicPr>
+            <a:picLocks noChangeAspect="1" noChangeArrowheads="1"/>
+          </p:cNvPicPr>
+          <p:nvPr/>
+        </p:nvPicPr>
+        <p:blipFill>
+          <a:blip r:embed="rId3" cstate="print"/>
+          <a:srcRect/>
+          <a:stretch>
+            <a:fillRect/>
+          </a:stretch>
+        </p:blipFill>
+        <p:spPr bwMode="auto">
+          <a:xfrm>
+            <a:off x="228600" y="6248400"/>
+            <a:ext cx="1371600" cy="410346"/>
+          </a:xfrm>
+          <a:prstGeom prst="rect">
+            <a:avLst/>
+          </a:prstGeom>
+          <a:noFill/>
+          <a:ln w="9525">
+            <a:noFill/>
+            <a:miter lim="800000"/>
+            <a:headEnd/>
+            <a:tailEnd/>
+          </a:ln>
+          <a:effectLst/>
+        </p:spPr>
+      </p:pic>
+      <p:sp>
+        <p:nvSpPr>
+          <p:cNvPr id="10" name="TextBox 9"/>
+          <p:cNvSpPr txBox="1"/>
+          <p:nvPr/>
+        </p:nvSpPr>
+        <p:spPr>
+          <a:xfrm>
+            <a:off x="2057400" y="6324600"/>
+            <a:ext cx="4419600" cy="369332"/>
+          </a:xfrm>
+          <a:prstGeom prst="rect">
+            <a:avLst/>
+          </a:prstGeom>
+          <a:noFill/>
+        </p:spPr>
+        <p:txBody>
+          <a:bodyPr wrap="square" rtlCol="0">
+            <a:spAutoFit/>
+          </a:bodyPr>
+          <a:lstStyle/>
+          <a:p>
+            <a:r>
+              <a:rPr lang="en-US" dirty="0" smtClean="0">
+                <a:solidFill>
+                  <a:schemeClr val="bg1"/>
+                </a:solidFill>
+                <a:latin typeface="Verdana" pitchFamily="34" charset="0"/>
+                <a:ea typeface="Verdana" pitchFamily="34" charset="0"/>
+                <a:cs typeface="Verdana" pitchFamily="34" charset="0"/>
+              </a:rPr>
+              <a:t>Testing web applications &amp; services</a:t>
+            </a:r>
+            <a:endParaRPr lang="en-US" dirty="0">
+              <a:solidFill>
+                <a:schemeClr val="bg1"/>
+              </a:solidFill>
+              <a:latin typeface="Verdana" pitchFamily="34" charset="0"/>
+              <a:ea typeface="Verdana" pitchFamily="34" charset="0"/>
+              <a:cs typeface="Verdana" pitchFamily="34" charset="0"/>
+            </a:endParaRPr>
+          </a:p>
+        </p:txBody>
+      </p:sp>
+      <p:pic>
+        <p:nvPicPr>
+          <p:cNvPr id="1033" name="Picture 9"/>
+          <p:cNvPicPr>
+            <a:picLocks noChangeAspect="1" noChangeArrowheads="1"/>
+          </p:cNvPicPr>
+          <p:nvPr/>
+        </p:nvPicPr>
+        <p:blipFill>
+          <a:blip r:embed="rId4" cstate="print"/>
+          <a:srcRect/>
+          <a:stretch>
+            <a:fillRect/>
+          </a:stretch>
+        </p:blipFill>
+        <p:spPr bwMode="auto">
+          <a:xfrm>
+            <a:off x="6934202" y="6248400"/>
+            <a:ext cx="1981195" cy="431239"/>
+          </a:xfrm>
+          <a:prstGeom prst="rect">
+            <a:avLst/>
+          </a:prstGeom>
+          <a:noFill/>
+          <a:ln w="9525">
+            <a:noFill/>
+            <a:miter lim="800000"/>
+            <a:headEnd/>
+            <a:tailEnd/>
+          </a:ln>
+          <a:effectLst/>
+        </p:spPr>
+      </p:pic>
+      <p:sp>
+        <p:nvSpPr>
+          <p:cNvPr id="13" name="TextBox 12"/>
+          <p:cNvSpPr txBox="1"/>
+          <p:nvPr/>
+        </p:nvSpPr>
+        <p:spPr>
+          <a:xfrm>
+            <a:off x="7315200" y="0"/>
+            <a:ext cx="1828800" cy="584775"/>
+          </a:xfrm>
+          <a:prstGeom prst="rect">
+            <a:avLst/>
+          </a:prstGeom>
+          <a:solidFill>
+            <a:schemeClr val="bg2">
+              <a:lumMod val="75000"/>
+            </a:schemeClr>
+          </a:solidFill>
+        </p:spPr>
+        <p:txBody>
+          <a:bodyPr wrap="square" rtlCol="0">
+            <a:spAutoFit/>
+          </a:bodyPr>
+          <a:lstStyle/>
+          <a:p>
+            <a:r>
+              <a:rPr lang="en-US" sz="3200" dirty="0" smtClean="0"/>
               <a:t>Networks</a:t>
+            </a:r>
+            <a:endParaRPr lang="en-US" sz="3200" dirty="0"/>
+          </a:p>
+        </p:txBody>
+      </p:sp>
+      <p:sp>
+        <p:nvSpPr>
+          <p:cNvPr id="8" name="TextBox 7"/>
+          <p:cNvSpPr txBox="1"/>
+          <p:nvPr/>
+        </p:nvSpPr>
+        <p:spPr>
+          <a:xfrm>
+            <a:off x="0" y="990600"/>
+            <a:ext cx="9144000" cy="830997"/>
+          </a:xfrm>
+          <a:prstGeom prst="rect">
+            <a:avLst/>
+          </a:prstGeom>
+          <a:noFill/>
+        </p:spPr>
+        <p:txBody>
+          <a:bodyPr wrap="square" rtlCol="0">
+            <a:spAutoFit/>
+          </a:bodyPr>
+          <a:lstStyle/>
+          <a:p>
+            <a:pPr algn="ctr"/>
+            <a:r>
+              <a:rPr lang="en-US" sz="4800" dirty="0" smtClean="0"/>
+              <a:t>Routing</a:t>
             </a:r>
             <a:endParaRPr lang="en-US" sz="4800" dirty="0"/>
           </a:p>

</xml_diff>

<commit_message>
testing web apps started but disorganized and incomplete.  Added routing and dns diagrams to technical understanding
</commit_message>
<xml_diff>
--- a/presentations/A technical understanding of the web.pptx
+++ b/presentations/A technical understanding of the web.pptx
@@ -5,7 +5,7 @@
     <p:sldMasterId id="2147483648" r:id="rId1"/>
   </p:sldMasterIdLst>
   <p:notesMasterIdLst>
-    <p:notesMasterId r:id="rId16"/>
+    <p:notesMasterId r:id="rId15"/>
   </p:notesMasterIdLst>
   <p:sldIdLst>
     <p:sldId id="256" r:id="rId2"/>
@@ -17,11 +17,10 @@
     <p:sldId id="262" r:id="rId8"/>
     <p:sldId id="264" r:id="rId9"/>
     <p:sldId id="265" r:id="rId10"/>
-    <p:sldId id="266" r:id="rId11"/>
-    <p:sldId id="267" r:id="rId12"/>
-    <p:sldId id="268" r:id="rId13"/>
-    <p:sldId id="272" r:id="rId14"/>
-    <p:sldId id="270" r:id="rId15"/>
+    <p:sldId id="268" r:id="rId11"/>
+    <p:sldId id="266" r:id="rId12"/>
+    <p:sldId id="267" r:id="rId13"/>
+    <p:sldId id="270" r:id="rId14"/>
   </p:sldIdLst>
   <p:sldSz cx="9144000" cy="6858000" type="screen4x3"/>
   <p:notesSz cx="6858000" cy="9144000"/>
@@ -206,7 +205,7 @@
             <a:fld id="{9FD516BE-303C-4073-A4FC-07E358FC6551}" type="datetimeFigureOut">
               <a:rPr lang="en-US" smtClean="0"/>
               <a:pPr/>
-              <a:t>3/7/2013</a:t>
+              <a:t>3/8/2013</a:t>
             </a:fld>
             <a:endParaRPr lang="en-US"/>
           </a:p>
@@ -727,15 +726,426 @@
           <a:p>
             <a:pPr lvl="0"/>
             <a:r>
+              <a:rPr lang="en-US" baseline="0" dirty="0" err="1" smtClean="0"/>
+              <a:t>Wireshark</a:t>
+            </a:r>
+            <a:r>
               <a:rPr lang="en-US" baseline="0" dirty="0" smtClean="0"/>
-              <a:t>Routing determines how data gets from computer A to Computer B</a:t>
-            </a:r>
+              <a:t> is a network analysis tool.</a:t>
+            </a:r>
+          </a:p>
+          <a:p>
+            <a:pPr lvl="0"/>
+            <a:endParaRPr lang="en-US" baseline="0" dirty="0" smtClean="0"/>
           </a:p>
           <a:p>
             <a:pPr lvl="0"/>
             <a:r>
               <a:rPr lang="en-US" baseline="0" dirty="0" smtClean="0"/>
-              <a:t>IP is the routing protocol of the internet.</a:t>
+              <a:t>It is designed for monitoring network traffic.</a:t>
+            </a:r>
+          </a:p>
+          <a:p>
+            <a:pPr lvl="0"/>
+            <a:endParaRPr lang="en-US" baseline="0" dirty="0" smtClean="0"/>
+          </a:p>
+          <a:p>
+            <a:pPr lvl="0"/>
+            <a:r>
+              <a:rPr lang="en-US" baseline="0" dirty="0" smtClean="0"/>
+              <a:t>It can be used to capture and analyze packets.</a:t>
+            </a:r>
+          </a:p>
+          <a:p>
+            <a:pPr lvl="0"/>
+            <a:endParaRPr lang="en-US" baseline="0" dirty="0" smtClean="0"/>
+          </a:p>
+          <a:p>
+            <a:pPr lvl="0"/>
+            <a:r>
+              <a:rPr lang="en-US" baseline="0" dirty="0" smtClean="0"/>
+              <a:t>Let me launch </a:t>
+            </a:r>
+            <a:r>
+              <a:rPr lang="en-US" baseline="0" dirty="0" err="1" smtClean="0"/>
+              <a:t>wireshark</a:t>
+            </a:r>
+            <a:r>
+              <a:rPr lang="en-US" baseline="0" dirty="0" smtClean="0"/>
+              <a:t>.</a:t>
+            </a:r>
+          </a:p>
+          <a:p>
+            <a:pPr lvl="0"/>
+            <a:endParaRPr lang="en-US" baseline="0" dirty="0" smtClean="0"/>
+          </a:p>
+          <a:p>
+            <a:pPr lvl="0"/>
+            <a:r>
+              <a:rPr lang="en-US" baseline="0" dirty="0" smtClean="0"/>
+              <a:t>List interfaces </a:t>
+            </a:r>
+          </a:p>
+          <a:p>
+            <a:pPr lvl="0"/>
+            <a:r>
+              <a:rPr lang="en-US" baseline="0" dirty="0" smtClean="0"/>
+              <a:t>	Use </a:t>
+            </a:r>
+            <a:r>
+              <a:rPr lang="en-US" baseline="0" dirty="0" err="1" smtClean="0"/>
+              <a:t>ipconfig</a:t>
+            </a:r>
+            <a:r>
+              <a:rPr lang="en-US" baseline="0" dirty="0" smtClean="0"/>
+              <a:t> to find the mac address of the device</a:t>
+            </a:r>
+          </a:p>
+          <a:p>
+            <a:pPr lvl="0"/>
+            <a:r>
+              <a:rPr lang="en-US" baseline="0" dirty="0" smtClean="0"/>
+              <a:t>Select the devices you want to capture network traffic from – you can also select all</a:t>
+            </a:r>
+          </a:p>
+          <a:p>
+            <a:pPr lvl="0"/>
+            <a:r>
+              <a:rPr lang="en-US" baseline="0" dirty="0" smtClean="0"/>
+              <a:t>Click start</a:t>
+            </a:r>
+          </a:p>
+          <a:p>
+            <a:pPr lvl="0"/>
+            <a:r>
+              <a:rPr lang="en-US" baseline="0" dirty="0" smtClean="0"/>
+              <a:t>Go to google.com</a:t>
+            </a:r>
+          </a:p>
+          <a:p>
+            <a:pPr lvl="0"/>
+            <a:r>
+              <a:rPr lang="en-US" baseline="0" dirty="0" smtClean="0"/>
+              <a:t>Click stop</a:t>
+            </a:r>
+          </a:p>
+          <a:p>
+            <a:pPr lvl="0"/>
+            <a:endParaRPr lang="en-US" baseline="0" dirty="0" smtClean="0"/>
+          </a:p>
+          <a:p>
+            <a:pPr lvl="0"/>
+            <a:r>
+              <a:rPr lang="en-US" baseline="0" dirty="0" smtClean="0"/>
+              <a:t>You’re likely to have a lot of background noise so you can apply filters.</a:t>
+            </a:r>
+          </a:p>
+          <a:p>
+            <a:pPr lvl="0"/>
+            <a:r>
+              <a:rPr lang="en-US" baseline="0" dirty="0" smtClean="0"/>
+              <a:t>You can filter by</a:t>
+            </a:r>
+          </a:p>
+          <a:p>
+            <a:pPr lvl="0"/>
+            <a:r>
+              <a:rPr lang="en-US" baseline="0" dirty="0" smtClean="0"/>
+              <a:t>	protocol – TCP</a:t>
+            </a:r>
+          </a:p>
+          <a:p>
+            <a:pPr lvl="0"/>
+            <a:r>
+              <a:rPr lang="en-US" baseline="0" dirty="0" smtClean="0"/>
+              <a:t>	port – 80</a:t>
+            </a:r>
+          </a:p>
+          <a:p>
+            <a:pPr lvl="0"/>
+            <a:r>
+              <a:rPr lang="en-US" baseline="0" dirty="0" smtClean="0"/>
+              <a:t>	source or destination address/ or address range</a:t>
+            </a:r>
+          </a:p>
+          <a:p>
+            <a:pPr lvl="0"/>
+            <a:r>
+              <a:rPr lang="en-US" baseline="0" dirty="0" smtClean="0"/>
+              <a:t>	host name</a:t>
+            </a:r>
+          </a:p>
+          <a:p>
+            <a:pPr lvl="0"/>
+            <a:r>
+              <a:rPr lang="en-US" baseline="0" dirty="0" smtClean="0"/>
+              <a:t>	and a bunch of other filters</a:t>
+            </a:r>
+          </a:p>
+          <a:p>
+            <a:pPr lvl="0"/>
+            <a:endParaRPr lang="en-US" baseline="0" dirty="0" smtClean="0"/>
+          </a:p>
+          <a:p>
+            <a:pPr lvl="0"/>
+            <a:r>
+              <a:rPr lang="en-US" baseline="0" dirty="0" smtClean="0"/>
+              <a:t>You can filter which packets you capture or just filter the packets displayed</a:t>
+            </a:r>
+          </a:p>
+          <a:p>
+            <a:pPr lvl="0"/>
+            <a:endParaRPr lang="en-US" baseline="0" dirty="0" smtClean="0"/>
+          </a:p>
+          <a:p>
+            <a:pPr lvl="0"/>
+            <a:r>
+              <a:rPr lang="en-US" baseline="0" dirty="0" smtClean="0"/>
+              <a:t>http://wiki.wireshark.org/DisplayFilters</a:t>
+            </a:r>
+          </a:p>
+          <a:p>
+            <a:pPr lvl="0"/>
+            <a:r>
+              <a:rPr lang="en-US" baseline="0" dirty="0" smtClean="0"/>
+              <a:t>http://wiki.wireshark.org/CaptureFilters</a:t>
+            </a:r>
+          </a:p>
+          <a:p>
+            <a:pPr lvl="0"/>
+            <a:endParaRPr lang="en-US" baseline="0" dirty="0" smtClean="0"/>
+          </a:p>
+          <a:p>
+            <a:pPr lvl="0"/>
+            <a:r>
+              <a:rPr lang="en-US" baseline="0" dirty="0" smtClean="0"/>
+              <a:t>You can see that a filter is invalid because it is red.  When it turns green, it is valid.</a:t>
+            </a:r>
+          </a:p>
+          <a:p>
+            <a:pPr lvl="0"/>
+            <a:r>
+              <a:rPr lang="en-US" baseline="0" dirty="0" smtClean="0"/>
+              <a:t>You can also build a filter using the expressions button.</a:t>
+            </a:r>
+          </a:p>
+          <a:p>
+            <a:pPr lvl="0"/>
+            <a:endParaRPr lang="en-US" baseline="0" dirty="0" smtClean="0"/>
+          </a:p>
+          <a:p>
+            <a:pPr marL="0" marR="0" lvl="0" indent="0" algn="l" defTabSz="914400" rtl="0" eaLnBrk="1" fontAlgn="auto" latinLnBrk="0" hangingPunct="1">
+              <a:lnSpc>
+                <a:spcPct val="100000"/>
+              </a:lnSpc>
+              <a:spcBef>
+                <a:spcPts val="0"/>
+              </a:spcBef>
+              <a:spcAft>
+                <a:spcPts val="0"/>
+              </a:spcAft>
+              <a:buClrTx/>
+              <a:buSzTx/>
+              <a:buFontTx/>
+              <a:buNone/>
+              <a:tabLst/>
+              <a:defRPr/>
+            </a:pPr>
+            <a:r>
+              <a:rPr lang="en-US" baseline="0" dirty="0" smtClean="0"/>
+              <a:t>The requests are at the top, and you can select each one.</a:t>
+            </a:r>
+          </a:p>
+          <a:p>
+            <a:pPr lvl="0"/>
+            <a:endParaRPr lang="en-US" baseline="0" dirty="0" smtClean="0"/>
+          </a:p>
+          <a:p>
+            <a:pPr lvl="0"/>
+            <a:r>
+              <a:rPr lang="en-US" baseline="0" dirty="0" smtClean="0"/>
+              <a:t>You can see the actual packets captured down below</a:t>
+            </a:r>
+          </a:p>
+          <a:p>
+            <a:pPr lvl="0"/>
+            <a:r>
+              <a:rPr lang="en-US" baseline="0" dirty="0" smtClean="0"/>
+              <a:t>	broken down by byte &amp; word </a:t>
+            </a:r>
+          </a:p>
+          <a:p>
+            <a:pPr lvl="0"/>
+            <a:r>
+              <a:rPr lang="en-US" baseline="0" dirty="0" smtClean="0"/>
+              <a:t>	in hex and </a:t>
+            </a:r>
+            <a:r>
+              <a:rPr lang="en-US" baseline="0" dirty="0" err="1" smtClean="0"/>
+              <a:t>ascii</a:t>
+            </a:r>
+            <a:r>
+              <a:rPr lang="en-US" baseline="0" dirty="0" smtClean="0"/>
+              <a:t> – or binary if you right click</a:t>
+            </a:r>
+          </a:p>
+          <a:p>
+            <a:pPr lvl="0"/>
+            <a:endParaRPr lang="en-US" baseline="0" dirty="0" smtClean="0"/>
+          </a:p>
+          <a:p>
+            <a:pPr lvl="0"/>
+            <a:r>
+              <a:rPr lang="en-US" baseline="0" dirty="0" smtClean="0"/>
+              <a:t>A user-friendly is in the middle, and it will highlight the section of the packets that are represented if you really need to see the raw data.</a:t>
+            </a:r>
+          </a:p>
+          <a:p>
+            <a:pPr lvl="0"/>
+            <a:endParaRPr lang="en-US" baseline="0" dirty="0" smtClean="0"/>
+          </a:p>
+          <a:p>
+            <a:pPr lvl="0"/>
+            <a:r>
+              <a:rPr lang="en-US" baseline="0" dirty="0" smtClean="0"/>
+              <a:t>You can see each message on the </a:t>
+            </a:r>
+            <a:r>
+              <a:rPr lang="en-US" baseline="0" dirty="0" err="1" smtClean="0"/>
+              <a:t>ethernet</a:t>
+            </a:r>
+            <a:r>
+              <a:rPr lang="en-US" baseline="0" dirty="0" smtClean="0"/>
+              <a:t> interface begins with the </a:t>
+            </a:r>
+            <a:r>
+              <a:rPr lang="en-US" baseline="0" dirty="0" err="1" smtClean="0"/>
+              <a:t>ethernet</a:t>
+            </a:r>
+            <a:r>
+              <a:rPr lang="en-US" baseline="0" dirty="0" smtClean="0"/>
+              <a:t> header which contains the source and destination MAC addresses.  The destination is the first router the machine is connecting to, not the destination machine.</a:t>
+            </a:r>
+          </a:p>
+          <a:p>
+            <a:pPr lvl="0"/>
+            <a:endParaRPr lang="en-US" baseline="0" dirty="0" smtClean="0"/>
+          </a:p>
+          <a:p>
+            <a:pPr lvl="0"/>
+            <a:r>
+              <a:rPr lang="en-US" baseline="0" dirty="0" smtClean="0"/>
+              <a:t>Then it has the IP header.  You can see how the header checksum is incorrect because it’s not included – it’s zero.  I think that’s an optimization.  It has the source and destination IP address.</a:t>
+            </a:r>
+          </a:p>
+          <a:p>
+            <a:pPr lvl="0"/>
+            <a:endParaRPr lang="en-US" baseline="0" dirty="0" smtClean="0"/>
+          </a:p>
+          <a:p>
+            <a:pPr lvl="0"/>
+            <a:r>
+              <a:rPr lang="en-US" baseline="0" dirty="0" smtClean="0"/>
+              <a:t>Then the TCP header which has the source and destination port.  The destination is port 80 – the standard port for HTTP on the server.  The source is a random port picked by the browser.  It creates a socket connection between these two IP addresses and ports.  </a:t>
+            </a:r>
+          </a:p>
+          <a:p>
+            <a:pPr lvl="0"/>
+            <a:endParaRPr lang="en-US" baseline="0" dirty="0" smtClean="0"/>
+          </a:p>
+          <a:p>
+            <a:pPr lvl="0"/>
+            <a:r>
+              <a:rPr lang="en-US" baseline="0" dirty="0" smtClean="0"/>
+              <a:t>IP routes it between the computers, and TCP handles the connection.  Now we’re ready to send application data.</a:t>
+            </a:r>
+          </a:p>
+          <a:p>
+            <a:pPr lvl="0"/>
+            <a:endParaRPr lang="en-US" baseline="0" dirty="0" smtClean="0"/>
+          </a:p>
+          <a:p>
+            <a:pPr lvl="0"/>
+            <a:r>
+              <a:rPr lang="en-US" baseline="0" dirty="0" smtClean="0"/>
+              <a:t>In this case, it’s HTTP.  And you can see that </a:t>
+            </a:r>
+            <a:r>
+              <a:rPr lang="en-US" baseline="0" dirty="0" err="1" smtClean="0"/>
+              <a:t>Wireshark</a:t>
+            </a:r>
+            <a:r>
+              <a:rPr lang="en-US" baseline="0" dirty="0" smtClean="0"/>
+              <a:t> understands HTTP as well.</a:t>
+            </a:r>
+          </a:p>
+          <a:p>
+            <a:pPr lvl="0"/>
+            <a:r>
+              <a:rPr lang="en-US" baseline="0" dirty="0" smtClean="0"/>
+              <a:t>The first line is the request.</a:t>
+            </a:r>
+          </a:p>
+          <a:p>
+            <a:pPr lvl="0"/>
+            <a:r>
+              <a:rPr lang="en-US" baseline="0" dirty="0" smtClean="0"/>
+              <a:t>Method == GET</a:t>
+            </a:r>
+          </a:p>
+          <a:p>
+            <a:pPr lvl="0"/>
+            <a:r>
+              <a:rPr lang="en-US" baseline="0" dirty="0" smtClean="0"/>
+              <a:t>URL == /</a:t>
+            </a:r>
+          </a:p>
+          <a:p>
+            <a:pPr lvl="0"/>
+            <a:r>
+              <a:rPr lang="en-US" baseline="0" dirty="0" smtClean="0"/>
+              <a:t>HTTP Version = 1.1</a:t>
+            </a:r>
+          </a:p>
+          <a:p>
+            <a:pPr lvl="0"/>
+            <a:endParaRPr lang="en-US" baseline="0" dirty="0" smtClean="0"/>
+          </a:p>
+          <a:p>
+            <a:pPr lvl="0"/>
+            <a:r>
+              <a:rPr lang="en-US" baseline="0" dirty="0" smtClean="0"/>
+              <a:t>Then come the headers:</a:t>
+            </a:r>
+          </a:p>
+          <a:p>
+            <a:pPr lvl="0"/>
+            <a:r>
+              <a:rPr lang="en-US" baseline="0" dirty="0" smtClean="0"/>
+              <a:t>You can see \r\n because that’s the windows newline.  Only \n is needed.</a:t>
+            </a:r>
+          </a:p>
+          <a:p>
+            <a:pPr marL="0" marR="0" lvl="0" indent="0" algn="l" defTabSz="914400" rtl="0" eaLnBrk="1" fontAlgn="auto" latinLnBrk="0" hangingPunct="1">
+              <a:lnSpc>
+                <a:spcPct val="100000"/>
+              </a:lnSpc>
+              <a:spcBef>
+                <a:spcPts val="0"/>
+              </a:spcBef>
+              <a:spcAft>
+                <a:spcPts val="0"/>
+              </a:spcAft>
+              <a:buClrTx/>
+              <a:buSzTx/>
+              <a:buFontTx/>
+              <a:buNone/>
+              <a:tabLst/>
+              <a:defRPr/>
+            </a:pPr>
+            <a:r>
+              <a:rPr lang="en-US" baseline="0" dirty="0" smtClean="0"/>
+              <a:t>Host – the destination host.  Remember when we used telnet that we got a 401 error without this.</a:t>
             </a:r>
           </a:p>
           <a:p>
@@ -778,7 +1188,7 @@
             </a:pPr>
             <a:r>
               <a:rPr lang="en-US" baseline="0" dirty="0" smtClean="0"/>
-              <a:t>Routers have a list of IP addresses and directions for how to get to them.  </a:t>
+              <a:t>Headers …etc…</a:t>
             </a:r>
           </a:p>
           <a:p>
@@ -821,7 +1231,7 @@
             </a:pPr>
             <a:r>
               <a:rPr lang="en-US" baseline="0" dirty="0" smtClean="0"/>
-              <a:t>If they don’t know, they have directions to pass it to another router that may know. They have a range of IPs and the address of a router to pass the message along to that knows how to find it.  So one router doesn’t need to know how to communicate with all computers.</a:t>
+              <a:t>If you were to post, it would also have the body of the post.</a:t>
             </a:r>
           </a:p>
           <a:p>
@@ -845,20 +1255,6 @@
             <a:endParaRPr lang="en-US" baseline="0" dirty="0" smtClean="0"/>
           </a:p>
           <a:p>
-            <a:pPr lvl="0"/>
-            <a:r>
-              <a:rPr lang="en-US" baseline="0" dirty="0" smtClean="0"/>
-              <a:t>Every computer on the internet has an IP address.</a:t>
-            </a:r>
-          </a:p>
-          <a:p>
-            <a:pPr lvl="0"/>
-            <a:r>
-              <a:rPr lang="en-US" baseline="0" dirty="0" smtClean="0"/>
-              <a:t>  </a:t>
-            </a:r>
-          </a:p>
-          <a:p>
             <a:pPr marL="0" marR="0" lvl="0" indent="0" algn="l" defTabSz="914400" rtl="0" eaLnBrk="1" fontAlgn="auto" latinLnBrk="0" hangingPunct="1">
               <a:lnSpc>
                 <a:spcPct val="100000"/>
@@ -878,29 +1274,7 @@
             </a:pPr>
             <a:r>
               <a:rPr lang="en-US" baseline="0" dirty="0" smtClean="0"/>
-              <a:t>Many computers behind private networks also have an address, because we now use IP even for private networks, though this was not always the case.  Other protocols like IPX and NetBEUI were common</a:t>
-            </a:r>
-          </a:p>
-          <a:p>
-            <a:pPr lvl="0"/>
-            <a:endParaRPr lang="en-US" baseline="0" dirty="0" smtClean="0"/>
-          </a:p>
-          <a:p>
-            <a:pPr lvl="0"/>
-            <a:r>
-              <a:rPr lang="en-US" baseline="0" dirty="0" smtClean="0"/>
-              <a:t>A router between a private network and the internet  may use Network Address Translation (NAT) to convert a private address to the public one.  There are reserved IP addresses used for this.  Such as the 10.x range, 172.16.x and 192.168..x ranges.  You could use any address but by keeping to the reserved (not routable) addresses, you prevent address pollution in case there are any mistakes in your router configuration – which is more common than you’d think.</a:t>
-            </a:r>
-          </a:p>
-          <a:p>
-            <a:pPr lvl="0"/>
-            <a:endParaRPr lang="en-US" baseline="0" dirty="0" smtClean="0"/>
-          </a:p>
-          <a:p>
-            <a:pPr lvl="0"/>
-            <a:r>
-              <a:rPr lang="en-US" baseline="0" dirty="0" smtClean="0"/>
-              <a:t>The NAT router needs to keep track of packets from machine x with a reserved address of say 10.1.2.3 and indicate that packets returned to it are routed to the right machine on it’s sub-network.  But I won’t go into that because I don’t understand it very well.</a:t>
+              <a:t>Right click on a request and click Follow TCP stream.</a:t>
             </a:r>
           </a:p>
           <a:p>
@@ -943,15 +1317,76 @@
             </a:pPr>
             <a:r>
               <a:rPr lang="en-US" baseline="0" dirty="0" smtClean="0"/>
-              <a:t>Routing isn’t a new concept.  The phone network used circuit switching to accomplish routing.  If you watch old movies where people ask the operator to connect them and the operator says “one moment please” – that’s routing.  It started off with people (typically women, because they had more pleasant voices – and were found to make fewer mistakes) actually pulling one wire out of a socket and plugging it into another socket.  First to connect 2 phones physically with one wire circuit, then to connect different exchanges, </a:t>
-            </a:r>
-            <a:r>
-              <a:rPr lang="en-US" baseline="0" dirty="0" err="1" smtClean="0"/>
-              <a:t>i.e..different</a:t>
-            </a:r>
+              <a:t>Cookies</a:t>
+            </a:r>
+          </a:p>
+          <a:p>
+            <a:pPr marL="0" marR="0" lvl="0" indent="0" algn="l" defTabSz="914400" rtl="0" eaLnBrk="1" fontAlgn="auto" latinLnBrk="0" hangingPunct="1">
+              <a:lnSpc>
+                <a:spcPct val="100000"/>
+              </a:lnSpc>
+              <a:spcBef>
+                <a:spcPts val="0"/>
+              </a:spcBef>
+              <a:spcAft>
+                <a:spcPts val="0"/>
+              </a:spcAft>
+              <a:buClrTx/>
+              <a:buSzTx/>
+              <a:buFontTx/>
+              <a:buNone/>
+              <a:tabLst/>
+              <a:defRPr/>
+            </a:pPr>
             <a:r>
               <a:rPr lang="en-US" baseline="0" dirty="0" smtClean="0"/>
-              <a:t> cities.  One operator would have to call another operator to make the connection.  This was called hopping, and we still count hops between routers today.</a:t>
+              <a:t>Form Data</a:t>
+            </a:r>
+          </a:p>
+          <a:p>
+            <a:pPr marL="0" marR="0" lvl="0" indent="0" algn="l" defTabSz="914400" rtl="0" eaLnBrk="1" fontAlgn="auto" latinLnBrk="0" hangingPunct="1">
+              <a:lnSpc>
+                <a:spcPct val="100000"/>
+              </a:lnSpc>
+              <a:spcBef>
+                <a:spcPts val="0"/>
+              </a:spcBef>
+              <a:spcAft>
+                <a:spcPts val="0"/>
+              </a:spcAft>
+              <a:buClrTx/>
+              <a:buSzTx/>
+              <a:buFontTx/>
+              <a:buNone/>
+              <a:tabLst/>
+              <a:defRPr/>
+            </a:pPr>
+            <a:r>
+              <a:rPr lang="en-US" baseline="0" dirty="0" smtClean="0"/>
+              <a:t>Authentication &amp; Authorization</a:t>
+            </a:r>
+          </a:p>
+          <a:p>
+            <a:pPr marL="0" marR="0" lvl="0" indent="0" algn="l" defTabSz="914400" rtl="0" eaLnBrk="1" fontAlgn="auto" latinLnBrk="0" hangingPunct="1">
+              <a:lnSpc>
+                <a:spcPct val="100000"/>
+              </a:lnSpc>
+              <a:spcBef>
+                <a:spcPts val="0"/>
+              </a:spcBef>
+              <a:spcAft>
+                <a:spcPts val="0"/>
+              </a:spcAft>
+              <a:buClrTx/>
+              <a:buSzTx/>
+              <a:buFontTx/>
+              <a:buNone/>
+              <a:tabLst/>
+              <a:defRPr/>
+            </a:pPr>
+            <a:r>
+              <a:rPr lang="en-US" baseline="0" dirty="0" smtClean="0"/>
+              <a:t>HTTPS</a:t>
             </a:r>
           </a:p>
           <a:p>
@@ -992,11 +1427,183 @@
               <a:tabLst/>
               <a:defRPr/>
             </a:pPr>
+            <a:r>
+              <a:rPr lang="en-US" baseline="0" dirty="0" smtClean="0"/>
+              <a:t>Listen to </a:t>
+            </a:r>
+            <a:r>
+              <a:rPr lang="en-US" baseline="0" dirty="0" err="1" smtClean="0"/>
+              <a:t>wifi</a:t>
+            </a:r>
+            <a:r>
+              <a:rPr lang="en-US" baseline="0" dirty="0" smtClean="0"/>
+              <a:t> only</a:t>
+            </a:r>
+          </a:p>
+          <a:p>
+            <a:pPr marL="0" marR="0" lvl="0" indent="0" algn="l" defTabSz="914400" rtl="0" eaLnBrk="1" fontAlgn="auto" latinLnBrk="0" hangingPunct="1">
+              <a:lnSpc>
+                <a:spcPct val="100000"/>
+              </a:lnSpc>
+              <a:spcBef>
+                <a:spcPts val="0"/>
+              </a:spcBef>
+              <a:spcAft>
+                <a:spcPts val="0"/>
+              </a:spcAft>
+              <a:buClrTx/>
+              <a:buSzTx/>
+              <a:buFontTx/>
+              <a:buNone/>
+              <a:tabLst/>
+              <a:defRPr/>
+            </a:pPr>
             <a:endParaRPr lang="en-US" baseline="0" dirty="0" smtClean="0"/>
           </a:p>
           <a:p>
-            <a:pPr lvl="0"/>
+            <a:pPr marL="0" marR="0" lvl="0" indent="0" algn="l" defTabSz="914400" rtl="0" eaLnBrk="1" fontAlgn="auto" latinLnBrk="0" hangingPunct="1">
+              <a:lnSpc>
+                <a:spcPct val="100000"/>
+              </a:lnSpc>
+              <a:spcBef>
+                <a:spcPts val="0"/>
+              </a:spcBef>
+              <a:spcAft>
+                <a:spcPts val="0"/>
+              </a:spcAft>
+              <a:buClrTx/>
+              <a:buSzTx/>
+              <a:buFontTx/>
+              <a:buNone/>
+              <a:tabLst/>
+              <a:defRPr/>
+            </a:pPr>
+            <a:r>
+              <a:rPr lang="en-US" baseline="0" dirty="0" smtClean="0"/>
+              <a:t>Filter</a:t>
+            </a:r>
+          </a:p>
+          <a:p>
+            <a:pPr marL="0" marR="0" lvl="0" indent="0" algn="l" defTabSz="914400" rtl="0" eaLnBrk="1" fontAlgn="auto" latinLnBrk="0" hangingPunct="1">
+              <a:lnSpc>
+                <a:spcPct val="100000"/>
+              </a:lnSpc>
+              <a:spcBef>
+                <a:spcPts val="0"/>
+              </a:spcBef>
+              <a:spcAft>
+                <a:spcPts val="0"/>
+              </a:spcAft>
+              <a:buClrTx/>
+              <a:buSzTx/>
+              <a:buFontTx/>
+              <a:buNone/>
+              <a:tabLst/>
+              <a:defRPr/>
+            </a:pPr>
+            <a:r>
+              <a:rPr lang="en-US" baseline="0" dirty="0" err="1" smtClean="0"/>
+              <a:t>tcp</a:t>
+            </a:r>
             <a:endParaRPr lang="en-US" baseline="0" dirty="0" smtClean="0"/>
+          </a:p>
+          <a:p>
+            <a:pPr marL="0" marR="0" lvl="0" indent="0" algn="l" defTabSz="914400" rtl="0" eaLnBrk="1" fontAlgn="auto" latinLnBrk="0" hangingPunct="1">
+              <a:lnSpc>
+                <a:spcPct val="100000"/>
+              </a:lnSpc>
+              <a:spcBef>
+                <a:spcPts val="0"/>
+              </a:spcBef>
+              <a:spcAft>
+                <a:spcPts val="0"/>
+              </a:spcAft>
+              <a:buClrTx/>
+              <a:buSzTx/>
+              <a:buFontTx/>
+              <a:buNone/>
+              <a:tabLst/>
+              <a:defRPr/>
+            </a:pPr>
+            <a:r>
+              <a:rPr lang="en-US" baseline="0" dirty="0" smtClean="0"/>
+              <a:t>http</a:t>
+            </a:r>
+          </a:p>
+          <a:p>
+            <a:pPr marL="0" marR="0" lvl="0" indent="0" algn="l" defTabSz="914400" rtl="0" eaLnBrk="1" fontAlgn="auto" latinLnBrk="0" hangingPunct="1">
+              <a:lnSpc>
+                <a:spcPct val="100000"/>
+              </a:lnSpc>
+              <a:spcBef>
+                <a:spcPts val="0"/>
+              </a:spcBef>
+              <a:spcAft>
+                <a:spcPts val="0"/>
+              </a:spcAft>
+              <a:buClrTx/>
+              <a:buSzTx/>
+              <a:buFontTx/>
+              <a:buNone/>
+              <a:tabLst/>
+              <a:defRPr/>
+            </a:pPr>
+            <a:r>
+              <a:rPr lang="en-US" baseline="0" dirty="0" err="1" smtClean="0"/>
+              <a:t>http.host</a:t>
+            </a:r>
+            <a:endParaRPr lang="en-US" baseline="0" dirty="0" smtClean="0"/>
+          </a:p>
+          <a:p>
+            <a:pPr marL="0" marR="0" lvl="0" indent="0" algn="l" defTabSz="914400" rtl="0" eaLnBrk="1" fontAlgn="auto" latinLnBrk="0" hangingPunct="1">
+              <a:lnSpc>
+                <a:spcPct val="100000"/>
+              </a:lnSpc>
+              <a:spcBef>
+                <a:spcPts val="0"/>
+              </a:spcBef>
+              <a:spcAft>
+                <a:spcPts val="0"/>
+              </a:spcAft>
+              <a:buClrTx/>
+              <a:buSzTx/>
+              <a:buFontTx/>
+              <a:buNone/>
+              <a:tabLst/>
+              <a:defRPr/>
+            </a:pPr>
+            <a:r>
+              <a:rPr lang="en-US" baseline="0" dirty="0" err="1" smtClean="0"/>
+              <a:t>src.ip</a:t>
+            </a:r>
+            <a:endParaRPr lang="en-US" baseline="0" dirty="0" smtClean="0"/>
+          </a:p>
+          <a:p>
+            <a:pPr marL="0" marR="0" lvl="0" indent="0" algn="l" defTabSz="914400" rtl="0" eaLnBrk="1" fontAlgn="auto" latinLnBrk="0" hangingPunct="1">
+              <a:lnSpc>
+                <a:spcPct val="100000"/>
+              </a:lnSpc>
+              <a:spcBef>
+                <a:spcPts val="0"/>
+              </a:spcBef>
+              <a:spcAft>
+                <a:spcPts val="0"/>
+              </a:spcAft>
+              <a:buClrTx/>
+              <a:buSzTx/>
+              <a:buFontTx/>
+              <a:buNone/>
+              <a:tabLst/>
+              <a:defRPr/>
+            </a:pPr>
+            <a:endParaRPr lang="en-US" baseline="0" dirty="0" smtClean="0"/>
+          </a:p>
+          <a:p>
+            <a:pPr lvl="0"/>
+            <a:r>
+              <a:rPr lang="en-US" baseline="0" dirty="0" smtClean="0"/>
+              <a:t>Promiscuous mode </a:t>
+            </a:r>
           </a:p>
           <a:p>
             <a:pPr lvl="0"/>
@@ -1083,6 +1690,280 @@
           <a:lstStyle/>
           <a:p>
             <a:pPr lvl="0"/>
+            <a:r>
+              <a:rPr lang="en-US" baseline="0" dirty="0" smtClean="0"/>
+              <a:t>Routing determines how data gets from computer A to Computer B</a:t>
+            </a:r>
+          </a:p>
+          <a:p>
+            <a:pPr lvl="0"/>
+            <a:r>
+              <a:rPr lang="en-US" baseline="0" dirty="0" smtClean="0"/>
+              <a:t>IP is the routing protocol of the internet.</a:t>
+            </a:r>
+          </a:p>
+          <a:p>
+            <a:pPr marL="0" marR="0" lvl="0" indent="0" algn="l" defTabSz="914400" rtl="0" eaLnBrk="1" fontAlgn="auto" latinLnBrk="0" hangingPunct="1">
+              <a:lnSpc>
+                <a:spcPct val="100000"/>
+              </a:lnSpc>
+              <a:spcBef>
+                <a:spcPts val="0"/>
+              </a:spcBef>
+              <a:spcAft>
+                <a:spcPts val="0"/>
+              </a:spcAft>
+              <a:buClrTx/>
+              <a:buSzTx/>
+              <a:buFontTx/>
+              <a:buNone/>
+              <a:tabLst/>
+              <a:defRPr/>
+            </a:pPr>
+            <a:endParaRPr lang="en-US" baseline="0" dirty="0" smtClean="0"/>
+          </a:p>
+          <a:p>
+            <a:pPr marL="0" marR="0" lvl="0" indent="0" algn="l" defTabSz="914400" rtl="0" eaLnBrk="1" fontAlgn="auto" latinLnBrk="0" hangingPunct="1">
+              <a:lnSpc>
+                <a:spcPct val="100000"/>
+              </a:lnSpc>
+              <a:spcBef>
+                <a:spcPts val="0"/>
+              </a:spcBef>
+              <a:spcAft>
+                <a:spcPts val="0"/>
+              </a:spcAft>
+              <a:buClrTx/>
+              <a:buSzTx/>
+              <a:buFontTx/>
+              <a:buNone/>
+              <a:tabLst/>
+              <a:defRPr/>
+            </a:pPr>
+            <a:r>
+              <a:rPr lang="en-US" baseline="0" dirty="0" smtClean="0"/>
+              <a:t>Routers have a list of IP addresses and directions for how to get to them.  </a:t>
+            </a:r>
+          </a:p>
+          <a:p>
+            <a:pPr marL="0" marR="0" lvl="0" indent="0" algn="l" defTabSz="914400" rtl="0" eaLnBrk="1" fontAlgn="auto" latinLnBrk="0" hangingPunct="1">
+              <a:lnSpc>
+                <a:spcPct val="100000"/>
+              </a:lnSpc>
+              <a:spcBef>
+                <a:spcPts val="0"/>
+              </a:spcBef>
+              <a:spcAft>
+                <a:spcPts val="0"/>
+              </a:spcAft>
+              <a:buClrTx/>
+              <a:buSzTx/>
+              <a:buFontTx/>
+              <a:buNone/>
+              <a:tabLst/>
+              <a:defRPr/>
+            </a:pPr>
+            <a:endParaRPr lang="en-US" baseline="0" dirty="0" smtClean="0"/>
+          </a:p>
+          <a:p>
+            <a:pPr marL="0" marR="0" lvl="0" indent="0" algn="l" defTabSz="914400" rtl="0" eaLnBrk="1" fontAlgn="auto" latinLnBrk="0" hangingPunct="1">
+              <a:lnSpc>
+                <a:spcPct val="100000"/>
+              </a:lnSpc>
+              <a:spcBef>
+                <a:spcPts val="0"/>
+              </a:spcBef>
+              <a:spcAft>
+                <a:spcPts val="0"/>
+              </a:spcAft>
+              <a:buClrTx/>
+              <a:buSzTx/>
+              <a:buFontTx/>
+              <a:buNone/>
+              <a:tabLst/>
+              <a:defRPr/>
+            </a:pPr>
+            <a:r>
+              <a:rPr lang="en-US" baseline="0" dirty="0" smtClean="0"/>
+              <a:t>If they don’t know, they have directions to pass it to another router that may know. They have a range of IPs and the address of a router to pass the message along to that knows how to find it.  So one router doesn’t need to know how to communicate with all computers.</a:t>
+            </a:r>
+          </a:p>
+          <a:p>
+            <a:pPr marL="0" marR="0" lvl="0" indent="0" algn="l" defTabSz="914400" rtl="0" eaLnBrk="1" fontAlgn="auto" latinLnBrk="0" hangingPunct="1">
+              <a:lnSpc>
+                <a:spcPct val="100000"/>
+              </a:lnSpc>
+              <a:spcBef>
+                <a:spcPts val="0"/>
+              </a:spcBef>
+              <a:spcAft>
+                <a:spcPts val="0"/>
+              </a:spcAft>
+              <a:buClrTx/>
+              <a:buSzTx/>
+              <a:buFontTx/>
+              <a:buNone/>
+              <a:tabLst/>
+              <a:defRPr/>
+            </a:pPr>
+            <a:endParaRPr lang="en-US" baseline="0" dirty="0" smtClean="0"/>
+          </a:p>
+          <a:p>
+            <a:pPr lvl="0"/>
+            <a:r>
+              <a:rPr lang="en-US" baseline="0" dirty="0" smtClean="0"/>
+              <a:t>Every computer on the internet has an IP address.</a:t>
+            </a:r>
+          </a:p>
+          <a:p>
+            <a:pPr lvl="0"/>
+            <a:r>
+              <a:rPr lang="en-US" baseline="0" dirty="0" smtClean="0"/>
+              <a:t>  </a:t>
+            </a:r>
+          </a:p>
+          <a:p>
+            <a:pPr marL="0" marR="0" lvl="0" indent="0" algn="l" defTabSz="914400" rtl="0" eaLnBrk="1" fontAlgn="auto" latinLnBrk="0" hangingPunct="1">
+              <a:lnSpc>
+                <a:spcPct val="100000"/>
+              </a:lnSpc>
+              <a:spcBef>
+                <a:spcPts val="0"/>
+              </a:spcBef>
+              <a:spcAft>
+                <a:spcPts val="0"/>
+              </a:spcAft>
+              <a:buClrTx/>
+              <a:buSzTx/>
+              <a:buFontTx/>
+              <a:buNone/>
+              <a:tabLst/>
+              <a:defRPr/>
+            </a:pPr>
+            <a:r>
+              <a:rPr lang="en-US" baseline="0" dirty="0" smtClean="0"/>
+              <a:t>Many computers behind private networks also have an address, because we now use IP even for private networks, though this was not always the case.  Other protocols like IPX and NetBEUI were common</a:t>
+            </a:r>
+          </a:p>
+          <a:p>
+            <a:pPr lvl="0"/>
+            <a:endParaRPr lang="en-US" baseline="0" dirty="0" smtClean="0"/>
+          </a:p>
+          <a:p>
+            <a:pPr lvl="0"/>
+            <a:r>
+              <a:rPr lang="en-US" baseline="0" dirty="0" smtClean="0"/>
+              <a:t>A router between a private network and the internet  may use Network Address Translation (NAT) to convert a private address to the public one.  There are reserved IP addresses used for this.  Such as the 10.x range, 172.16.x and 192.168..x ranges.  You could use any address but by keeping to the reserved (not routable) addresses, you prevent address pollution in case there are any mistakes in your router configuration – which is more common than you’d think.</a:t>
+            </a:r>
+          </a:p>
+          <a:p>
+            <a:pPr lvl="0"/>
+            <a:endParaRPr lang="en-US" baseline="0" dirty="0" smtClean="0"/>
+          </a:p>
+          <a:p>
+            <a:pPr lvl="0"/>
+            <a:r>
+              <a:rPr lang="en-US" baseline="0" dirty="0" smtClean="0"/>
+              <a:t>The NAT router needs to keep track of packets from machine x with a reserved address of say 10.1.2.3 and indicate that packets returned to it are routed to the right machine on it’s sub-network.  But I won’t go into that because I don’t understand it very well.</a:t>
+            </a:r>
+          </a:p>
+          <a:p>
+            <a:pPr marL="0" marR="0" lvl="0" indent="0" algn="l" defTabSz="914400" rtl="0" eaLnBrk="1" fontAlgn="auto" latinLnBrk="0" hangingPunct="1">
+              <a:lnSpc>
+                <a:spcPct val="100000"/>
+              </a:lnSpc>
+              <a:spcBef>
+                <a:spcPts val="0"/>
+              </a:spcBef>
+              <a:spcAft>
+                <a:spcPts val="0"/>
+              </a:spcAft>
+              <a:buClrTx/>
+              <a:buSzTx/>
+              <a:buFontTx/>
+              <a:buNone/>
+              <a:tabLst/>
+              <a:defRPr/>
+            </a:pPr>
+            <a:endParaRPr lang="en-US" baseline="0" dirty="0" smtClean="0"/>
+          </a:p>
+          <a:p>
+            <a:pPr marL="0" marR="0" lvl="0" indent="0" algn="l" defTabSz="914400" rtl="0" eaLnBrk="1" fontAlgn="auto" latinLnBrk="0" hangingPunct="1">
+              <a:lnSpc>
+                <a:spcPct val="100000"/>
+              </a:lnSpc>
+              <a:spcBef>
+                <a:spcPts val="0"/>
+              </a:spcBef>
+              <a:spcAft>
+                <a:spcPts val="0"/>
+              </a:spcAft>
+              <a:buClrTx/>
+              <a:buSzTx/>
+              <a:buFontTx/>
+              <a:buNone/>
+              <a:tabLst/>
+              <a:defRPr/>
+            </a:pPr>
+            <a:r>
+              <a:rPr lang="en-US" baseline="0" dirty="0" smtClean="0"/>
+              <a:t>Routing isn’t a new concept.  The phone network used circuit switching to accomplish routing.  If you watch old movies where people ask the operator to connect them and the operator says “one moment please” – that’s routing.  It started off with people (typically women, because they had more pleasant voices – and were found to make fewer mistakes) actually pulling one wire out of a socket and plugging it into another socket.  First to connect 2 phones physically with one wire circuit, then to connect different exchanges, </a:t>
+            </a:r>
+            <a:r>
+              <a:rPr lang="en-US" baseline="0" dirty="0" err="1" smtClean="0"/>
+              <a:t>i.e..different</a:t>
+            </a:r>
+            <a:r>
+              <a:rPr lang="en-US" baseline="0" dirty="0" smtClean="0"/>
+              <a:t> cities.  One operator would have to call another operator to make the connection.  This was called hopping, and we still count hops between routers today.</a:t>
+            </a:r>
+          </a:p>
+          <a:p>
+            <a:pPr marL="0" marR="0" lvl="0" indent="0" algn="l" defTabSz="914400" rtl="0" eaLnBrk="1" fontAlgn="auto" latinLnBrk="0" hangingPunct="1">
+              <a:lnSpc>
+                <a:spcPct val="100000"/>
+              </a:lnSpc>
+              <a:spcBef>
+                <a:spcPts val="0"/>
+              </a:spcBef>
+              <a:spcAft>
+                <a:spcPts val="0"/>
+              </a:spcAft>
+              <a:buClrTx/>
+              <a:buSzTx/>
+              <a:buFontTx/>
+              <a:buNone/>
+              <a:tabLst/>
+              <a:defRPr/>
+            </a:pPr>
+            <a:endParaRPr lang="en-US" baseline="0" dirty="0" smtClean="0"/>
+          </a:p>
+          <a:p>
+            <a:pPr marL="0" marR="0" lvl="0" indent="0" algn="l" defTabSz="914400" rtl="0" eaLnBrk="1" fontAlgn="auto" latinLnBrk="0" hangingPunct="1">
+              <a:lnSpc>
+                <a:spcPct val="100000"/>
+              </a:lnSpc>
+              <a:spcBef>
+                <a:spcPts val="0"/>
+              </a:spcBef>
+              <a:spcAft>
+                <a:spcPts val="0"/>
+              </a:spcAft>
+              <a:buClrTx/>
+              <a:buSzTx/>
+              <a:buFontTx/>
+              <a:buNone/>
+              <a:tabLst/>
+              <a:defRPr/>
+            </a:pPr>
+            <a:endParaRPr lang="en-US" baseline="0" dirty="0" smtClean="0"/>
+          </a:p>
+          <a:p>
+            <a:pPr lvl="0"/>
+            <a:endParaRPr lang="en-US" baseline="0" dirty="0" smtClean="0"/>
+          </a:p>
+          <a:p>
+            <a:pPr lvl="0"/>
             <a:endParaRPr lang="en-US" baseline="0" dirty="0" smtClean="0"/>
           </a:p>
         </p:txBody>
@@ -1166,10 +2047,6 @@
           <a:lstStyle/>
           <a:p>
             <a:pPr lvl="0"/>
-            <a:r>
-              <a:rPr lang="en-US" baseline="0" dirty="0" smtClean="0"/>
-              <a:t>.</a:t>
-            </a:r>
             <a:endParaRPr lang="en-US" baseline="0" dirty="0" smtClean="0"/>
           </a:p>
         </p:txBody>
@@ -1253,10 +2130,6 @@
           <a:lstStyle/>
           <a:p>
             <a:pPr lvl="0"/>
-            <a:r>
-              <a:rPr lang="en-US" baseline="0" dirty="0" smtClean="0"/>
-              <a:t>.</a:t>
-            </a:r>
             <a:endParaRPr lang="en-US" baseline="0" dirty="0" smtClean="0"/>
           </a:p>
         </p:txBody>
@@ -1280,89 +2153,6 @@
               <a:rPr lang="en-US" smtClean="0"/>
               <a:pPr/>
               <a:t>13</a:t>
-            </a:fld>
-            <a:endParaRPr lang="en-US"/>
-          </a:p>
-        </p:txBody>
-      </p:sp>
-    </p:spTree>
-  </p:cSld>
-  <p:clrMapOvr>
-    <a:masterClrMapping/>
-  </p:clrMapOvr>
-</p:notes>
-</file>
-
-<file path=ppt/notesSlides/notesSlide14.xml><?xml version="1.0" encoding="utf-8"?>
-<p:notes xmlns:a="http://schemas.openxmlformats.org/drawingml/2006/main" xmlns:r="http://schemas.openxmlformats.org/officeDocument/2006/relationships" xmlns:p="http://schemas.openxmlformats.org/presentationml/2006/main">
-  <p:cSld>
-    <p:spTree>
-      <p:nvGrpSpPr>
-        <p:cNvPr id="1" name=""/>
-        <p:cNvGrpSpPr/>
-        <p:nvPr/>
-      </p:nvGrpSpPr>
-      <p:grpSpPr>
-        <a:xfrm>
-          <a:off x="0" y="0"/>
-          <a:ext cx="0" cy="0"/>
-          <a:chOff x="0" y="0"/>
-          <a:chExt cx="0" cy="0"/>
-        </a:xfrm>
-      </p:grpSpPr>
-      <p:sp>
-        <p:nvSpPr>
-          <p:cNvPr id="2" name="Slide Image Placeholder 1"/>
-          <p:cNvSpPr>
-            <a:spLocks noGrp="1" noRot="1" noChangeAspect="1"/>
-          </p:cNvSpPr>
-          <p:nvPr>
-            <p:ph type="sldImg"/>
-          </p:nvPr>
-        </p:nvSpPr>
-        <p:spPr/>
-      </p:sp>
-      <p:sp>
-        <p:nvSpPr>
-          <p:cNvPr id="3" name="Notes Placeholder 2"/>
-          <p:cNvSpPr>
-            <a:spLocks noGrp="1"/>
-          </p:cNvSpPr>
-          <p:nvPr>
-            <p:ph type="body" idx="1"/>
-          </p:nvPr>
-        </p:nvSpPr>
-        <p:spPr/>
-        <p:txBody>
-          <a:bodyPr>
-            <a:normAutofit lnSpcReduction="10000"/>
-          </a:bodyPr>
-          <a:lstStyle/>
-          <a:p>
-            <a:pPr lvl="0"/>
-            <a:endParaRPr lang="en-US" baseline="0" dirty="0" smtClean="0"/>
-          </a:p>
-        </p:txBody>
-      </p:sp>
-      <p:sp>
-        <p:nvSpPr>
-          <p:cNvPr id="4" name="Slide Number Placeholder 3"/>
-          <p:cNvSpPr>
-            <a:spLocks noGrp="1"/>
-          </p:cNvSpPr>
-          <p:nvPr>
-            <p:ph type="sldNum" sz="quarter" idx="10"/>
-          </p:nvPr>
-        </p:nvSpPr>
-        <p:spPr/>
-        <p:txBody>
-          <a:bodyPr/>
-          <a:lstStyle/>
-          <a:p>
-            <a:fld id="{2468E330-6F11-4EB8-9125-0BEE82D16730}" type="slidenum">
-              <a:rPr lang="en-US" smtClean="0"/>
-              <a:pPr/>
-              <a:t>14</a:t>
             </a:fld>
             <a:endParaRPr lang="en-US"/>
           </a:p>
@@ -4006,38 +4796,18 @@
             <a:pPr lvl="0"/>
             <a:r>
               <a:rPr lang="en-US" baseline="0" dirty="0" smtClean="0"/>
-              <a:t>You can see from this diagram of a TCP/IP packet, the IP Header has the source and destination address</a:t>
-            </a:r>
+              <a:t>You can see from this diagram of a TCP/IP packet, the IP Header has the source and destination address.</a:t>
+            </a:r>
+          </a:p>
+          <a:p>
+            <a:pPr lvl="0"/>
+            <a:endParaRPr lang="en-US" baseline="0" dirty="0" smtClean="0"/>
+          </a:p>
+          <a:p>
+            <a:pPr lvl="0"/>
             <a:r>
               <a:rPr lang="en-US" baseline="0" dirty="0" smtClean="0"/>
-              <a:t>.</a:t>
-            </a:r>
-          </a:p>
-          <a:p>
-            <a:pPr lvl="0"/>
-            <a:endParaRPr lang="en-US" baseline="0" dirty="0" smtClean="0"/>
-          </a:p>
-          <a:p>
-            <a:pPr lvl="0"/>
-            <a:r>
-              <a:rPr lang="en-US" baseline="0" dirty="0" smtClean="0"/>
-              <a:t>The </a:t>
-            </a:r>
-            <a:r>
-              <a:rPr lang="en-US" baseline="0" dirty="0" smtClean="0"/>
-              <a:t>IP address </a:t>
-            </a:r>
-            <a:r>
-              <a:rPr lang="en-US" baseline="0" dirty="0" smtClean="0"/>
-              <a:t>is used to identify machines on a network and by routers </a:t>
-            </a:r>
-            <a:r>
-              <a:rPr lang="en-US" baseline="0" dirty="0" smtClean="0"/>
-              <a:t>to transport a packet between networks</a:t>
-            </a:r>
-            <a:r>
-              <a:rPr lang="en-US" baseline="0" dirty="0" smtClean="0"/>
-              <a:t>.</a:t>
+              <a:t>The IP address is used to identify machines on a network and by routers to transport a packet between networks.</a:t>
             </a:r>
           </a:p>
           <a:p>
@@ -4598,7 +5368,7 @@
             <a:fld id="{D6E9E5ED-425F-4E07-BCD6-7E079AD34B1B}" type="datetimeFigureOut">
               <a:rPr lang="en-US" smtClean="0"/>
               <a:pPr/>
-              <a:t>3/7/2013</a:t>
+              <a:t>3/8/2013</a:t>
             </a:fld>
             <a:endParaRPr lang="en-US"/>
           </a:p>
@@ -4765,7 +5535,7 @@
             <a:fld id="{D6E9E5ED-425F-4E07-BCD6-7E079AD34B1B}" type="datetimeFigureOut">
               <a:rPr lang="en-US" smtClean="0"/>
               <a:pPr/>
-              <a:t>3/7/2013</a:t>
+              <a:t>3/8/2013</a:t>
             </a:fld>
             <a:endParaRPr lang="en-US"/>
           </a:p>
@@ -4942,7 +5712,7 @@
             <a:fld id="{D6E9E5ED-425F-4E07-BCD6-7E079AD34B1B}" type="datetimeFigureOut">
               <a:rPr lang="en-US" smtClean="0"/>
               <a:pPr/>
-              <a:t>3/7/2013</a:t>
+              <a:t>3/8/2013</a:t>
             </a:fld>
             <a:endParaRPr lang="en-US"/>
           </a:p>
@@ -5109,7 +5879,7 @@
             <a:fld id="{D6E9E5ED-425F-4E07-BCD6-7E079AD34B1B}" type="datetimeFigureOut">
               <a:rPr lang="en-US" smtClean="0"/>
               <a:pPr/>
-              <a:t>3/7/2013</a:t>
+              <a:t>3/8/2013</a:t>
             </a:fld>
             <a:endParaRPr lang="en-US"/>
           </a:p>
@@ -5352,7 +6122,7 @@
             <a:fld id="{D6E9E5ED-425F-4E07-BCD6-7E079AD34B1B}" type="datetimeFigureOut">
               <a:rPr lang="en-US" smtClean="0"/>
               <a:pPr/>
-              <a:t>3/7/2013</a:t>
+              <a:t>3/8/2013</a:t>
             </a:fld>
             <a:endParaRPr lang="en-US"/>
           </a:p>
@@ -5637,7 +6407,7 @@
             <a:fld id="{D6E9E5ED-425F-4E07-BCD6-7E079AD34B1B}" type="datetimeFigureOut">
               <a:rPr lang="en-US" smtClean="0"/>
               <a:pPr/>
-              <a:t>3/7/2013</a:t>
+              <a:t>3/8/2013</a:t>
             </a:fld>
             <a:endParaRPr lang="en-US"/>
           </a:p>
@@ -6056,7 +6826,7 @@
             <a:fld id="{D6E9E5ED-425F-4E07-BCD6-7E079AD34B1B}" type="datetimeFigureOut">
               <a:rPr lang="en-US" smtClean="0"/>
               <a:pPr/>
-              <a:t>3/7/2013</a:t>
+              <a:t>3/8/2013</a:t>
             </a:fld>
             <a:endParaRPr lang="en-US"/>
           </a:p>
@@ -6171,7 +6941,7 @@
             <a:fld id="{D6E9E5ED-425F-4E07-BCD6-7E079AD34B1B}" type="datetimeFigureOut">
               <a:rPr lang="en-US" smtClean="0"/>
               <a:pPr/>
-              <a:t>3/7/2013</a:t>
+              <a:t>3/8/2013</a:t>
             </a:fld>
             <a:endParaRPr lang="en-US"/>
           </a:p>
@@ -6263,7 +7033,7 @@
             <a:fld id="{D6E9E5ED-425F-4E07-BCD6-7E079AD34B1B}" type="datetimeFigureOut">
               <a:rPr lang="en-US" smtClean="0"/>
               <a:pPr/>
-              <a:t>3/7/2013</a:t>
+              <a:t>3/8/2013</a:t>
             </a:fld>
             <a:endParaRPr lang="en-US"/>
           </a:p>
@@ -6537,7 +7307,7 @@
             <a:fld id="{D6E9E5ED-425F-4E07-BCD6-7E079AD34B1B}" type="datetimeFigureOut">
               <a:rPr lang="en-US" smtClean="0"/>
               <a:pPr/>
-              <a:t>3/7/2013</a:t>
+              <a:t>3/8/2013</a:t>
             </a:fld>
             <a:endParaRPr lang="en-US"/>
           </a:p>
@@ -6787,7 +7557,7 @@
             <a:fld id="{D6E9E5ED-425F-4E07-BCD6-7E079AD34B1B}" type="datetimeFigureOut">
               <a:rPr lang="en-US" smtClean="0"/>
               <a:pPr/>
-              <a:t>3/7/2013</a:t>
+              <a:t>3/8/2013</a:t>
             </a:fld>
             <a:endParaRPr lang="en-US"/>
           </a:p>
@@ -6997,7 +7767,7 @@
             <a:fld id="{D6E9E5ED-425F-4E07-BCD6-7E079AD34B1B}" type="datetimeFigureOut">
               <a:rPr lang="en-US" smtClean="0"/>
               <a:pPr/>
-              <a:t>3/7/2013</a:t>
+              <a:t>3/8/2013</a:t>
             </a:fld>
             <a:endParaRPr lang="en-US"/>
           </a:p>
@@ -7823,7 +8593,7 @@
         </p:nvSpPr>
         <p:spPr>
           <a:xfrm>
-            <a:off x="0" y="838200"/>
+            <a:off x="0" y="990600"/>
             <a:ext cx="9144000" cy="830997"/>
           </a:xfrm>
           <a:prstGeom prst="rect">
@@ -7839,10 +8609,45 @@
           <a:p>
             <a:pPr algn="ctr"/>
             <a:r>
+              <a:rPr lang="en-US" sz="4800" dirty="0" err="1" smtClean="0"/>
+              <a:t>Wireshark</a:t>
+            </a:r>
+            <a:endParaRPr lang="en-US" sz="4800" dirty="0" smtClean="0"/>
+          </a:p>
+        </p:txBody>
+      </p:sp>
+      <p:sp>
+        <p:nvSpPr>
+          <p:cNvPr id="9" name="TextBox 8"/>
+          <p:cNvSpPr txBox="1"/>
+          <p:nvPr/>
+        </p:nvSpPr>
+        <p:spPr>
+          <a:xfrm>
+            <a:off x="304800" y="2209800"/>
+            <a:ext cx="8534400" cy="1569660"/>
+          </a:xfrm>
+          <a:prstGeom prst="rect">
+            <a:avLst/>
+          </a:prstGeom>
+          <a:noFill/>
+        </p:spPr>
+        <p:txBody>
+          <a:bodyPr wrap="square" rtlCol="0">
+            <a:spAutoFit/>
+          </a:bodyPr>
+          <a:lstStyle/>
+          <a:p>
+            <a:r>
               <a:rPr lang="en-US" sz="4800" dirty="0" smtClean="0"/>
-              <a:t>Routing</a:t>
-            </a:r>
-            <a:endParaRPr lang="en-US" sz="4800" dirty="0"/>
+              <a:t>Capture packets</a:t>
+            </a:r>
+          </a:p>
+          <a:p>
+            <a:r>
+              <a:rPr lang="en-US" sz="4800" dirty="0" smtClean="0"/>
+              <a:t>Analyze network traffic</a:t>
+            </a:r>
           </a:p>
         </p:txBody>
       </p:sp>
@@ -8076,7 +8881,7 @@
         </p:nvSpPr>
         <p:spPr>
           <a:xfrm>
-            <a:off x="0" y="990600"/>
+            <a:off x="0" y="838200"/>
             <a:ext cx="9144000" cy="830997"/>
           </a:xfrm>
           <a:prstGeom prst="rect">
@@ -8093,12 +8898,53 @@
             <a:pPr algn="ctr"/>
             <a:r>
               <a:rPr lang="en-US" sz="4800" dirty="0" smtClean="0"/>
-              <a:t>DNS</a:t>
+              <a:t>Routing</a:t>
             </a:r>
             <a:endParaRPr lang="en-US" sz="4800" dirty="0"/>
           </a:p>
         </p:txBody>
       </p:sp>
+      <p:pic>
+        <p:nvPicPr>
+          <p:cNvPr id="2050" name="Picture 2" descr="C:\aaron\projects\testing-web-apps-and-services\images\routing.png"/>
+          <p:cNvPicPr>
+            <a:picLocks noChangeAspect="1" noChangeArrowheads="1"/>
+          </p:cNvPicPr>
+          <p:nvPr/>
+        </p:nvPicPr>
+        <p:blipFill>
+          <a:blip r:embed="rId5">
+            <a:extLst>
+              <a:ext uri="{28A0092B-C50C-407E-A947-70E740481C1C}">
+                <a14:useLocalDpi xmlns:a14="http://schemas.microsoft.com/office/drawing/2010/main" val="0"/>
+              </a:ext>
+            </a:extLst>
+          </a:blip>
+          <a:srcRect/>
+          <a:stretch>
+            <a:fillRect/>
+          </a:stretch>
+        </p:blipFill>
+        <p:spPr bwMode="auto">
+          <a:xfrm>
+            <a:off x="423862" y="1981200"/>
+            <a:ext cx="8296275" cy="3990975"/>
+          </a:xfrm>
+          <a:prstGeom prst="rect">
+            <a:avLst/>
+          </a:prstGeom>
+          <a:noFill/>
+          <a:extLst>
+            <a:ext uri="{909E8E84-426E-40DD-AFC4-6F175D3DCCD1}">
+              <a14:hiddenFill xmlns:a14="http://schemas.microsoft.com/office/drawing/2010/main">
+                <a:solidFill>
+                  <a:srgbClr val="FFFFFF"/>
+                </a:solidFill>
+              </a14:hiddenFill>
+            </a:ext>
+          </a:extLst>
+        </p:spPr>
+      </p:pic>
     </p:spTree>
   </p:cSld>
   <p:clrMapOvr>
@@ -8329,7 +9175,7 @@
         </p:nvSpPr>
         <p:spPr>
           <a:xfrm>
-            <a:off x="0" y="990600"/>
+            <a:off x="0" y="914400"/>
             <a:ext cx="9144000" cy="830997"/>
           </a:xfrm>
           <a:prstGeom prst="rect">
@@ -8346,21 +9192,22 @@
             <a:pPr algn="ctr"/>
             <a:r>
               <a:rPr lang="en-US" sz="4800" dirty="0" smtClean="0"/>
-              <a:t>Exercise:</a:t>
-            </a:r>
-          </a:p>
-        </p:txBody>
-      </p:sp>
-      <p:sp>
-        <p:nvSpPr>
-          <p:cNvPr id="9" name="TextBox 8"/>
+              <a:t>DNS</a:t>
+            </a:r>
+            <a:endParaRPr lang="en-US" sz="4800" dirty="0"/>
+          </a:p>
+        </p:txBody>
+      </p:sp>
+      <p:sp>
+        <p:nvSpPr>
+          <p:cNvPr id="2" name="TextBox 1"/>
           <p:cNvSpPr txBox="1"/>
           <p:nvPr/>
         </p:nvSpPr>
         <p:spPr>
           <a:xfrm>
-            <a:off x="0" y="2209800"/>
-            <a:ext cx="9144000" cy="830997"/>
+            <a:off x="228600" y="2133600"/>
+            <a:ext cx="1828800" cy="369332"/>
           </a:xfrm>
           <a:prstGeom prst="rect">
             <a:avLst/>
@@ -8373,19 +9220,55 @@
           </a:bodyPr>
           <a:lstStyle/>
           <a:p>
-            <a:pPr algn="ctr"/>
-            <a:r>
-              <a:rPr lang="en-US" sz="4800" dirty="0" smtClean="0"/>
-              <a:t>Viewing packets with </a:t>
-            </a:r>
-            <a:r>
-              <a:rPr lang="en-US" sz="4800" dirty="0" err="1" smtClean="0"/>
-              <a:t>Wireshark</a:t>
-            </a:r>
-            <a:endParaRPr lang="en-US" sz="4800" dirty="0" smtClean="0"/>
-          </a:p>
-        </p:txBody>
-      </p:sp>
+            <a:r>
+              <a:rPr lang="en-US" smtClean="0"/>
+              <a:t>`</a:t>
+            </a:r>
+            <a:endParaRPr lang="en-US"/>
+          </a:p>
+        </p:txBody>
+      </p:sp>
+      <p:pic>
+        <p:nvPicPr>
+          <p:cNvPr id="1028" name="Picture 4" descr="C:\aaron\projects\testing-web-apps-and-services\images\dns.png"/>
+          <p:cNvPicPr>
+            <a:picLocks noChangeAspect="1" noChangeArrowheads="1"/>
+          </p:cNvPicPr>
+          <p:nvPr/>
+        </p:nvPicPr>
+        <p:blipFill>
+          <a:blip r:embed="rId5">
+            <a:extLst>
+              <a:ext uri="{28A0092B-C50C-407E-A947-70E740481C1C}">
+                <a14:useLocalDpi xmlns:a14="http://schemas.microsoft.com/office/drawing/2010/main" val="0"/>
+              </a:ext>
+            </a:extLst>
+          </a:blip>
+          <a:srcRect/>
+          <a:stretch>
+            <a:fillRect/>
+          </a:stretch>
+        </p:blipFill>
+        <p:spPr bwMode="auto">
+          <a:xfrm>
+            <a:off x="476249" y="2318266"/>
+            <a:ext cx="8191501" cy="3619500"/>
+          </a:xfrm>
+          <a:prstGeom prst="rect">
+            <a:avLst/>
+          </a:prstGeom>
+          <a:noFill/>
+          <a:extLst>
+            <a:ext uri="{909E8E84-426E-40DD-AFC4-6F175D3DCCD1}">
+              <a14:hiddenFill xmlns:a14="http://schemas.microsoft.com/office/drawing/2010/main">
+                <a:solidFill>
+                  <a:srgbClr val="FFFFFF"/>
+                </a:solidFill>
+              </a14:hiddenFill>
+            </a:ext>
+          </a:extLst>
+        </p:spPr>
+      </p:pic>
     </p:spTree>
   </p:cSld>
   <p:clrMapOvr>
@@ -8638,263 +9521,6 @@
           </a:p>
         </p:txBody>
       </p:sp>
-    </p:spTree>
-    <p:extLst>
-      <p:ext uri="{BB962C8B-B14F-4D97-AF65-F5344CB8AC3E}">
-        <p14:creationId xmlns:p14="http://schemas.microsoft.com/office/powerpoint/2010/main" val="751845518"/>
-      </p:ext>
-    </p:extLst>
-  </p:cSld>
-  <p:clrMapOvr>
-    <a:masterClrMapping/>
-  </p:clrMapOvr>
-  <p:timing>
-    <p:tnLst>
-      <p:par>
-        <p:cTn id="1" dur="indefinite" restart="never" nodeType="tmRoot"/>
-      </p:par>
-    </p:tnLst>
-  </p:timing>
-</p:sld>
-</file>
-
-<file path=ppt/slides/slide14.xml><?xml version="1.0" encoding="utf-8"?>
-<p:sld xmlns:a="http://schemas.openxmlformats.org/drawingml/2006/main" xmlns:r="http://schemas.openxmlformats.org/officeDocument/2006/relationships" xmlns:p="http://schemas.openxmlformats.org/presentationml/2006/main">
-  <p:cSld>
-    <p:spTree>
-      <p:nvGrpSpPr>
-        <p:cNvPr id="1" name=""/>
-        <p:cNvGrpSpPr/>
-        <p:nvPr/>
-      </p:nvGrpSpPr>
-      <p:grpSpPr>
-        <a:xfrm>
-          <a:off x="0" y="0"/>
-          <a:ext cx="0" cy="0"/>
-          <a:chOff x="0" y="0"/>
-          <a:chExt cx="0" cy="0"/>
-        </a:xfrm>
-      </p:grpSpPr>
-      <p:sp>
-        <p:nvSpPr>
-          <p:cNvPr id="4" name="Rectangle 3"/>
-          <p:cNvSpPr/>
-          <p:nvPr/>
-        </p:nvSpPr>
-        <p:spPr>
-          <a:xfrm>
-            <a:off x="0" y="6096000"/>
-            <a:ext cx="9144000" cy="762000"/>
-          </a:xfrm>
-          <a:prstGeom prst="rect">
-            <a:avLst/>
-          </a:prstGeom>
-          <a:solidFill>
-            <a:schemeClr val="tx1">
-              <a:lumMod val="85000"/>
-              <a:lumOff val="15000"/>
-            </a:schemeClr>
-          </a:solidFill>
-        </p:spPr>
-        <p:style>
-          <a:lnRef idx="2">
-            <a:schemeClr val="accent1">
-              <a:shade val="50000"/>
-            </a:schemeClr>
-          </a:lnRef>
-          <a:fillRef idx="1">
-            <a:schemeClr val="accent1"/>
-          </a:fillRef>
-          <a:effectRef idx="0">
-            <a:schemeClr val="accent1"/>
-          </a:effectRef>
-          <a:fontRef idx="minor">
-            <a:schemeClr val="lt1"/>
-          </a:fontRef>
-        </p:style>
-        <p:txBody>
-          <a:bodyPr rtlCol="0" anchor="ctr"/>
-          <a:lstStyle/>
-          <a:p>
-            <a:pPr algn="ctr"/>
-            <a:endParaRPr lang="en-US"/>
-          </a:p>
-        </p:txBody>
-      </p:sp>
-      <p:pic>
-        <p:nvPicPr>
-          <p:cNvPr id="1027" name="Picture 3"/>
-          <p:cNvPicPr>
-            <a:picLocks noChangeAspect="1" noChangeArrowheads="1"/>
-          </p:cNvPicPr>
-          <p:nvPr/>
-        </p:nvPicPr>
-        <p:blipFill>
-          <a:blip r:embed="rId3" cstate="print"/>
-          <a:srcRect/>
-          <a:stretch>
-            <a:fillRect/>
-          </a:stretch>
-        </p:blipFill>
-        <p:spPr bwMode="auto">
-          <a:xfrm>
-            <a:off x="228600" y="6248400"/>
-            <a:ext cx="1371600" cy="410346"/>
-          </a:xfrm>
-          <a:prstGeom prst="rect">
-            <a:avLst/>
-          </a:prstGeom>
-          <a:noFill/>
-          <a:ln w="9525">
-            <a:noFill/>
-            <a:miter lim="800000"/>
-            <a:headEnd/>
-            <a:tailEnd/>
-          </a:ln>
-          <a:effectLst/>
-        </p:spPr>
-      </p:pic>
-      <p:sp>
-        <p:nvSpPr>
-          <p:cNvPr id="10" name="TextBox 9"/>
-          <p:cNvSpPr txBox="1"/>
-          <p:nvPr/>
-        </p:nvSpPr>
-        <p:spPr>
-          <a:xfrm>
-            <a:off x="2057400" y="6324600"/>
-            <a:ext cx="4419600" cy="369332"/>
-          </a:xfrm>
-          <a:prstGeom prst="rect">
-            <a:avLst/>
-          </a:prstGeom>
-          <a:noFill/>
-        </p:spPr>
-        <p:txBody>
-          <a:bodyPr wrap="square" rtlCol="0">
-            <a:spAutoFit/>
-          </a:bodyPr>
-          <a:lstStyle/>
-          <a:p>
-            <a:r>
-              <a:rPr lang="en-US" dirty="0" smtClean="0">
-                <a:solidFill>
-                  <a:schemeClr val="bg1"/>
-                </a:solidFill>
-                <a:latin typeface="Verdana" pitchFamily="34" charset="0"/>
-                <a:ea typeface="Verdana" pitchFamily="34" charset="0"/>
-                <a:cs typeface="Verdana" pitchFamily="34" charset="0"/>
-              </a:rPr>
-              <a:t>Testing web applications &amp; services</a:t>
-            </a:r>
-            <a:endParaRPr lang="en-US" dirty="0">
-              <a:solidFill>
-                <a:schemeClr val="bg1"/>
-              </a:solidFill>
-              <a:latin typeface="Verdana" pitchFamily="34" charset="0"/>
-              <a:ea typeface="Verdana" pitchFamily="34" charset="0"/>
-              <a:cs typeface="Verdana" pitchFamily="34" charset="0"/>
-            </a:endParaRPr>
-          </a:p>
-        </p:txBody>
-      </p:sp>
-      <p:pic>
-        <p:nvPicPr>
-          <p:cNvPr id="1033" name="Picture 9"/>
-          <p:cNvPicPr>
-            <a:picLocks noChangeAspect="1" noChangeArrowheads="1"/>
-          </p:cNvPicPr>
-          <p:nvPr/>
-        </p:nvPicPr>
-        <p:blipFill>
-          <a:blip r:embed="rId4" cstate="print"/>
-          <a:srcRect/>
-          <a:stretch>
-            <a:fillRect/>
-          </a:stretch>
-        </p:blipFill>
-        <p:spPr bwMode="auto">
-          <a:xfrm>
-            <a:off x="6934202" y="6248400"/>
-            <a:ext cx="1981195" cy="431239"/>
-          </a:xfrm>
-          <a:prstGeom prst="rect">
-            <a:avLst/>
-          </a:prstGeom>
-          <a:noFill/>
-          <a:ln w="9525">
-            <a:noFill/>
-            <a:miter lim="800000"/>
-            <a:headEnd/>
-            <a:tailEnd/>
-          </a:ln>
-          <a:effectLst/>
-        </p:spPr>
-      </p:pic>
-      <p:sp>
-        <p:nvSpPr>
-          <p:cNvPr id="13" name="TextBox 12"/>
-          <p:cNvSpPr txBox="1"/>
-          <p:nvPr/>
-        </p:nvSpPr>
-        <p:spPr>
-          <a:xfrm>
-            <a:off x="7315200" y="0"/>
-            <a:ext cx="1828800" cy="584775"/>
-          </a:xfrm>
-          <a:prstGeom prst="rect">
-            <a:avLst/>
-          </a:prstGeom>
-          <a:solidFill>
-            <a:schemeClr val="bg2">
-              <a:lumMod val="75000"/>
-            </a:schemeClr>
-          </a:solidFill>
-        </p:spPr>
-        <p:txBody>
-          <a:bodyPr wrap="square" rtlCol="0">
-            <a:spAutoFit/>
-          </a:bodyPr>
-          <a:lstStyle/>
-          <a:p>
-            <a:r>
-              <a:rPr lang="en-US" sz="3200" dirty="0" smtClean="0"/>
-              <a:t>Networks</a:t>
-            </a:r>
-            <a:endParaRPr lang="en-US" sz="3200" dirty="0"/>
-          </a:p>
-        </p:txBody>
-      </p:sp>
-      <p:sp>
-        <p:nvSpPr>
-          <p:cNvPr id="8" name="TextBox 7"/>
-          <p:cNvSpPr txBox="1"/>
-          <p:nvPr/>
-        </p:nvSpPr>
-        <p:spPr>
-          <a:xfrm>
-            <a:off x="0" y="990600"/>
-            <a:ext cx="9144000" cy="830997"/>
-          </a:xfrm>
-          <a:prstGeom prst="rect">
-            <a:avLst/>
-          </a:prstGeom>
-          <a:noFill/>
-        </p:spPr>
-        <p:txBody>
-          <a:bodyPr wrap="square" rtlCol="0">
-            <a:spAutoFit/>
-          </a:bodyPr>
-          <a:lstStyle/>
-          <a:p>
-            <a:pPr algn="ctr"/>
-            <a:r>
-              <a:rPr lang="en-US" sz="4800" dirty="0" smtClean="0"/>
-              <a:t>Exercise:</a:t>
-            </a:r>
-          </a:p>
-        </p:txBody>
-      </p:sp>
       <p:sp>
         <p:nvSpPr>
           <p:cNvPr id="9" name="TextBox 8"/>
@@ -8920,7 +9546,15 @@
             <a:pPr algn="ctr"/>
             <a:r>
               <a:rPr lang="en-US" sz="4800" dirty="0" smtClean="0"/>
-              <a:t>Using ping, traceroute, and </a:t>
+              <a:t>Using ping, traceroute, </a:t>
+            </a:r>
+            <a:endParaRPr lang="en-US" sz="4800" dirty="0" smtClean="0"/>
+          </a:p>
+          <a:p>
+            <a:pPr algn="ctr"/>
+            <a:r>
+              <a:rPr lang="en-US" sz="4800" dirty="0" smtClean="0"/>
+              <a:t>&amp; </a:t>
             </a:r>
             <a:r>
               <a:rPr lang="en-US" sz="4800" dirty="0" err="1" smtClean="0"/>
@@ -9586,13 +10220,8 @@
           <a:p>
             <a:r>
               <a:rPr lang="en-US" sz="3600" dirty="0" smtClean="0"/>
-              <a:t>1982 – TCP/IP protocol </a:t>
-            </a:r>
-            <a:r>
-              <a:rPr lang="en-US" sz="3600" dirty="0" smtClean="0"/>
-              <a:t>implemented</a:t>
-            </a:r>
-            <a:endParaRPr lang="en-US" sz="3600" dirty="0" smtClean="0"/>
+              <a:t>1982 – TCP/IP protocol implemented</a:t>
+            </a:r>
           </a:p>
         </p:txBody>
       </p:sp>

</xml_diff>

<commit_message>
updated curriculum itinerary in introduction and added web architecture to technical understanding
</commit_message>
<xml_diff>
--- a/presentations/A technical understanding of the web.pptx
+++ b/presentations/A technical understanding of the web.pptx
@@ -5,7 +5,7 @@
     <p:sldMasterId id="2147483648" r:id="rId1"/>
   </p:sldMasterIdLst>
   <p:notesMasterIdLst>
-    <p:notesMasterId r:id="rId15"/>
+    <p:notesMasterId r:id="rId20"/>
   </p:notesMasterIdLst>
   <p:sldIdLst>
     <p:sldId id="256" r:id="rId2"/>
@@ -20,7 +20,12 @@
     <p:sldId id="268" r:id="rId11"/>
     <p:sldId id="266" r:id="rId12"/>
     <p:sldId id="267" r:id="rId13"/>
-    <p:sldId id="270" r:id="rId14"/>
+    <p:sldId id="272" r:id="rId14"/>
+    <p:sldId id="277" r:id="rId15"/>
+    <p:sldId id="274" r:id="rId16"/>
+    <p:sldId id="275" r:id="rId17"/>
+    <p:sldId id="276" r:id="rId18"/>
+    <p:sldId id="270" r:id="rId19"/>
   </p:sldIdLst>
   <p:sldSz cx="9144000" cy="6858000" type="screen4x3"/>
   <p:notesSz cx="6858000" cy="9144000"/>
@@ -205,7 +210,7 @@
             <a:fld id="{9FD516BE-303C-4073-A4FC-07E358FC6551}" type="datetimeFigureOut">
               <a:rPr lang="en-US" smtClean="0"/>
               <a:pPr/>
-              <a:t>3/8/2013</a:t>
+              <a:t>3/14/2013</a:t>
             </a:fld>
             <a:endParaRPr lang="en-US"/>
           </a:p>
@@ -376,7 +381,7 @@
     </p:spTree>
     <p:extLst>
       <p:ext uri="{BB962C8B-B14F-4D97-AF65-F5344CB8AC3E}">
-        <p14:creationId xmlns:p14="http://schemas.microsoft.com/office/powerpoint/2010/main" val="2576183043"/>
+        <p14:creationId xmlns:p14="http://schemas.microsoft.com/office/powerpoint/2010/main" xmlns="" val="2576183043"/>
       </p:ext>
     </p:extLst>
   </p:cSld>
@@ -2166,6 +2171,503 @@
 </p:notes>
 </file>
 
+<file path=ppt/notesSlides/notesSlide14.xml><?xml version="1.0" encoding="utf-8"?>
+<p:notes xmlns:a="http://schemas.openxmlformats.org/drawingml/2006/main" xmlns:r="http://schemas.openxmlformats.org/officeDocument/2006/relationships" xmlns:p="http://schemas.openxmlformats.org/presentationml/2006/main">
+  <p:cSld>
+    <p:spTree>
+      <p:nvGrpSpPr>
+        <p:cNvPr id="1" name=""/>
+        <p:cNvGrpSpPr/>
+        <p:nvPr/>
+      </p:nvGrpSpPr>
+      <p:grpSpPr>
+        <a:xfrm>
+          <a:off x="0" y="0"/>
+          <a:ext cx="0" cy="0"/>
+          <a:chOff x="0" y="0"/>
+          <a:chExt cx="0" cy="0"/>
+        </a:xfrm>
+      </p:grpSpPr>
+      <p:sp>
+        <p:nvSpPr>
+          <p:cNvPr id="2" name="Slide Image Placeholder 1"/>
+          <p:cNvSpPr>
+            <a:spLocks noGrp="1" noRot="1" noChangeAspect="1"/>
+          </p:cNvSpPr>
+          <p:nvPr>
+            <p:ph type="sldImg"/>
+          </p:nvPr>
+        </p:nvSpPr>
+        <p:spPr/>
+      </p:sp>
+      <p:sp>
+        <p:nvSpPr>
+          <p:cNvPr id="3" name="Notes Placeholder 2"/>
+          <p:cNvSpPr>
+            <a:spLocks noGrp="1"/>
+          </p:cNvSpPr>
+          <p:nvPr>
+            <p:ph type="body" idx="1"/>
+          </p:nvPr>
+        </p:nvSpPr>
+        <p:spPr/>
+        <p:txBody>
+          <a:bodyPr>
+            <a:normAutofit lnSpcReduction="10000"/>
+          </a:bodyPr>
+          <a:lstStyle/>
+          <a:p>
+            <a:pPr lvl="0"/>
+            <a:endParaRPr lang="en-US" baseline="0" dirty="0" smtClean="0"/>
+          </a:p>
+        </p:txBody>
+      </p:sp>
+      <p:sp>
+        <p:nvSpPr>
+          <p:cNvPr id="4" name="Slide Number Placeholder 3"/>
+          <p:cNvSpPr>
+            <a:spLocks noGrp="1"/>
+          </p:cNvSpPr>
+          <p:nvPr>
+            <p:ph type="sldNum" sz="quarter" idx="10"/>
+          </p:nvPr>
+        </p:nvSpPr>
+        <p:spPr/>
+        <p:txBody>
+          <a:bodyPr/>
+          <a:lstStyle/>
+          <a:p>
+            <a:fld id="{2468E330-6F11-4EB8-9125-0BEE82D16730}" type="slidenum">
+              <a:rPr lang="en-US" smtClean="0"/>
+              <a:pPr/>
+              <a:t>14</a:t>
+            </a:fld>
+            <a:endParaRPr lang="en-US"/>
+          </a:p>
+        </p:txBody>
+      </p:sp>
+    </p:spTree>
+  </p:cSld>
+  <p:clrMapOvr>
+    <a:masterClrMapping/>
+  </p:clrMapOvr>
+</p:notes>
+</file>
+
+<file path=ppt/notesSlides/notesSlide15.xml><?xml version="1.0" encoding="utf-8"?>
+<p:notes xmlns:a="http://schemas.openxmlformats.org/drawingml/2006/main" xmlns:r="http://schemas.openxmlformats.org/officeDocument/2006/relationships" xmlns:p="http://schemas.openxmlformats.org/presentationml/2006/main">
+  <p:cSld>
+    <p:spTree>
+      <p:nvGrpSpPr>
+        <p:cNvPr id="1" name=""/>
+        <p:cNvGrpSpPr/>
+        <p:nvPr/>
+      </p:nvGrpSpPr>
+      <p:grpSpPr>
+        <a:xfrm>
+          <a:off x="0" y="0"/>
+          <a:ext cx="0" cy="0"/>
+          <a:chOff x="0" y="0"/>
+          <a:chExt cx="0" cy="0"/>
+        </a:xfrm>
+      </p:grpSpPr>
+      <p:sp>
+        <p:nvSpPr>
+          <p:cNvPr id="2" name="Slide Image Placeholder 1"/>
+          <p:cNvSpPr>
+            <a:spLocks noGrp="1" noRot="1" noChangeAspect="1"/>
+          </p:cNvSpPr>
+          <p:nvPr>
+            <p:ph type="sldImg"/>
+          </p:nvPr>
+        </p:nvSpPr>
+        <p:spPr/>
+      </p:sp>
+      <p:sp>
+        <p:nvSpPr>
+          <p:cNvPr id="3" name="Notes Placeholder 2"/>
+          <p:cNvSpPr>
+            <a:spLocks noGrp="1"/>
+          </p:cNvSpPr>
+          <p:nvPr>
+            <p:ph type="body" idx="1"/>
+          </p:nvPr>
+        </p:nvSpPr>
+        <p:spPr/>
+        <p:txBody>
+          <a:bodyPr>
+            <a:normAutofit lnSpcReduction="10000"/>
+          </a:bodyPr>
+          <a:lstStyle/>
+          <a:p>
+            <a:pPr lvl="0"/>
+            <a:endParaRPr lang="en-US" baseline="0" dirty="0" smtClean="0"/>
+          </a:p>
+        </p:txBody>
+      </p:sp>
+      <p:sp>
+        <p:nvSpPr>
+          <p:cNvPr id="4" name="Slide Number Placeholder 3"/>
+          <p:cNvSpPr>
+            <a:spLocks noGrp="1"/>
+          </p:cNvSpPr>
+          <p:nvPr>
+            <p:ph type="sldNum" sz="quarter" idx="10"/>
+          </p:nvPr>
+        </p:nvSpPr>
+        <p:spPr/>
+        <p:txBody>
+          <a:bodyPr/>
+          <a:lstStyle/>
+          <a:p>
+            <a:fld id="{2468E330-6F11-4EB8-9125-0BEE82D16730}" type="slidenum">
+              <a:rPr lang="en-US" smtClean="0"/>
+              <a:pPr/>
+              <a:t>15</a:t>
+            </a:fld>
+            <a:endParaRPr lang="en-US"/>
+          </a:p>
+        </p:txBody>
+      </p:sp>
+    </p:spTree>
+  </p:cSld>
+  <p:clrMapOvr>
+    <a:masterClrMapping/>
+  </p:clrMapOvr>
+</p:notes>
+</file>
+
+<file path=ppt/notesSlides/notesSlide16.xml><?xml version="1.0" encoding="utf-8"?>
+<p:notes xmlns:a="http://schemas.openxmlformats.org/drawingml/2006/main" xmlns:r="http://schemas.openxmlformats.org/officeDocument/2006/relationships" xmlns:p="http://schemas.openxmlformats.org/presentationml/2006/main">
+  <p:cSld>
+    <p:spTree>
+      <p:nvGrpSpPr>
+        <p:cNvPr id="1" name=""/>
+        <p:cNvGrpSpPr/>
+        <p:nvPr/>
+      </p:nvGrpSpPr>
+      <p:grpSpPr>
+        <a:xfrm>
+          <a:off x="0" y="0"/>
+          <a:ext cx="0" cy="0"/>
+          <a:chOff x="0" y="0"/>
+          <a:chExt cx="0" cy="0"/>
+        </a:xfrm>
+      </p:grpSpPr>
+      <p:sp>
+        <p:nvSpPr>
+          <p:cNvPr id="2" name="Slide Image Placeholder 1"/>
+          <p:cNvSpPr>
+            <a:spLocks noGrp="1" noRot="1" noChangeAspect="1"/>
+          </p:cNvSpPr>
+          <p:nvPr>
+            <p:ph type="sldImg"/>
+          </p:nvPr>
+        </p:nvSpPr>
+        <p:spPr/>
+      </p:sp>
+      <p:sp>
+        <p:nvSpPr>
+          <p:cNvPr id="3" name="Notes Placeholder 2"/>
+          <p:cNvSpPr>
+            <a:spLocks noGrp="1"/>
+          </p:cNvSpPr>
+          <p:nvPr>
+            <p:ph type="body" idx="1"/>
+          </p:nvPr>
+        </p:nvSpPr>
+        <p:spPr/>
+        <p:txBody>
+          <a:bodyPr>
+            <a:normAutofit lnSpcReduction="10000"/>
+          </a:bodyPr>
+          <a:lstStyle/>
+          <a:p>
+            <a:pPr lvl="0"/>
+            <a:endParaRPr lang="en-US" baseline="0" dirty="0" smtClean="0"/>
+          </a:p>
+        </p:txBody>
+      </p:sp>
+      <p:sp>
+        <p:nvSpPr>
+          <p:cNvPr id="4" name="Slide Number Placeholder 3"/>
+          <p:cNvSpPr>
+            <a:spLocks noGrp="1"/>
+          </p:cNvSpPr>
+          <p:nvPr>
+            <p:ph type="sldNum" sz="quarter" idx="10"/>
+          </p:nvPr>
+        </p:nvSpPr>
+        <p:spPr/>
+        <p:txBody>
+          <a:bodyPr/>
+          <a:lstStyle/>
+          <a:p>
+            <a:fld id="{2468E330-6F11-4EB8-9125-0BEE82D16730}" type="slidenum">
+              <a:rPr lang="en-US" smtClean="0"/>
+              <a:pPr/>
+              <a:t>16</a:t>
+            </a:fld>
+            <a:endParaRPr lang="en-US"/>
+          </a:p>
+        </p:txBody>
+      </p:sp>
+    </p:spTree>
+  </p:cSld>
+  <p:clrMapOvr>
+    <a:masterClrMapping/>
+  </p:clrMapOvr>
+</p:notes>
+</file>
+
+<file path=ppt/notesSlides/notesSlide17.xml><?xml version="1.0" encoding="utf-8"?>
+<p:notes xmlns:a="http://schemas.openxmlformats.org/drawingml/2006/main" xmlns:r="http://schemas.openxmlformats.org/officeDocument/2006/relationships" xmlns:p="http://schemas.openxmlformats.org/presentationml/2006/main">
+  <p:cSld>
+    <p:spTree>
+      <p:nvGrpSpPr>
+        <p:cNvPr id="1" name=""/>
+        <p:cNvGrpSpPr/>
+        <p:nvPr/>
+      </p:nvGrpSpPr>
+      <p:grpSpPr>
+        <a:xfrm>
+          <a:off x="0" y="0"/>
+          <a:ext cx="0" cy="0"/>
+          <a:chOff x="0" y="0"/>
+          <a:chExt cx="0" cy="0"/>
+        </a:xfrm>
+      </p:grpSpPr>
+      <p:sp>
+        <p:nvSpPr>
+          <p:cNvPr id="2" name="Slide Image Placeholder 1"/>
+          <p:cNvSpPr>
+            <a:spLocks noGrp="1" noRot="1" noChangeAspect="1"/>
+          </p:cNvSpPr>
+          <p:nvPr>
+            <p:ph type="sldImg"/>
+          </p:nvPr>
+        </p:nvSpPr>
+        <p:spPr/>
+      </p:sp>
+      <p:sp>
+        <p:nvSpPr>
+          <p:cNvPr id="3" name="Notes Placeholder 2"/>
+          <p:cNvSpPr>
+            <a:spLocks noGrp="1"/>
+          </p:cNvSpPr>
+          <p:nvPr>
+            <p:ph type="body" idx="1"/>
+          </p:nvPr>
+        </p:nvSpPr>
+        <p:spPr/>
+        <p:txBody>
+          <a:bodyPr>
+            <a:normAutofit lnSpcReduction="10000"/>
+          </a:bodyPr>
+          <a:lstStyle/>
+          <a:p>
+            <a:pPr lvl="0"/>
+            <a:r>
+              <a:rPr lang="en-US" sz="1200" baseline="0" dirty="0" smtClean="0"/>
+              <a:t>Uptime is important.  By not having a single point of failure, you can make sure a site or app is available at all times, even if there are hardware failures or security compromises.</a:t>
+            </a:r>
+          </a:p>
+          <a:p>
+            <a:pPr lvl="0"/>
+            <a:endParaRPr lang="en-US" sz="1200" baseline="0" dirty="0" smtClean="0"/>
+          </a:p>
+          <a:p>
+            <a:pPr lvl="0"/>
+            <a:r>
+              <a:rPr lang="en-US" sz="1200" baseline="0" dirty="0" smtClean="0"/>
+              <a:t>By having many identical servers handling some requests each, if one server goes down, only the sessions currently on that server are lost.  And if the sessions are persisted to a remote database, they can be restored easily.</a:t>
+            </a:r>
+          </a:p>
+          <a:p>
+            <a:pPr lvl="0"/>
+            <a:endParaRPr lang="en-US" sz="1200" baseline="0" dirty="0" smtClean="0"/>
+          </a:p>
+          <a:p>
+            <a:pPr lvl="0"/>
+            <a:r>
+              <a:rPr lang="en-US" sz="1200" baseline="0" dirty="0" smtClean="0"/>
+              <a:t>More servers each handling a portion of the load means that servers are more responsive, and you can handle a higher overall load.</a:t>
+            </a:r>
+          </a:p>
+          <a:p>
+            <a:pPr lvl="0"/>
+            <a:endParaRPr lang="en-US" sz="1200" baseline="0" dirty="0" smtClean="0"/>
+          </a:p>
+          <a:p>
+            <a:pPr lvl="0"/>
+            <a:r>
+              <a:rPr lang="en-US" sz="1200" baseline="0" dirty="0" smtClean="0"/>
+              <a:t>By making cheap, simple servers interchangeably available it makes it easier to manage.  You can offload lower level operations to someone who knows how to keep servers up and running and secure.</a:t>
+            </a:r>
+          </a:p>
+          <a:p>
+            <a:pPr lvl="0"/>
+            <a:endParaRPr lang="en-US" sz="1200" baseline="0" dirty="0" smtClean="0"/>
+          </a:p>
+          <a:p>
+            <a:pPr lvl="0"/>
+            <a:r>
+              <a:rPr lang="en-US" sz="1200" baseline="0" dirty="0" smtClean="0"/>
+              <a:t>This saves cost, which is why there is so much buzz about the cloud.</a:t>
+            </a:r>
+          </a:p>
+          <a:p>
+            <a:pPr lvl="0"/>
+            <a:r>
+              <a:rPr lang="en-US" sz="1200" baseline="0" dirty="0" smtClean="0"/>
+              <a:t/>
+            </a:r>
+            <a:br>
+              <a:rPr lang="en-US" sz="1200" baseline="0" dirty="0" smtClean="0"/>
+            </a:br>
+            <a:r>
+              <a:rPr lang="en-US" sz="1200" baseline="0" dirty="0" smtClean="0"/>
+              <a:t>You used to have to scale up with </a:t>
+            </a:r>
+            <a:r>
+              <a:rPr lang="en-US" sz="1200" baseline="0" smtClean="0"/>
+              <a:t>bigger hardware.</a:t>
+            </a:r>
+            <a:endParaRPr lang="en-US" sz="1200" baseline="0" dirty="0" smtClean="0"/>
+          </a:p>
+          <a:p>
+            <a:pPr lvl="0"/>
+            <a:endParaRPr lang="en-US" sz="1200" baseline="0" dirty="0" smtClean="0"/>
+          </a:p>
+          <a:p>
+            <a:pPr lvl="0"/>
+            <a:endParaRPr lang="en-US" sz="1200" baseline="0" dirty="0" smtClean="0"/>
+          </a:p>
+          <a:p>
+            <a:pPr lvl="0"/>
+            <a:endParaRPr lang="en-US" sz="1200" baseline="0" dirty="0" smtClean="0"/>
+          </a:p>
+          <a:p>
+            <a:pPr lvl="0"/>
+            <a:endParaRPr lang="en-US" sz="1200" baseline="0" dirty="0" smtClean="0"/>
+          </a:p>
+        </p:txBody>
+      </p:sp>
+      <p:sp>
+        <p:nvSpPr>
+          <p:cNvPr id="4" name="Slide Number Placeholder 3"/>
+          <p:cNvSpPr>
+            <a:spLocks noGrp="1"/>
+          </p:cNvSpPr>
+          <p:nvPr>
+            <p:ph type="sldNum" sz="quarter" idx="10"/>
+          </p:nvPr>
+        </p:nvSpPr>
+        <p:spPr/>
+        <p:txBody>
+          <a:bodyPr/>
+          <a:lstStyle/>
+          <a:p>
+            <a:fld id="{2468E330-6F11-4EB8-9125-0BEE82D16730}" type="slidenum">
+              <a:rPr lang="en-US" smtClean="0"/>
+              <a:pPr/>
+              <a:t>17</a:t>
+            </a:fld>
+            <a:endParaRPr lang="en-US"/>
+          </a:p>
+        </p:txBody>
+      </p:sp>
+    </p:spTree>
+  </p:cSld>
+  <p:clrMapOvr>
+    <a:masterClrMapping/>
+  </p:clrMapOvr>
+</p:notes>
+</file>
+
+<file path=ppt/notesSlides/notesSlide18.xml><?xml version="1.0" encoding="utf-8"?>
+<p:notes xmlns:a="http://schemas.openxmlformats.org/drawingml/2006/main" xmlns:r="http://schemas.openxmlformats.org/officeDocument/2006/relationships" xmlns:p="http://schemas.openxmlformats.org/presentationml/2006/main">
+  <p:cSld>
+    <p:spTree>
+      <p:nvGrpSpPr>
+        <p:cNvPr id="1" name=""/>
+        <p:cNvGrpSpPr/>
+        <p:nvPr/>
+      </p:nvGrpSpPr>
+      <p:grpSpPr>
+        <a:xfrm>
+          <a:off x="0" y="0"/>
+          <a:ext cx="0" cy="0"/>
+          <a:chOff x="0" y="0"/>
+          <a:chExt cx="0" cy="0"/>
+        </a:xfrm>
+      </p:grpSpPr>
+      <p:sp>
+        <p:nvSpPr>
+          <p:cNvPr id="2" name="Slide Image Placeholder 1"/>
+          <p:cNvSpPr>
+            <a:spLocks noGrp="1" noRot="1" noChangeAspect="1"/>
+          </p:cNvSpPr>
+          <p:nvPr>
+            <p:ph type="sldImg"/>
+          </p:nvPr>
+        </p:nvSpPr>
+        <p:spPr/>
+      </p:sp>
+      <p:sp>
+        <p:nvSpPr>
+          <p:cNvPr id="3" name="Notes Placeholder 2"/>
+          <p:cNvSpPr>
+            <a:spLocks noGrp="1"/>
+          </p:cNvSpPr>
+          <p:nvPr>
+            <p:ph type="body" idx="1"/>
+          </p:nvPr>
+        </p:nvSpPr>
+        <p:spPr/>
+        <p:txBody>
+          <a:bodyPr>
+            <a:normAutofit lnSpcReduction="10000"/>
+          </a:bodyPr>
+          <a:lstStyle/>
+          <a:p>
+            <a:pPr lvl="0"/>
+            <a:endParaRPr lang="en-US" baseline="0" dirty="0" smtClean="0"/>
+          </a:p>
+        </p:txBody>
+      </p:sp>
+      <p:sp>
+        <p:nvSpPr>
+          <p:cNvPr id="4" name="Slide Number Placeholder 3"/>
+          <p:cNvSpPr>
+            <a:spLocks noGrp="1"/>
+          </p:cNvSpPr>
+          <p:nvPr>
+            <p:ph type="sldNum" sz="quarter" idx="10"/>
+          </p:nvPr>
+        </p:nvSpPr>
+        <p:spPr/>
+        <p:txBody>
+          <a:bodyPr/>
+          <a:lstStyle/>
+          <a:p>
+            <a:fld id="{2468E330-6F11-4EB8-9125-0BEE82D16730}" type="slidenum">
+              <a:rPr lang="en-US" smtClean="0"/>
+              <a:pPr/>
+              <a:t>18</a:t>
+            </a:fld>
+            <a:endParaRPr lang="en-US"/>
+          </a:p>
+        </p:txBody>
+      </p:sp>
+    </p:spTree>
+  </p:cSld>
+  <p:clrMapOvr>
+    <a:masterClrMapping/>
+  </p:clrMapOvr>
+</p:notes>
+</file>
+
 <file path=ppt/notesSlides/notesSlide2.xml><?xml version="1.0" encoding="utf-8"?>
 <p:notes xmlns:a="http://schemas.openxmlformats.org/drawingml/2006/main" xmlns:r="http://schemas.openxmlformats.org/officeDocument/2006/relationships" xmlns:p="http://schemas.openxmlformats.org/presentationml/2006/main">
   <p:cSld>
@@ -5368,7 +5870,7 @@
             <a:fld id="{D6E9E5ED-425F-4E07-BCD6-7E079AD34B1B}" type="datetimeFigureOut">
               <a:rPr lang="en-US" smtClean="0"/>
               <a:pPr/>
-              <a:t>3/8/2013</a:t>
+              <a:t>3/14/2013</a:t>
             </a:fld>
             <a:endParaRPr lang="en-US"/>
           </a:p>
@@ -5535,7 +6037,7 @@
             <a:fld id="{D6E9E5ED-425F-4E07-BCD6-7E079AD34B1B}" type="datetimeFigureOut">
               <a:rPr lang="en-US" smtClean="0"/>
               <a:pPr/>
-              <a:t>3/8/2013</a:t>
+              <a:t>3/14/2013</a:t>
             </a:fld>
             <a:endParaRPr lang="en-US"/>
           </a:p>
@@ -5712,7 +6214,7 @@
             <a:fld id="{D6E9E5ED-425F-4E07-BCD6-7E079AD34B1B}" type="datetimeFigureOut">
               <a:rPr lang="en-US" smtClean="0"/>
               <a:pPr/>
-              <a:t>3/8/2013</a:t>
+              <a:t>3/14/2013</a:t>
             </a:fld>
             <a:endParaRPr lang="en-US"/>
           </a:p>
@@ -5879,7 +6381,7 @@
             <a:fld id="{D6E9E5ED-425F-4E07-BCD6-7E079AD34B1B}" type="datetimeFigureOut">
               <a:rPr lang="en-US" smtClean="0"/>
               <a:pPr/>
-              <a:t>3/8/2013</a:t>
+              <a:t>3/14/2013</a:t>
             </a:fld>
             <a:endParaRPr lang="en-US"/>
           </a:p>
@@ -6122,7 +6624,7 @@
             <a:fld id="{D6E9E5ED-425F-4E07-BCD6-7E079AD34B1B}" type="datetimeFigureOut">
               <a:rPr lang="en-US" smtClean="0"/>
               <a:pPr/>
-              <a:t>3/8/2013</a:t>
+              <a:t>3/14/2013</a:t>
             </a:fld>
             <a:endParaRPr lang="en-US"/>
           </a:p>
@@ -6407,7 +6909,7 @@
             <a:fld id="{D6E9E5ED-425F-4E07-BCD6-7E079AD34B1B}" type="datetimeFigureOut">
               <a:rPr lang="en-US" smtClean="0"/>
               <a:pPr/>
-              <a:t>3/8/2013</a:t>
+              <a:t>3/14/2013</a:t>
             </a:fld>
             <a:endParaRPr lang="en-US"/>
           </a:p>
@@ -6826,7 +7328,7 @@
             <a:fld id="{D6E9E5ED-425F-4E07-BCD6-7E079AD34B1B}" type="datetimeFigureOut">
               <a:rPr lang="en-US" smtClean="0"/>
               <a:pPr/>
-              <a:t>3/8/2013</a:t>
+              <a:t>3/14/2013</a:t>
             </a:fld>
             <a:endParaRPr lang="en-US"/>
           </a:p>
@@ -6941,7 +7443,7 @@
             <a:fld id="{D6E9E5ED-425F-4E07-BCD6-7E079AD34B1B}" type="datetimeFigureOut">
               <a:rPr lang="en-US" smtClean="0"/>
               <a:pPr/>
-              <a:t>3/8/2013</a:t>
+              <a:t>3/14/2013</a:t>
             </a:fld>
             <a:endParaRPr lang="en-US"/>
           </a:p>
@@ -7033,7 +7535,7 @@
             <a:fld id="{D6E9E5ED-425F-4E07-BCD6-7E079AD34B1B}" type="datetimeFigureOut">
               <a:rPr lang="en-US" smtClean="0"/>
               <a:pPr/>
-              <a:t>3/8/2013</a:t>
+              <a:t>3/14/2013</a:t>
             </a:fld>
             <a:endParaRPr lang="en-US"/>
           </a:p>
@@ -7307,7 +7809,7 @@
             <a:fld id="{D6E9E5ED-425F-4E07-BCD6-7E079AD34B1B}" type="datetimeFigureOut">
               <a:rPr lang="en-US" smtClean="0"/>
               <a:pPr/>
-              <a:t>3/8/2013</a:t>
+              <a:t>3/14/2013</a:t>
             </a:fld>
             <a:endParaRPr lang="en-US"/>
           </a:p>
@@ -7557,7 +8059,7 @@
             <a:fld id="{D6E9E5ED-425F-4E07-BCD6-7E079AD34B1B}" type="datetimeFigureOut">
               <a:rPr lang="en-US" smtClean="0"/>
               <a:pPr/>
-              <a:t>3/8/2013</a:t>
+              <a:t>3/14/2013</a:t>
             </a:fld>
             <a:endParaRPr lang="en-US"/>
           </a:p>
@@ -7767,7 +8269,7 @@
             <a:fld id="{D6E9E5ED-425F-4E07-BCD6-7E079AD34B1B}" type="datetimeFigureOut">
               <a:rPr lang="en-US" smtClean="0"/>
               <a:pPr/>
-              <a:t>3/8/2013</a:t>
+              <a:t>3/14/2013</a:t>
             </a:fld>
             <a:endParaRPr lang="en-US"/>
           </a:p>
@@ -8913,10 +9415,10 @@
           <p:nvPr/>
         </p:nvPicPr>
         <p:blipFill>
-          <a:blip r:embed="rId5">
+          <a:blip r:embed="rId5" cstate="print">
             <a:extLst>
               <a:ext uri="{28A0092B-C50C-407E-A947-70E740481C1C}">
-                <a14:useLocalDpi xmlns:a14="http://schemas.microsoft.com/office/drawing/2010/main" val="0"/>
+                <a14:useLocalDpi xmlns:a14="http://schemas.microsoft.com/office/drawing/2010/main" xmlns="" val="0"/>
               </a:ext>
             </a:extLst>
           </a:blip>
@@ -8936,7 +9438,7 @@
           <a:noFill/>
           <a:extLst>
             <a:ext uri="{909E8E84-426E-40DD-AFC4-6F175D3DCCD1}">
-              <a14:hiddenFill xmlns:a14="http://schemas.microsoft.com/office/drawing/2010/main">
+              <a14:hiddenFill xmlns:a14="http://schemas.microsoft.com/office/drawing/2010/main" xmlns="">
                 <a:solidFill>
                   <a:srgbClr val="FFFFFF"/>
                 </a:solidFill>
@@ -9237,10 +9739,10 @@
           <p:nvPr/>
         </p:nvPicPr>
         <p:blipFill>
-          <a:blip r:embed="rId5">
+          <a:blip r:embed="rId5" cstate="print">
             <a:extLst>
               <a:ext uri="{28A0092B-C50C-407E-A947-70E740481C1C}">
-                <a14:useLocalDpi xmlns:a14="http://schemas.microsoft.com/office/drawing/2010/main" val="0"/>
+                <a14:useLocalDpi xmlns:a14="http://schemas.microsoft.com/office/drawing/2010/main" xmlns="" val="0"/>
               </a:ext>
             </a:extLst>
           </a:blip>
@@ -9260,7 +9762,7 @@
           <a:noFill/>
           <a:extLst>
             <a:ext uri="{909E8E84-426E-40DD-AFC4-6F175D3DCCD1}">
-              <a14:hiddenFill xmlns:a14="http://schemas.microsoft.com/office/drawing/2010/main">
+              <a14:hiddenFill xmlns:a14="http://schemas.microsoft.com/office/drawing/2010/main" xmlns="">
                 <a:solidFill>
                   <a:srgbClr val="FFFFFF"/>
                 </a:solidFill>
@@ -9465,6 +9967,1307 @@
         </p:nvSpPr>
         <p:spPr>
           <a:xfrm>
+            <a:off x="6858000" y="0"/>
+            <a:ext cx="2286000" cy="584775"/>
+          </a:xfrm>
+          <a:prstGeom prst="rect">
+            <a:avLst/>
+          </a:prstGeom>
+          <a:solidFill>
+            <a:schemeClr val="bg2">
+              <a:lumMod val="75000"/>
+            </a:schemeClr>
+          </a:solidFill>
+        </p:spPr>
+        <p:txBody>
+          <a:bodyPr wrap="square" rtlCol="0">
+            <a:spAutoFit/>
+          </a:bodyPr>
+          <a:lstStyle/>
+          <a:p>
+            <a:r>
+              <a:rPr lang="en-US" sz="3200" dirty="0" smtClean="0"/>
+              <a:t>Architecture</a:t>
+            </a:r>
+            <a:endParaRPr lang="en-US" sz="3200" dirty="0"/>
+          </a:p>
+        </p:txBody>
+      </p:sp>
+      <p:sp>
+        <p:nvSpPr>
+          <p:cNvPr id="8" name="TextBox 7"/>
+          <p:cNvSpPr txBox="1"/>
+          <p:nvPr/>
+        </p:nvSpPr>
+        <p:spPr>
+          <a:xfrm>
+            <a:off x="0" y="914400"/>
+            <a:ext cx="9144000" cy="830997"/>
+          </a:xfrm>
+          <a:prstGeom prst="rect">
+            <a:avLst/>
+          </a:prstGeom>
+          <a:noFill/>
+        </p:spPr>
+        <p:txBody>
+          <a:bodyPr wrap="square" rtlCol="0">
+            <a:spAutoFit/>
+          </a:bodyPr>
+          <a:lstStyle/>
+          <a:p>
+            <a:pPr algn="ctr"/>
+            <a:r>
+              <a:rPr lang="en-US" sz="4800" dirty="0" smtClean="0"/>
+              <a:t>Web Architecture</a:t>
+            </a:r>
+            <a:endParaRPr lang="en-US" sz="4800" dirty="0"/>
+          </a:p>
+        </p:txBody>
+      </p:sp>
+      <p:sp>
+        <p:nvSpPr>
+          <p:cNvPr id="2" name="TextBox 1"/>
+          <p:cNvSpPr txBox="1"/>
+          <p:nvPr/>
+        </p:nvSpPr>
+        <p:spPr>
+          <a:xfrm>
+            <a:off x="228600" y="2133600"/>
+            <a:ext cx="1828800" cy="369332"/>
+          </a:xfrm>
+          <a:prstGeom prst="rect">
+            <a:avLst/>
+          </a:prstGeom>
+          <a:noFill/>
+        </p:spPr>
+        <p:txBody>
+          <a:bodyPr wrap="square" rtlCol="0">
+            <a:spAutoFit/>
+          </a:bodyPr>
+          <a:lstStyle/>
+          <a:p>
+            <a:r>
+              <a:rPr lang="en-US" smtClean="0"/>
+              <a:t>`</a:t>
+            </a:r>
+            <a:endParaRPr lang="en-US"/>
+          </a:p>
+        </p:txBody>
+      </p:sp>
+      <p:sp>
+        <p:nvSpPr>
+          <p:cNvPr id="11" name="TextBox 10"/>
+          <p:cNvSpPr txBox="1"/>
+          <p:nvPr/>
+        </p:nvSpPr>
+        <p:spPr>
+          <a:xfrm>
+            <a:off x="533400" y="1905000"/>
+            <a:ext cx="8153400" cy="2862322"/>
+          </a:xfrm>
+          <a:prstGeom prst="rect">
+            <a:avLst/>
+          </a:prstGeom>
+          <a:noFill/>
+        </p:spPr>
+        <p:txBody>
+          <a:bodyPr wrap="square" rtlCol="0">
+            <a:spAutoFit/>
+          </a:bodyPr>
+          <a:lstStyle/>
+          <a:p>
+            <a:r>
+              <a:rPr lang="en-US" sz="3600" dirty="0" smtClean="0"/>
+              <a:t>Client Server</a:t>
+            </a:r>
+          </a:p>
+          <a:p>
+            <a:r>
+              <a:rPr lang="en-US" sz="3600" dirty="0" smtClean="0"/>
+              <a:t>3-Tier </a:t>
+            </a:r>
+          </a:p>
+          <a:p>
+            <a:r>
+              <a:rPr lang="en-US" sz="3600" dirty="0" smtClean="0"/>
+              <a:t>	</a:t>
+            </a:r>
+            <a:r>
+              <a:rPr lang="en-US" sz="3600" dirty="0" smtClean="0"/>
+              <a:t>Browser, Web Server, Database</a:t>
+            </a:r>
+          </a:p>
+          <a:p>
+            <a:r>
+              <a:rPr lang="en-US" sz="3600" dirty="0" smtClean="0"/>
+              <a:t>N-Tier</a:t>
+            </a:r>
+          </a:p>
+          <a:p>
+            <a:r>
+              <a:rPr lang="en-US" sz="3600" dirty="0" smtClean="0"/>
+              <a:t>Clustering</a:t>
+            </a:r>
+            <a:endParaRPr lang="en-US" sz="3600" dirty="0" smtClean="0"/>
+          </a:p>
+        </p:txBody>
+      </p:sp>
+    </p:spTree>
+  </p:cSld>
+  <p:clrMapOvr>
+    <a:masterClrMapping/>
+  </p:clrMapOvr>
+  <p:timing>
+    <p:tnLst>
+      <p:par>
+        <p:cTn id="1" dur="indefinite" restart="never" nodeType="tmRoot">
+          <p:childTnLst>
+            <p:seq concurrent="1" nextAc="seek">
+              <p:cTn id="2" dur="indefinite" nodeType="mainSeq">
+                <p:childTnLst>
+                  <p:par>
+                    <p:cTn id="3" fill="hold">
+                      <p:stCondLst>
+                        <p:cond delay="indefinite"/>
+                      </p:stCondLst>
+                      <p:childTnLst>
+                        <p:par>
+                          <p:cTn id="4" fill="hold">
+                            <p:stCondLst>
+                              <p:cond delay="0"/>
+                            </p:stCondLst>
+                            <p:childTnLst>
+                              <p:par>
+                                <p:cTn id="5" presetID="10" presetClass="entr" presetSubtype="0" fill="hold" grpId="0" nodeType="clickEffect">
+                                  <p:stCondLst>
+                                    <p:cond delay="0"/>
+                                  </p:stCondLst>
+                                  <p:childTnLst>
+                                    <p:set>
+                                      <p:cBhvr>
+                                        <p:cTn id="6" dur="1" fill="hold">
+                                          <p:stCondLst>
+                                            <p:cond delay="0"/>
+                                          </p:stCondLst>
+                                        </p:cTn>
+                                        <p:tgtEl>
+                                          <p:spTgt spid="11">
+                                            <p:txEl>
+                                              <p:pRg st="0" end="0"/>
+                                            </p:txEl>
+                                          </p:spTgt>
+                                        </p:tgtEl>
+                                        <p:attrNameLst>
+                                          <p:attrName>style.visibility</p:attrName>
+                                        </p:attrNameLst>
+                                      </p:cBhvr>
+                                      <p:to>
+                                        <p:strVal val="visible"/>
+                                      </p:to>
+                                    </p:set>
+                                    <p:animEffect transition="in" filter="fade">
+                                      <p:cBhvr>
+                                        <p:cTn id="7" dur="2000"/>
+                                        <p:tgtEl>
+                                          <p:spTgt spid="11">
+                                            <p:txEl>
+                                              <p:pRg st="0" end="0"/>
+                                            </p:txEl>
+                                          </p:spTgt>
+                                        </p:tgtEl>
+                                      </p:cBhvr>
+                                    </p:animEffect>
+                                  </p:childTnLst>
+                                </p:cTn>
+                              </p:par>
+                            </p:childTnLst>
+                          </p:cTn>
+                        </p:par>
+                      </p:childTnLst>
+                    </p:cTn>
+                  </p:par>
+                  <p:par>
+                    <p:cTn id="8" fill="hold">
+                      <p:stCondLst>
+                        <p:cond delay="indefinite"/>
+                      </p:stCondLst>
+                      <p:childTnLst>
+                        <p:par>
+                          <p:cTn id="9" fill="hold">
+                            <p:stCondLst>
+                              <p:cond delay="0"/>
+                            </p:stCondLst>
+                            <p:childTnLst>
+                              <p:par>
+                                <p:cTn id="10" presetID="10" presetClass="entr" presetSubtype="0" fill="hold" grpId="0" nodeType="clickEffect">
+                                  <p:stCondLst>
+                                    <p:cond delay="0"/>
+                                  </p:stCondLst>
+                                  <p:childTnLst>
+                                    <p:set>
+                                      <p:cBhvr>
+                                        <p:cTn id="11" dur="1" fill="hold">
+                                          <p:stCondLst>
+                                            <p:cond delay="0"/>
+                                          </p:stCondLst>
+                                        </p:cTn>
+                                        <p:tgtEl>
+                                          <p:spTgt spid="11">
+                                            <p:txEl>
+                                              <p:pRg st="1" end="1"/>
+                                            </p:txEl>
+                                          </p:spTgt>
+                                        </p:tgtEl>
+                                        <p:attrNameLst>
+                                          <p:attrName>style.visibility</p:attrName>
+                                        </p:attrNameLst>
+                                      </p:cBhvr>
+                                      <p:to>
+                                        <p:strVal val="visible"/>
+                                      </p:to>
+                                    </p:set>
+                                    <p:animEffect transition="in" filter="fade">
+                                      <p:cBhvr>
+                                        <p:cTn id="12" dur="2000"/>
+                                        <p:tgtEl>
+                                          <p:spTgt spid="11">
+                                            <p:txEl>
+                                              <p:pRg st="1" end="1"/>
+                                            </p:txEl>
+                                          </p:spTgt>
+                                        </p:tgtEl>
+                                      </p:cBhvr>
+                                    </p:animEffect>
+                                  </p:childTnLst>
+                                </p:cTn>
+                              </p:par>
+                            </p:childTnLst>
+                          </p:cTn>
+                        </p:par>
+                      </p:childTnLst>
+                    </p:cTn>
+                  </p:par>
+                  <p:par>
+                    <p:cTn id="13" fill="hold">
+                      <p:stCondLst>
+                        <p:cond delay="indefinite"/>
+                      </p:stCondLst>
+                      <p:childTnLst>
+                        <p:par>
+                          <p:cTn id="14" fill="hold">
+                            <p:stCondLst>
+                              <p:cond delay="0"/>
+                            </p:stCondLst>
+                            <p:childTnLst>
+                              <p:par>
+                                <p:cTn id="15" presetID="10" presetClass="entr" presetSubtype="0" fill="hold" grpId="0" nodeType="clickEffect">
+                                  <p:stCondLst>
+                                    <p:cond delay="0"/>
+                                  </p:stCondLst>
+                                  <p:childTnLst>
+                                    <p:set>
+                                      <p:cBhvr>
+                                        <p:cTn id="16" dur="1" fill="hold">
+                                          <p:stCondLst>
+                                            <p:cond delay="0"/>
+                                          </p:stCondLst>
+                                        </p:cTn>
+                                        <p:tgtEl>
+                                          <p:spTgt spid="11">
+                                            <p:txEl>
+                                              <p:pRg st="2" end="2"/>
+                                            </p:txEl>
+                                          </p:spTgt>
+                                        </p:tgtEl>
+                                        <p:attrNameLst>
+                                          <p:attrName>style.visibility</p:attrName>
+                                        </p:attrNameLst>
+                                      </p:cBhvr>
+                                      <p:to>
+                                        <p:strVal val="visible"/>
+                                      </p:to>
+                                    </p:set>
+                                    <p:animEffect transition="in" filter="fade">
+                                      <p:cBhvr>
+                                        <p:cTn id="17" dur="2000"/>
+                                        <p:tgtEl>
+                                          <p:spTgt spid="11">
+                                            <p:txEl>
+                                              <p:pRg st="2" end="2"/>
+                                            </p:txEl>
+                                          </p:spTgt>
+                                        </p:tgtEl>
+                                      </p:cBhvr>
+                                    </p:animEffect>
+                                  </p:childTnLst>
+                                </p:cTn>
+                              </p:par>
+                            </p:childTnLst>
+                          </p:cTn>
+                        </p:par>
+                      </p:childTnLst>
+                    </p:cTn>
+                  </p:par>
+                  <p:par>
+                    <p:cTn id="18" fill="hold">
+                      <p:stCondLst>
+                        <p:cond delay="indefinite"/>
+                      </p:stCondLst>
+                      <p:childTnLst>
+                        <p:par>
+                          <p:cTn id="19" fill="hold">
+                            <p:stCondLst>
+                              <p:cond delay="0"/>
+                            </p:stCondLst>
+                            <p:childTnLst>
+                              <p:par>
+                                <p:cTn id="20" presetID="10" presetClass="entr" presetSubtype="0" fill="hold" grpId="0" nodeType="clickEffect">
+                                  <p:stCondLst>
+                                    <p:cond delay="0"/>
+                                  </p:stCondLst>
+                                  <p:childTnLst>
+                                    <p:set>
+                                      <p:cBhvr>
+                                        <p:cTn id="21" dur="1" fill="hold">
+                                          <p:stCondLst>
+                                            <p:cond delay="0"/>
+                                          </p:stCondLst>
+                                        </p:cTn>
+                                        <p:tgtEl>
+                                          <p:spTgt spid="11">
+                                            <p:txEl>
+                                              <p:pRg st="3" end="3"/>
+                                            </p:txEl>
+                                          </p:spTgt>
+                                        </p:tgtEl>
+                                        <p:attrNameLst>
+                                          <p:attrName>style.visibility</p:attrName>
+                                        </p:attrNameLst>
+                                      </p:cBhvr>
+                                      <p:to>
+                                        <p:strVal val="visible"/>
+                                      </p:to>
+                                    </p:set>
+                                    <p:animEffect transition="in" filter="fade">
+                                      <p:cBhvr>
+                                        <p:cTn id="22" dur="2000"/>
+                                        <p:tgtEl>
+                                          <p:spTgt spid="11">
+                                            <p:txEl>
+                                              <p:pRg st="3" end="3"/>
+                                            </p:txEl>
+                                          </p:spTgt>
+                                        </p:tgtEl>
+                                      </p:cBhvr>
+                                    </p:animEffect>
+                                  </p:childTnLst>
+                                </p:cTn>
+                              </p:par>
+                            </p:childTnLst>
+                          </p:cTn>
+                        </p:par>
+                      </p:childTnLst>
+                    </p:cTn>
+                  </p:par>
+                  <p:par>
+                    <p:cTn id="23" fill="hold">
+                      <p:stCondLst>
+                        <p:cond delay="indefinite"/>
+                      </p:stCondLst>
+                      <p:childTnLst>
+                        <p:par>
+                          <p:cTn id="24" fill="hold">
+                            <p:stCondLst>
+                              <p:cond delay="0"/>
+                            </p:stCondLst>
+                            <p:childTnLst>
+                              <p:par>
+                                <p:cTn id="25" presetID="10" presetClass="entr" presetSubtype="0" fill="hold" grpId="0" nodeType="clickEffect">
+                                  <p:stCondLst>
+                                    <p:cond delay="0"/>
+                                  </p:stCondLst>
+                                  <p:childTnLst>
+                                    <p:set>
+                                      <p:cBhvr>
+                                        <p:cTn id="26" dur="1" fill="hold">
+                                          <p:stCondLst>
+                                            <p:cond delay="0"/>
+                                          </p:stCondLst>
+                                        </p:cTn>
+                                        <p:tgtEl>
+                                          <p:spTgt spid="11">
+                                            <p:txEl>
+                                              <p:pRg st="4" end="4"/>
+                                            </p:txEl>
+                                          </p:spTgt>
+                                        </p:tgtEl>
+                                        <p:attrNameLst>
+                                          <p:attrName>style.visibility</p:attrName>
+                                        </p:attrNameLst>
+                                      </p:cBhvr>
+                                      <p:to>
+                                        <p:strVal val="visible"/>
+                                      </p:to>
+                                    </p:set>
+                                    <p:animEffect transition="in" filter="fade">
+                                      <p:cBhvr>
+                                        <p:cTn id="27" dur="2000"/>
+                                        <p:tgtEl>
+                                          <p:spTgt spid="11">
+                                            <p:txEl>
+                                              <p:pRg st="4" end="4"/>
+                                            </p:txEl>
+                                          </p:spTgt>
+                                        </p:tgtEl>
+                                      </p:cBhvr>
+                                    </p:animEffect>
+                                  </p:childTnLst>
+                                </p:cTn>
+                              </p:par>
+                            </p:childTnLst>
+                          </p:cTn>
+                        </p:par>
+                      </p:childTnLst>
+                    </p:cTn>
+                  </p:par>
+                </p:childTnLst>
+              </p:cTn>
+              <p:prevCondLst>
+                <p:cond evt="onPrev" delay="0">
+                  <p:tgtEl>
+                    <p:sldTgt/>
+                  </p:tgtEl>
+                </p:cond>
+              </p:prevCondLst>
+              <p:nextCondLst>
+                <p:cond evt="onNext" delay="0">
+                  <p:tgtEl>
+                    <p:sldTgt/>
+                  </p:tgtEl>
+                </p:cond>
+              </p:nextCondLst>
+            </p:seq>
+          </p:childTnLst>
+        </p:cTn>
+      </p:par>
+    </p:tnLst>
+    <p:bldLst>
+      <p:bldP spid="11" grpId="0" build="p"/>
+    </p:bldLst>
+  </p:timing>
+</p:sld>
+</file>
+
+<file path=ppt/slides/slide14.xml><?xml version="1.0" encoding="utf-8"?>
+<p:sld xmlns:a="http://schemas.openxmlformats.org/drawingml/2006/main" xmlns:r="http://schemas.openxmlformats.org/officeDocument/2006/relationships" xmlns:p="http://schemas.openxmlformats.org/presentationml/2006/main">
+  <p:cSld>
+    <p:spTree>
+      <p:nvGrpSpPr>
+        <p:cNvPr id="1" name=""/>
+        <p:cNvGrpSpPr/>
+        <p:nvPr/>
+      </p:nvGrpSpPr>
+      <p:grpSpPr>
+        <a:xfrm>
+          <a:off x="0" y="0"/>
+          <a:ext cx="0" cy="0"/>
+          <a:chOff x="0" y="0"/>
+          <a:chExt cx="0" cy="0"/>
+        </a:xfrm>
+      </p:grpSpPr>
+      <p:sp>
+        <p:nvSpPr>
+          <p:cNvPr id="4" name="Rectangle 3"/>
+          <p:cNvSpPr/>
+          <p:nvPr/>
+        </p:nvSpPr>
+        <p:spPr>
+          <a:xfrm>
+            <a:off x="0" y="6096000"/>
+            <a:ext cx="9144000" cy="762000"/>
+          </a:xfrm>
+          <a:prstGeom prst="rect">
+            <a:avLst/>
+          </a:prstGeom>
+          <a:solidFill>
+            <a:schemeClr val="tx1">
+              <a:lumMod val="85000"/>
+              <a:lumOff val="15000"/>
+            </a:schemeClr>
+          </a:solidFill>
+        </p:spPr>
+        <p:style>
+          <a:lnRef idx="2">
+            <a:schemeClr val="accent1">
+              <a:shade val="50000"/>
+            </a:schemeClr>
+          </a:lnRef>
+          <a:fillRef idx="1">
+            <a:schemeClr val="accent1"/>
+          </a:fillRef>
+          <a:effectRef idx="0">
+            <a:schemeClr val="accent1"/>
+          </a:effectRef>
+          <a:fontRef idx="minor">
+            <a:schemeClr val="lt1"/>
+          </a:fontRef>
+        </p:style>
+        <p:txBody>
+          <a:bodyPr rtlCol="0" anchor="ctr"/>
+          <a:lstStyle/>
+          <a:p>
+            <a:pPr algn="ctr"/>
+            <a:endParaRPr lang="en-US"/>
+          </a:p>
+        </p:txBody>
+      </p:sp>
+      <p:pic>
+        <p:nvPicPr>
+          <p:cNvPr id="1027" name="Picture 3"/>
+          <p:cNvPicPr>
+            <a:picLocks noChangeAspect="1" noChangeArrowheads="1"/>
+          </p:cNvPicPr>
+          <p:nvPr/>
+        </p:nvPicPr>
+        <p:blipFill>
+          <a:blip r:embed="rId3" cstate="print"/>
+          <a:srcRect/>
+          <a:stretch>
+            <a:fillRect/>
+          </a:stretch>
+        </p:blipFill>
+        <p:spPr bwMode="auto">
+          <a:xfrm>
+            <a:off x="228600" y="6248400"/>
+            <a:ext cx="1371600" cy="410346"/>
+          </a:xfrm>
+          <a:prstGeom prst="rect">
+            <a:avLst/>
+          </a:prstGeom>
+          <a:noFill/>
+          <a:ln w="9525">
+            <a:noFill/>
+            <a:miter lim="800000"/>
+            <a:headEnd/>
+            <a:tailEnd/>
+          </a:ln>
+          <a:effectLst/>
+        </p:spPr>
+      </p:pic>
+      <p:sp>
+        <p:nvSpPr>
+          <p:cNvPr id="10" name="TextBox 9"/>
+          <p:cNvSpPr txBox="1"/>
+          <p:nvPr/>
+        </p:nvSpPr>
+        <p:spPr>
+          <a:xfrm>
+            <a:off x="2057400" y="6324600"/>
+            <a:ext cx="4419600" cy="369332"/>
+          </a:xfrm>
+          <a:prstGeom prst="rect">
+            <a:avLst/>
+          </a:prstGeom>
+          <a:noFill/>
+        </p:spPr>
+        <p:txBody>
+          <a:bodyPr wrap="square" rtlCol="0">
+            <a:spAutoFit/>
+          </a:bodyPr>
+          <a:lstStyle/>
+          <a:p>
+            <a:r>
+              <a:rPr lang="en-US" dirty="0" smtClean="0">
+                <a:solidFill>
+                  <a:schemeClr val="bg1"/>
+                </a:solidFill>
+                <a:latin typeface="Verdana" pitchFamily="34" charset="0"/>
+                <a:ea typeface="Verdana" pitchFamily="34" charset="0"/>
+                <a:cs typeface="Verdana" pitchFamily="34" charset="0"/>
+              </a:rPr>
+              <a:t>Testing web applications &amp; services</a:t>
+            </a:r>
+            <a:endParaRPr lang="en-US" dirty="0">
+              <a:solidFill>
+                <a:schemeClr val="bg1"/>
+              </a:solidFill>
+              <a:latin typeface="Verdana" pitchFamily="34" charset="0"/>
+              <a:ea typeface="Verdana" pitchFamily="34" charset="0"/>
+              <a:cs typeface="Verdana" pitchFamily="34" charset="0"/>
+            </a:endParaRPr>
+          </a:p>
+        </p:txBody>
+      </p:sp>
+      <p:pic>
+        <p:nvPicPr>
+          <p:cNvPr id="1033" name="Picture 9"/>
+          <p:cNvPicPr>
+            <a:picLocks noChangeAspect="1" noChangeArrowheads="1"/>
+          </p:cNvPicPr>
+          <p:nvPr/>
+        </p:nvPicPr>
+        <p:blipFill>
+          <a:blip r:embed="rId4" cstate="print"/>
+          <a:srcRect/>
+          <a:stretch>
+            <a:fillRect/>
+          </a:stretch>
+        </p:blipFill>
+        <p:spPr bwMode="auto">
+          <a:xfrm>
+            <a:off x="6934202" y="6248400"/>
+            <a:ext cx="1981195" cy="431239"/>
+          </a:xfrm>
+          <a:prstGeom prst="rect">
+            <a:avLst/>
+          </a:prstGeom>
+          <a:noFill/>
+          <a:ln w="9525">
+            <a:noFill/>
+            <a:miter lim="800000"/>
+            <a:headEnd/>
+            <a:tailEnd/>
+          </a:ln>
+          <a:effectLst/>
+        </p:spPr>
+      </p:pic>
+      <p:sp>
+        <p:nvSpPr>
+          <p:cNvPr id="8" name="TextBox 7"/>
+          <p:cNvSpPr txBox="1"/>
+          <p:nvPr/>
+        </p:nvSpPr>
+        <p:spPr>
+          <a:xfrm>
+            <a:off x="0" y="914400"/>
+            <a:ext cx="9144000" cy="830997"/>
+          </a:xfrm>
+          <a:prstGeom prst="rect">
+            <a:avLst/>
+          </a:prstGeom>
+          <a:noFill/>
+        </p:spPr>
+        <p:txBody>
+          <a:bodyPr wrap="square" rtlCol="0">
+            <a:spAutoFit/>
+          </a:bodyPr>
+          <a:lstStyle/>
+          <a:p>
+            <a:pPr algn="ctr"/>
+            <a:r>
+              <a:rPr lang="en-US" sz="4800" dirty="0" smtClean="0"/>
+              <a:t>Horizontal Scaling</a:t>
+            </a:r>
+            <a:endParaRPr lang="en-US" sz="4800" dirty="0"/>
+          </a:p>
+        </p:txBody>
+      </p:sp>
+      <p:sp>
+        <p:nvSpPr>
+          <p:cNvPr id="2" name="TextBox 1"/>
+          <p:cNvSpPr txBox="1"/>
+          <p:nvPr/>
+        </p:nvSpPr>
+        <p:spPr>
+          <a:xfrm>
+            <a:off x="228600" y="2133600"/>
+            <a:ext cx="1828800" cy="369332"/>
+          </a:xfrm>
+          <a:prstGeom prst="rect">
+            <a:avLst/>
+          </a:prstGeom>
+          <a:noFill/>
+        </p:spPr>
+        <p:txBody>
+          <a:bodyPr wrap="square" rtlCol="0">
+            <a:spAutoFit/>
+          </a:bodyPr>
+          <a:lstStyle/>
+          <a:p>
+            <a:r>
+              <a:rPr lang="en-US" smtClean="0"/>
+              <a:t>`</a:t>
+            </a:r>
+            <a:endParaRPr lang="en-US"/>
+          </a:p>
+        </p:txBody>
+      </p:sp>
+      <p:sp>
+        <p:nvSpPr>
+          <p:cNvPr id="11" name="TextBox 10"/>
+          <p:cNvSpPr txBox="1"/>
+          <p:nvPr/>
+        </p:nvSpPr>
+        <p:spPr>
+          <a:xfrm>
+            <a:off x="2057400" y="2057400"/>
+            <a:ext cx="4953000" cy="1754326"/>
+          </a:xfrm>
+          <a:prstGeom prst="rect">
+            <a:avLst/>
+          </a:prstGeom>
+          <a:noFill/>
+        </p:spPr>
+        <p:txBody>
+          <a:bodyPr wrap="square" rtlCol="0">
+            <a:spAutoFit/>
+          </a:bodyPr>
+          <a:lstStyle/>
+          <a:p>
+            <a:r>
+              <a:rPr lang="en-US" sz="3600" dirty="0" smtClean="0"/>
+              <a:t>Many clients</a:t>
+            </a:r>
+            <a:endParaRPr lang="en-US" sz="3600" dirty="0" smtClean="0"/>
+          </a:p>
+          <a:p>
+            <a:r>
+              <a:rPr lang="en-US" sz="3600" dirty="0" smtClean="0"/>
+              <a:t>Many servers</a:t>
+            </a:r>
+          </a:p>
+          <a:p>
+            <a:endParaRPr lang="en-US" sz="3600" dirty="0" smtClean="0"/>
+          </a:p>
+        </p:txBody>
+      </p:sp>
+      <p:sp>
+        <p:nvSpPr>
+          <p:cNvPr id="14" name="TextBox 13"/>
+          <p:cNvSpPr txBox="1"/>
+          <p:nvPr/>
+        </p:nvSpPr>
+        <p:spPr>
+          <a:xfrm>
+            <a:off x="6858000" y="0"/>
+            <a:ext cx="2286000" cy="584775"/>
+          </a:xfrm>
+          <a:prstGeom prst="rect">
+            <a:avLst/>
+          </a:prstGeom>
+          <a:solidFill>
+            <a:schemeClr val="bg2">
+              <a:lumMod val="75000"/>
+            </a:schemeClr>
+          </a:solidFill>
+        </p:spPr>
+        <p:txBody>
+          <a:bodyPr wrap="square" rtlCol="0">
+            <a:spAutoFit/>
+          </a:bodyPr>
+          <a:lstStyle/>
+          <a:p>
+            <a:r>
+              <a:rPr lang="en-US" sz="3200" dirty="0" smtClean="0"/>
+              <a:t>Architecture</a:t>
+            </a:r>
+            <a:endParaRPr lang="en-US" sz="3200" dirty="0"/>
+          </a:p>
+        </p:txBody>
+      </p:sp>
+    </p:spTree>
+  </p:cSld>
+  <p:clrMapOvr>
+    <a:masterClrMapping/>
+  </p:clrMapOvr>
+  <p:timing>
+    <p:tnLst>
+      <p:par>
+        <p:cTn id="1" dur="indefinite" restart="never" nodeType="tmRoot"/>
+      </p:par>
+    </p:tnLst>
+  </p:timing>
+</p:sld>
+</file>
+
+<file path=ppt/slides/slide15.xml><?xml version="1.0" encoding="utf-8"?>
+<p:sld xmlns:a="http://schemas.openxmlformats.org/drawingml/2006/main" xmlns:r="http://schemas.openxmlformats.org/officeDocument/2006/relationships" xmlns:p="http://schemas.openxmlformats.org/presentationml/2006/main">
+  <p:cSld>
+    <p:spTree>
+      <p:nvGrpSpPr>
+        <p:cNvPr id="1" name=""/>
+        <p:cNvGrpSpPr/>
+        <p:nvPr/>
+      </p:nvGrpSpPr>
+      <p:grpSpPr>
+        <a:xfrm>
+          <a:off x="0" y="0"/>
+          <a:ext cx="0" cy="0"/>
+          <a:chOff x="0" y="0"/>
+          <a:chExt cx="0" cy="0"/>
+        </a:xfrm>
+      </p:grpSpPr>
+      <p:sp>
+        <p:nvSpPr>
+          <p:cNvPr id="4" name="Rectangle 3"/>
+          <p:cNvSpPr/>
+          <p:nvPr/>
+        </p:nvSpPr>
+        <p:spPr>
+          <a:xfrm>
+            <a:off x="0" y="6096000"/>
+            <a:ext cx="9144000" cy="762000"/>
+          </a:xfrm>
+          <a:prstGeom prst="rect">
+            <a:avLst/>
+          </a:prstGeom>
+          <a:solidFill>
+            <a:schemeClr val="tx1">
+              <a:lumMod val="85000"/>
+              <a:lumOff val="15000"/>
+            </a:schemeClr>
+          </a:solidFill>
+        </p:spPr>
+        <p:style>
+          <a:lnRef idx="2">
+            <a:schemeClr val="accent1">
+              <a:shade val="50000"/>
+            </a:schemeClr>
+          </a:lnRef>
+          <a:fillRef idx="1">
+            <a:schemeClr val="accent1"/>
+          </a:fillRef>
+          <a:effectRef idx="0">
+            <a:schemeClr val="accent1"/>
+          </a:effectRef>
+          <a:fontRef idx="minor">
+            <a:schemeClr val="lt1"/>
+          </a:fontRef>
+        </p:style>
+        <p:txBody>
+          <a:bodyPr rtlCol="0" anchor="ctr"/>
+          <a:lstStyle/>
+          <a:p>
+            <a:pPr algn="ctr"/>
+            <a:endParaRPr lang="en-US"/>
+          </a:p>
+        </p:txBody>
+      </p:sp>
+      <p:pic>
+        <p:nvPicPr>
+          <p:cNvPr id="1027" name="Picture 3"/>
+          <p:cNvPicPr>
+            <a:picLocks noChangeAspect="1" noChangeArrowheads="1"/>
+          </p:cNvPicPr>
+          <p:nvPr/>
+        </p:nvPicPr>
+        <p:blipFill>
+          <a:blip r:embed="rId3" cstate="print"/>
+          <a:srcRect/>
+          <a:stretch>
+            <a:fillRect/>
+          </a:stretch>
+        </p:blipFill>
+        <p:spPr bwMode="auto">
+          <a:xfrm>
+            <a:off x="228600" y="6248400"/>
+            <a:ext cx="1371600" cy="410346"/>
+          </a:xfrm>
+          <a:prstGeom prst="rect">
+            <a:avLst/>
+          </a:prstGeom>
+          <a:noFill/>
+          <a:ln w="9525">
+            <a:noFill/>
+            <a:miter lim="800000"/>
+            <a:headEnd/>
+            <a:tailEnd/>
+          </a:ln>
+          <a:effectLst/>
+        </p:spPr>
+      </p:pic>
+      <p:sp>
+        <p:nvSpPr>
+          <p:cNvPr id="10" name="TextBox 9"/>
+          <p:cNvSpPr txBox="1"/>
+          <p:nvPr/>
+        </p:nvSpPr>
+        <p:spPr>
+          <a:xfrm>
+            <a:off x="2057400" y="6324600"/>
+            <a:ext cx="4419600" cy="369332"/>
+          </a:xfrm>
+          <a:prstGeom prst="rect">
+            <a:avLst/>
+          </a:prstGeom>
+          <a:noFill/>
+        </p:spPr>
+        <p:txBody>
+          <a:bodyPr wrap="square" rtlCol="0">
+            <a:spAutoFit/>
+          </a:bodyPr>
+          <a:lstStyle/>
+          <a:p>
+            <a:r>
+              <a:rPr lang="en-US" dirty="0" smtClean="0">
+                <a:solidFill>
+                  <a:schemeClr val="bg1"/>
+                </a:solidFill>
+                <a:latin typeface="Verdana" pitchFamily="34" charset="0"/>
+                <a:ea typeface="Verdana" pitchFamily="34" charset="0"/>
+                <a:cs typeface="Verdana" pitchFamily="34" charset="0"/>
+              </a:rPr>
+              <a:t>Testing web applications &amp; services</a:t>
+            </a:r>
+            <a:endParaRPr lang="en-US" dirty="0">
+              <a:solidFill>
+                <a:schemeClr val="bg1"/>
+              </a:solidFill>
+              <a:latin typeface="Verdana" pitchFamily="34" charset="0"/>
+              <a:ea typeface="Verdana" pitchFamily="34" charset="0"/>
+              <a:cs typeface="Verdana" pitchFamily="34" charset="0"/>
+            </a:endParaRPr>
+          </a:p>
+        </p:txBody>
+      </p:sp>
+      <p:pic>
+        <p:nvPicPr>
+          <p:cNvPr id="1033" name="Picture 9"/>
+          <p:cNvPicPr>
+            <a:picLocks noChangeAspect="1" noChangeArrowheads="1"/>
+          </p:cNvPicPr>
+          <p:nvPr/>
+        </p:nvPicPr>
+        <p:blipFill>
+          <a:blip r:embed="rId4" cstate="print"/>
+          <a:srcRect/>
+          <a:stretch>
+            <a:fillRect/>
+          </a:stretch>
+        </p:blipFill>
+        <p:spPr bwMode="auto">
+          <a:xfrm>
+            <a:off x="6934202" y="6248400"/>
+            <a:ext cx="1981195" cy="431239"/>
+          </a:xfrm>
+          <a:prstGeom prst="rect">
+            <a:avLst/>
+          </a:prstGeom>
+          <a:noFill/>
+          <a:ln w="9525">
+            <a:noFill/>
+            <a:miter lim="800000"/>
+            <a:headEnd/>
+            <a:tailEnd/>
+          </a:ln>
+          <a:effectLst/>
+        </p:spPr>
+      </p:pic>
+      <p:sp>
+        <p:nvSpPr>
+          <p:cNvPr id="8" name="TextBox 7"/>
+          <p:cNvSpPr txBox="1"/>
+          <p:nvPr/>
+        </p:nvSpPr>
+        <p:spPr>
+          <a:xfrm>
+            <a:off x="0" y="914400"/>
+            <a:ext cx="9144000" cy="830997"/>
+          </a:xfrm>
+          <a:prstGeom prst="rect">
+            <a:avLst/>
+          </a:prstGeom>
+          <a:noFill/>
+        </p:spPr>
+        <p:txBody>
+          <a:bodyPr wrap="square" rtlCol="0">
+            <a:spAutoFit/>
+          </a:bodyPr>
+          <a:lstStyle/>
+          <a:p>
+            <a:pPr algn="ctr"/>
+            <a:r>
+              <a:rPr lang="en-US" sz="4800" dirty="0" smtClean="0"/>
+              <a:t>Load balancing</a:t>
+            </a:r>
+            <a:endParaRPr lang="en-US" sz="4800" dirty="0"/>
+          </a:p>
+        </p:txBody>
+      </p:sp>
+      <p:sp>
+        <p:nvSpPr>
+          <p:cNvPr id="2" name="TextBox 1"/>
+          <p:cNvSpPr txBox="1"/>
+          <p:nvPr/>
+        </p:nvSpPr>
+        <p:spPr>
+          <a:xfrm>
+            <a:off x="228600" y="2133600"/>
+            <a:ext cx="1828800" cy="369332"/>
+          </a:xfrm>
+          <a:prstGeom prst="rect">
+            <a:avLst/>
+          </a:prstGeom>
+          <a:noFill/>
+        </p:spPr>
+        <p:txBody>
+          <a:bodyPr wrap="square" rtlCol="0">
+            <a:spAutoFit/>
+          </a:bodyPr>
+          <a:lstStyle/>
+          <a:p>
+            <a:r>
+              <a:rPr lang="en-US" smtClean="0"/>
+              <a:t>`</a:t>
+            </a:r>
+            <a:endParaRPr lang="en-US"/>
+          </a:p>
+        </p:txBody>
+      </p:sp>
+      <p:sp>
+        <p:nvSpPr>
+          <p:cNvPr id="14" name="TextBox 13"/>
+          <p:cNvSpPr txBox="1"/>
+          <p:nvPr/>
+        </p:nvSpPr>
+        <p:spPr>
+          <a:xfrm>
+            <a:off x="6858000" y="0"/>
+            <a:ext cx="2286000" cy="584775"/>
+          </a:xfrm>
+          <a:prstGeom prst="rect">
+            <a:avLst/>
+          </a:prstGeom>
+          <a:solidFill>
+            <a:schemeClr val="bg2">
+              <a:lumMod val="75000"/>
+            </a:schemeClr>
+          </a:solidFill>
+        </p:spPr>
+        <p:txBody>
+          <a:bodyPr wrap="square" rtlCol="0">
+            <a:spAutoFit/>
+          </a:bodyPr>
+          <a:lstStyle/>
+          <a:p>
+            <a:r>
+              <a:rPr lang="en-US" sz="3200" dirty="0" smtClean="0"/>
+              <a:t>Architecture</a:t>
+            </a:r>
+            <a:endParaRPr lang="en-US" sz="3200" dirty="0"/>
+          </a:p>
+        </p:txBody>
+      </p:sp>
+      <p:pic>
+        <p:nvPicPr>
+          <p:cNvPr id="16" name="Picture 15" descr="load_balancer.png"/>
+          <p:cNvPicPr>
+            <a:picLocks noChangeAspect="1"/>
+          </p:cNvPicPr>
+          <p:nvPr/>
+        </p:nvPicPr>
+        <p:blipFill>
+          <a:blip r:embed="rId5" cstate="print"/>
+          <a:stretch>
+            <a:fillRect/>
+          </a:stretch>
+        </p:blipFill>
+        <p:spPr>
+          <a:xfrm>
+            <a:off x="1371600" y="1748072"/>
+            <a:ext cx="6605587" cy="4272871"/>
+          </a:xfrm>
+          <a:prstGeom prst="rect">
+            <a:avLst/>
+          </a:prstGeom>
+        </p:spPr>
+      </p:pic>
+    </p:spTree>
+  </p:cSld>
+  <p:clrMapOvr>
+    <a:masterClrMapping/>
+  </p:clrMapOvr>
+  <p:timing>
+    <p:tnLst>
+      <p:par>
+        <p:cTn id="1" dur="indefinite" restart="never" nodeType="tmRoot"/>
+      </p:par>
+    </p:tnLst>
+  </p:timing>
+</p:sld>
+</file>
+
+<file path=ppt/slides/slide16.xml><?xml version="1.0" encoding="utf-8"?>
+<p:sld xmlns:a="http://schemas.openxmlformats.org/drawingml/2006/main" xmlns:r="http://schemas.openxmlformats.org/officeDocument/2006/relationships" xmlns:p="http://schemas.openxmlformats.org/presentationml/2006/main">
+  <p:cSld>
+    <p:spTree>
+      <p:nvGrpSpPr>
+        <p:cNvPr id="1" name=""/>
+        <p:cNvGrpSpPr/>
+        <p:nvPr/>
+      </p:nvGrpSpPr>
+      <p:grpSpPr>
+        <a:xfrm>
+          <a:off x="0" y="0"/>
+          <a:ext cx="0" cy="0"/>
+          <a:chOff x="0" y="0"/>
+          <a:chExt cx="0" cy="0"/>
+        </a:xfrm>
+      </p:grpSpPr>
+      <p:sp>
+        <p:nvSpPr>
+          <p:cNvPr id="4" name="Rectangle 3"/>
+          <p:cNvSpPr/>
+          <p:nvPr/>
+        </p:nvSpPr>
+        <p:spPr>
+          <a:xfrm>
+            <a:off x="0" y="6096000"/>
+            <a:ext cx="9144000" cy="762000"/>
+          </a:xfrm>
+          <a:prstGeom prst="rect">
+            <a:avLst/>
+          </a:prstGeom>
+          <a:solidFill>
+            <a:schemeClr val="tx1">
+              <a:lumMod val="85000"/>
+              <a:lumOff val="15000"/>
+            </a:schemeClr>
+          </a:solidFill>
+        </p:spPr>
+        <p:style>
+          <a:lnRef idx="2">
+            <a:schemeClr val="accent1">
+              <a:shade val="50000"/>
+            </a:schemeClr>
+          </a:lnRef>
+          <a:fillRef idx="1">
+            <a:schemeClr val="accent1"/>
+          </a:fillRef>
+          <a:effectRef idx="0">
+            <a:schemeClr val="accent1"/>
+          </a:effectRef>
+          <a:fontRef idx="minor">
+            <a:schemeClr val="lt1"/>
+          </a:fontRef>
+        </p:style>
+        <p:txBody>
+          <a:bodyPr rtlCol="0" anchor="ctr"/>
+          <a:lstStyle/>
+          <a:p>
+            <a:pPr algn="ctr"/>
+            <a:endParaRPr lang="en-US"/>
+          </a:p>
+        </p:txBody>
+      </p:sp>
+      <p:pic>
+        <p:nvPicPr>
+          <p:cNvPr id="1027" name="Picture 3"/>
+          <p:cNvPicPr>
+            <a:picLocks noChangeAspect="1" noChangeArrowheads="1"/>
+          </p:cNvPicPr>
+          <p:nvPr/>
+        </p:nvPicPr>
+        <p:blipFill>
+          <a:blip r:embed="rId3" cstate="print"/>
+          <a:srcRect/>
+          <a:stretch>
+            <a:fillRect/>
+          </a:stretch>
+        </p:blipFill>
+        <p:spPr bwMode="auto">
+          <a:xfrm>
+            <a:off x="228600" y="6248400"/>
+            <a:ext cx="1371600" cy="410346"/>
+          </a:xfrm>
+          <a:prstGeom prst="rect">
+            <a:avLst/>
+          </a:prstGeom>
+          <a:noFill/>
+          <a:ln w="9525">
+            <a:noFill/>
+            <a:miter lim="800000"/>
+            <a:headEnd/>
+            <a:tailEnd/>
+          </a:ln>
+          <a:effectLst/>
+        </p:spPr>
+      </p:pic>
+      <p:sp>
+        <p:nvSpPr>
+          <p:cNvPr id="10" name="TextBox 9"/>
+          <p:cNvSpPr txBox="1"/>
+          <p:nvPr/>
+        </p:nvSpPr>
+        <p:spPr>
+          <a:xfrm>
+            <a:off x="2057400" y="6324600"/>
+            <a:ext cx="4419600" cy="369332"/>
+          </a:xfrm>
+          <a:prstGeom prst="rect">
+            <a:avLst/>
+          </a:prstGeom>
+          <a:noFill/>
+        </p:spPr>
+        <p:txBody>
+          <a:bodyPr wrap="square" rtlCol="0">
+            <a:spAutoFit/>
+          </a:bodyPr>
+          <a:lstStyle/>
+          <a:p>
+            <a:r>
+              <a:rPr lang="en-US" dirty="0" smtClean="0">
+                <a:solidFill>
+                  <a:schemeClr val="bg1"/>
+                </a:solidFill>
+                <a:latin typeface="Verdana" pitchFamily="34" charset="0"/>
+                <a:ea typeface="Verdana" pitchFamily="34" charset="0"/>
+                <a:cs typeface="Verdana" pitchFamily="34" charset="0"/>
+              </a:rPr>
+              <a:t>Testing web applications &amp; services</a:t>
+            </a:r>
+            <a:endParaRPr lang="en-US" dirty="0">
+              <a:solidFill>
+                <a:schemeClr val="bg1"/>
+              </a:solidFill>
+              <a:latin typeface="Verdana" pitchFamily="34" charset="0"/>
+              <a:ea typeface="Verdana" pitchFamily="34" charset="0"/>
+              <a:cs typeface="Verdana" pitchFamily="34" charset="0"/>
+            </a:endParaRPr>
+          </a:p>
+        </p:txBody>
+      </p:sp>
+      <p:pic>
+        <p:nvPicPr>
+          <p:cNvPr id="1033" name="Picture 9"/>
+          <p:cNvPicPr>
+            <a:picLocks noChangeAspect="1" noChangeArrowheads="1"/>
+          </p:cNvPicPr>
+          <p:nvPr/>
+        </p:nvPicPr>
+        <p:blipFill>
+          <a:blip r:embed="rId4" cstate="print"/>
+          <a:srcRect/>
+          <a:stretch>
+            <a:fillRect/>
+          </a:stretch>
+        </p:blipFill>
+        <p:spPr bwMode="auto">
+          <a:xfrm>
+            <a:off x="6934202" y="6248400"/>
+            <a:ext cx="1981195" cy="431239"/>
+          </a:xfrm>
+          <a:prstGeom prst="rect">
+            <a:avLst/>
+          </a:prstGeom>
+          <a:noFill/>
+          <a:ln w="9525">
+            <a:noFill/>
+            <a:miter lim="800000"/>
+            <a:headEnd/>
+            <a:tailEnd/>
+          </a:ln>
+          <a:effectLst/>
+        </p:spPr>
+      </p:pic>
+      <p:sp>
+        <p:nvSpPr>
+          <p:cNvPr id="13" name="TextBox 12"/>
+          <p:cNvSpPr txBox="1"/>
+          <p:nvPr/>
+        </p:nvSpPr>
+        <p:spPr>
+          <a:xfrm>
             <a:off x="7315200" y="0"/>
             <a:ext cx="1828800" cy="584775"/>
           </a:xfrm>
@@ -9499,6 +11302,738 @@
         </p:nvSpPr>
         <p:spPr>
           <a:xfrm>
+            <a:off x="0" y="914400"/>
+            <a:ext cx="9144000" cy="830997"/>
+          </a:xfrm>
+          <a:prstGeom prst="rect">
+            <a:avLst/>
+          </a:prstGeom>
+          <a:noFill/>
+        </p:spPr>
+        <p:txBody>
+          <a:bodyPr wrap="square" rtlCol="0">
+            <a:spAutoFit/>
+          </a:bodyPr>
+          <a:lstStyle/>
+          <a:p>
+            <a:pPr algn="ctr"/>
+            <a:r>
+              <a:rPr lang="en-US" sz="4800" dirty="0" smtClean="0"/>
+              <a:t>The cloud</a:t>
+            </a:r>
+            <a:endParaRPr lang="en-US" sz="4800" dirty="0"/>
+          </a:p>
+        </p:txBody>
+      </p:sp>
+      <p:sp>
+        <p:nvSpPr>
+          <p:cNvPr id="2" name="TextBox 1"/>
+          <p:cNvSpPr txBox="1"/>
+          <p:nvPr/>
+        </p:nvSpPr>
+        <p:spPr>
+          <a:xfrm>
+            <a:off x="228600" y="2133600"/>
+            <a:ext cx="1828800" cy="369332"/>
+          </a:xfrm>
+          <a:prstGeom prst="rect">
+            <a:avLst/>
+          </a:prstGeom>
+          <a:noFill/>
+        </p:spPr>
+        <p:txBody>
+          <a:bodyPr wrap="square" rtlCol="0">
+            <a:spAutoFit/>
+          </a:bodyPr>
+          <a:lstStyle/>
+          <a:p>
+            <a:r>
+              <a:rPr lang="en-US" smtClean="0"/>
+              <a:t>`</a:t>
+            </a:r>
+            <a:endParaRPr lang="en-US"/>
+          </a:p>
+        </p:txBody>
+      </p:sp>
+      <p:sp>
+        <p:nvSpPr>
+          <p:cNvPr id="12" name="Rectangle 11"/>
+          <p:cNvSpPr/>
+          <p:nvPr/>
+        </p:nvSpPr>
+        <p:spPr>
+          <a:xfrm>
+            <a:off x="1600200" y="3048000"/>
+            <a:ext cx="5412251" cy="646331"/>
+          </a:xfrm>
+          <a:prstGeom prst="rect">
+            <a:avLst/>
+          </a:prstGeom>
+        </p:spPr>
+        <p:txBody>
+          <a:bodyPr wrap="none">
+            <a:spAutoFit/>
+          </a:bodyPr>
+          <a:lstStyle/>
+          <a:p>
+            <a:r>
+              <a:rPr lang="en-US" sz="3600" dirty="0" smtClean="0"/>
+              <a:t>Shared nothing architecture</a:t>
+            </a:r>
+            <a:endParaRPr lang="en-US" sz="3600" dirty="0"/>
+          </a:p>
+        </p:txBody>
+      </p:sp>
+    </p:spTree>
+  </p:cSld>
+  <p:clrMapOvr>
+    <a:masterClrMapping/>
+  </p:clrMapOvr>
+  <p:timing>
+    <p:tnLst>
+      <p:par>
+        <p:cTn id="1" dur="indefinite" restart="never" nodeType="tmRoot"/>
+      </p:par>
+    </p:tnLst>
+  </p:timing>
+</p:sld>
+</file>
+
+<file path=ppt/slides/slide17.xml><?xml version="1.0" encoding="utf-8"?>
+<p:sld xmlns:a="http://schemas.openxmlformats.org/drawingml/2006/main" xmlns:r="http://schemas.openxmlformats.org/officeDocument/2006/relationships" xmlns:p="http://schemas.openxmlformats.org/presentationml/2006/main">
+  <p:cSld>
+    <p:spTree>
+      <p:nvGrpSpPr>
+        <p:cNvPr id="1" name=""/>
+        <p:cNvGrpSpPr/>
+        <p:nvPr/>
+      </p:nvGrpSpPr>
+      <p:grpSpPr>
+        <a:xfrm>
+          <a:off x="0" y="0"/>
+          <a:ext cx="0" cy="0"/>
+          <a:chOff x="0" y="0"/>
+          <a:chExt cx="0" cy="0"/>
+        </a:xfrm>
+      </p:grpSpPr>
+      <p:sp>
+        <p:nvSpPr>
+          <p:cNvPr id="4" name="Rectangle 3"/>
+          <p:cNvSpPr/>
+          <p:nvPr/>
+        </p:nvSpPr>
+        <p:spPr>
+          <a:xfrm>
+            <a:off x="0" y="6096000"/>
+            <a:ext cx="9144000" cy="762000"/>
+          </a:xfrm>
+          <a:prstGeom prst="rect">
+            <a:avLst/>
+          </a:prstGeom>
+          <a:solidFill>
+            <a:schemeClr val="tx1">
+              <a:lumMod val="85000"/>
+              <a:lumOff val="15000"/>
+            </a:schemeClr>
+          </a:solidFill>
+        </p:spPr>
+        <p:style>
+          <a:lnRef idx="2">
+            <a:schemeClr val="accent1">
+              <a:shade val="50000"/>
+            </a:schemeClr>
+          </a:lnRef>
+          <a:fillRef idx="1">
+            <a:schemeClr val="accent1"/>
+          </a:fillRef>
+          <a:effectRef idx="0">
+            <a:schemeClr val="accent1"/>
+          </a:effectRef>
+          <a:fontRef idx="minor">
+            <a:schemeClr val="lt1"/>
+          </a:fontRef>
+        </p:style>
+        <p:txBody>
+          <a:bodyPr rtlCol="0" anchor="ctr"/>
+          <a:lstStyle/>
+          <a:p>
+            <a:pPr algn="ctr"/>
+            <a:endParaRPr lang="en-US"/>
+          </a:p>
+        </p:txBody>
+      </p:sp>
+      <p:pic>
+        <p:nvPicPr>
+          <p:cNvPr id="1027" name="Picture 3"/>
+          <p:cNvPicPr>
+            <a:picLocks noChangeAspect="1" noChangeArrowheads="1"/>
+          </p:cNvPicPr>
+          <p:nvPr/>
+        </p:nvPicPr>
+        <p:blipFill>
+          <a:blip r:embed="rId3" cstate="print"/>
+          <a:srcRect/>
+          <a:stretch>
+            <a:fillRect/>
+          </a:stretch>
+        </p:blipFill>
+        <p:spPr bwMode="auto">
+          <a:xfrm>
+            <a:off x="228600" y="6248400"/>
+            <a:ext cx="1371600" cy="410346"/>
+          </a:xfrm>
+          <a:prstGeom prst="rect">
+            <a:avLst/>
+          </a:prstGeom>
+          <a:noFill/>
+          <a:ln w="9525">
+            <a:noFill/>
+            <a:miter lim="800000"/>
+            <a:headEnd/>
+            <a:tailEnd/>
+          </a:ln>
+          <a:effectLst/>
+        </p:spPr>
+      </p:pic>
+      <p:sp>
+        <p:nvSpPr>
+          <p:cNvPr id="10" name="TextBox 9"/>
+          <p:cNvSpPr txBox="1"/>
+          <p:nvPr/>
+        </p:nvSpPr>
+        <p:spPr>
+          <a:xfrm>
+            <a:off x="2057400" y="6324600"/>
+            <a:ext cx="4419600" cy="369332"/>
+          </a:xfrm>
+          <a:prstGeom prst="rect">
+            <a:avLst/>
+          </a:prstGeom>
+          <a:noFill/>
+        </p:spPr>
+        <p:txBody>
+          <a:bodyPr wrap="square" rtlCol="0">
+            <a:spAutoFit/>
+          </a:bodyPr>
+          <a:lstStyle/>
+          <a:p>
+            <a:r>
+              <a:rPr lang="en-US" dirty="0" smtClean="0">
+                <a:solidFill>
+                  <a:schemeClr val="bg1"/>
+                </a:solidFill>
+                <a:latin typeface="Verdana" pitchFamily="34" charset="0"/>
+                <a:ea typeface="Verdana" pitchFamily="34" charset="0"/>
+                <a:cs typeface="Verdana" pitchFamily="34" charset="0"/>
+              </a:rPr>
+              <a:t>Testing web applications &amp; services</a:t>
+            </a:r>
+            <a:endParaRPr lang="en-US" dirty="0">
+              <a:solidFill>
+                <a:schemeClr val="bg1"/>
+              </a:solidFill>
+              <a:latin typeface="Verdana" pitchFamily="34" charset="0"/>
+              <a:ea typeface="Verdana" pitchFamily="34" charset="0"/>
+              <a:cs typeface="Verdana" pitchFamily="34" charset="0"/>
+            </a:endParaRPr>
+          </a:p>
+        </p:txBody>
+      </p:sp>
+      <p:pic>
+        <p:nvPicPr>
+          <p:cNvPr id="1033" name="Picture 9"/>
+          <p:cNvPicPr>
+            <a:picLocks noChangeAspect="1" noChangeArrowheads="1"/>
+          </p:cNvPicPr>
+          <p:nvPr/>
+        </p:nvPicPr>
+        <p:blipFill>
+          <a:blip r:embed="rId4" cstate="print"/>
+          <a:srcRect/>
+          <a:stretch>
+            <a:fillRect/>
+          </a:stretch>
+        </p:blipFill>
+        <p:spPr bwMode="auto">
+          <a:xfrm>
+            <a:off x="6934202" y="6248400"/>
+            <a:ext cx="1981195" cy="431239"/>
+          </a:xfrm>
+          <a:prstGeom prst="rect">
+            <a:avLst/>
+          </a:prstGeom>
+          <a:noFill/>
+          <a:ln w="9525">
+            <a:noFill/>
+            <a:miter lim="800000"/>
+            <a:headEnd/>
+            <a:tailEnd/>
+          </a:ln>
+          <a:effectLst/>
+        </p:spPr>
+      </p:pic>
+      <p:sp>
+        <p:nvSpPr>
+          <p:cNvPr id="8" name="TextBox 7"/>
+          <p:cNvSpPr txBox="1"/>
+          <p:nvPr/>
+        </p:nvSpPr>
+        <p:spPr>
+          <a:xfrm>
+            <a:off x="0" y="914400"/>
+            <a:ext cx="9144000" cy="830997"/>
+          </a:xfrm>
+          <a:prstGeom prst="rect">
+            <a:avLst/>
+          </a:prstGeom>
+          <a:noFill/>
+        </p:spPr>
+        <p:txBody>
+          <a:bodyPr wrap="square" rtlCol="0">
+            <a:spAutoFit/>
+          </a:bodyPr>
+          <a:lstStyle/>
+          <a:p>
+            <a:pPr algn="ctr"/>
+            <a:r>
+              <a:rPr lang="en-US" sz="4800" dirty="0" smtClean="0"/>
+              <a:t>Advantages</a:t>
+            </a:r>
+            <a:endParaRPr lang="en-US" sz="4800" dirty="0"/>
+          </a:p>
+        </p:txBody>
+      </p:sp>
+      <p:sp>
+        <p:nvSpPr>
+          <p:cNvPr id="2" name="TextBox 1"/>
+          <p:cNvSpPr txBox="1"/>
+          <p:nvPr/>
+        </p:nvSpPr>
+        <p:spPr>
+          <a:xfrm>
+            <a:off x="228600" y="2133600"/>
+            <a:ext cx="1828800" cy="369332"/>
+          </a:xfrm>
+          <a:prstGeom prst="rect">
+            <a:avLst/>
+          </a:prstGeom>
+          <a:noFill/>
+        </p:spPr>
+        <p:txBody>
+          <a:bodyPr wrap="square" rtlCol="0">
+            <a:spAutoFit/>
+          </a:bodyPr>
+          <a:lstStyle/>
+          <a:p>
+            <a:r>
+              <a:rPr lang="en-US" smtClean="0"/>
+              <a:t>`</a:t>
+            </a:r>
+            <a:endParaRPr lang="en-US"/>
+          </a:p>
+        </p:txBody>
+      </p:sp>
+      <p:sp>
+        <p:nvSpPr>
+          <p:cNvPr id="11" name="TextBox 10"/>
+          <p:cNvSpPr txBox="1"/>
+          <p:nvPr/>
+        </p:nvSpPr>
+        <p:spPr>
+          <a:xfrm>
+            <a:off x="533400" y="1905000"/>
+            <a:ext cx="3810000" cy="3416320"/>
+          </a:xfrm>
+          <a:prstGeom prst="rect">
+            <a:avLst/>
+          </a:prstGeom>
+          <a:noFill/>
+        </p:spPr>
+        <p:txBody>
+          <a:bodyPr wrap="square" rtlCol="0">
+            <a:spAutoFit/>
+          </a:bodyPr>
+          <a:lstStyle/>
+          <a:p>
+            <a:r>
+              <a:rPr lang="en-US" sz="3600" dirty="0" smtClean="0"/>
+              <a:t>Availability</a:t>
+            </a:r>
+          </a:p>
+          <a:p>
+            <a:r>
+              <a:rPr lang="en-US" sz="3600" dirty="0" smtClean="0"/>
+              <a:t>Reliability</a:t>
+            </a:r>
+          </a:p>
+          <a:p>
+            <a:r>
+              <a:rPr lang="en-US" sz="3600" dirty="0" smtClean="0"/>
+              <a:t>Scalability</a:t>
+            </a:r>
+          </a:p>
+          <a:p>
+            <a:r>
+              <a:rPr lang="en-US" sz="3600" dirty="0" smtClean="0"/>
+              <a:t>Performance</a:t>
+            </a:r>
+          </a:p>
+          <a:p>
+            <a:r>
+              <a:rPr lang="en-US" sz="3600" dirty="0" smtClean="0"/>
+              <a:t>Manageability</a:t>
+            </a:r>
+          </a:p>
+          <a:p>
+            <a:r>
+              <a:rPr lang="en-US" sz="3600" dirty="0" smtClean="0"/>
+              <a:t>Cost</a:t>
+            </a:r>
+          </a:p>
+        </p:txBody>
+      </p:sp>
+      <p:sp>
+        <p:nvSpPr>
+          <p:cNvPr id="12" name="TextBox 11"/>
+          <p:cNvSpPr txBox="1"/>
+          <p:nvPr/>
+        </p:nvSpPr>
+        <p:spPr>
+          <a:xfrm>
+            <a:off x="6858000" y="0"/>
+            <a:ext cx="2286000" cy="584775"/>
+          </a:xfrm>
+          <a:prstGeom prst="rect">
+            <a:avLst/>
+          </a:prstGeom>
+          <a:solidFill>
+            <a:schemeClr val="bg2">
+              <a:lumMod val="75000"/>
+            </a:schemeClr>
+          </a:solidFill>
+        </p:spPr>
+        <p:txBody>
+          <a:bodyPr wrap="square" rtlCol="0">
+            <a:spAutoFit/>
+          </a:bodyPr>
+          <a:lstStyle/>
+          <a:p>
+            <a:r>
+              <a:rPr lang="en-US" sz="3200" dirty="0" smtClean="0"/>
+              <a:t>Architecture</a:t>
+            </a:r>
+            <a:endParaRPr lang="en-US" sz="3200" dirty="0"/>
+          </a:p>
+        </p:txBody>
+      </p:sp>
+      <p:sp>
+        <p:nvSpPr>
+          <p:cNvPr id="14" name="TextBox 13"/>
+          <p:cNvSpPr txBox="1"/>
+          <p:nvPr/>
+        </p:nvSpPr>
+        <p:spPr>
+          <a:xfrm>
+            <a:off x="4800600" y="1905000"/>
+            <a:ext cx="3657600" cy="3693319"/>
+          </a:xfrm>
+          <a:prstGeom prst="rect">
+            <a:avLst/>
+          </a:prstGeom>
+          <a:noFill/>
+        </p:spPr>
+        <p:txBody>
+          <a:bodyPr wrap="square" rtlCol="0">
+            <a:spAutoFit/>
+          </a:bodyPr>
+          <a:lstStyle/>
+          <a:p>
+            <a:pPr lvl="0"/>
+            <a:r>
+              <a:rPr lang="en-US" sz="3600" dirty="0" smtClean="0"/>
+              <a:t>Backups</a:t>
+            </a:r>
+          </a:p>
+          <a:p>
+            <a:pPr lvl="0"/>
+            <a:r>
+              <a:rPr lang="en-US" sz="3600" dirty="0" smtClean="0"/>
+              <a:t>Failover</a:t>
+            </a:r>
+            <a:endParaRPr lang="en-US" sz="3600" dirty="0" smtClean="0"/>
+          </a:p>
+          <a:p>
+            <a:pPr lvl="0"/>
+            <a:r>
+              <a:rPr lang="en-US" sz="3600" dirty="0" smtClean="0"/>
+              <a:t>Redundancy</a:t>
+            </a:r>
+          </a:p>
+          <a:p>
+            <a:pPr lvl="0"/>
+            <a:r>
+              <a:rPr lang="en-US" sz="3600" dirty="0" smtClean="0"/>
+              <a:t>Distributed </a:t>
+            </a:r>
+            <a:r>
+              <a:rPr lang="en-US" sz="3600" dirty="0" smtClean="0"/>
+              <a:t>load</a:t>
+            </a:r>
+          </a:p>
+          <a:p>
+            <a:pPr lvl="0"/>
+            <a:r>
+              <a:rPr lang="en-US" sz="3600" dirty="0" smtClean="0"/>
+              <a:t>Fault </a:t>
+            </a:r>
+            <a:r>
+              <a:rPr lang="en-US" sz="3600" dirty="0" smtClean="0"/>
+              <a:t>tolerance</a:t>
+            </a:r>
+          </a:p>
+          <a:p>
+            <a:pPr lvl="0"/>
+            <a:r>
+              <a:rPr lang="en-US" sz="3600" dirty="0" smtClean="0"/>
+              <a:t>Isolation</a:t>
+            </a:r>
+            <a:endParaRPr lang="en-US" sz="3600" dirty="0" smtClean="0"/>
+          </a:p>
+          <a:p>
+            <a:endParaRPr lang="en-US" dirty="0"/>
+          </a:p>
+        </p:txBody>
+      </p:sp>
+    </p:spTree>
+  </p:cSld>
+  <p:clrMapOvr>
+    <a:masterClrMapping/>
+  </p:clrMapOvr>
+  <p:timing>
+    <p:tnLst>
+      <p:par>
+        <p:cTn id="1" dur="indefinite" restart="never" nodeType="tmRoot"/>
+      </p:par>
+    </p:tnLst>
+  </p:timing>
+</p:sld>
+</file>
+
+<file path=ppt/slides/slide18.xml><?xml version="1.0" encoding="utf-8"?>
+<p:sld xmlns:a="http://schemas.openxmlformats.org/drawingml/2006/main" xmlns:r="http://schemas.openxmlformats.org/officeDocument/2006/relationships" xmlns:p="http://schemas.openxmlformats.org/presentationml/2006/main">
+  <p:cSld>
+    <p:spTree>
+      <p:nvGrpSpPr>
+        <p:cNvPr id="1" name=""/>
+        <p:cNvGrpSpPr/>
+        <p:nvPr/>
+      </p:nvGrpSpPr>
+      <p:grpSpPr>
+        <a:xfrm>
+          <a:off x="0" y="0"/>
+          <a:ext cx="0" cy="0"/>
+          <a:chOff x="0" y="0"/>
+          <a:chExt cx="0" cy="0"/>
+        </a:xfrm>
+      </p:grpSpPr>
+      <p:sp>
+        <p:nvSpPr>
+          <p:cNvPr id="4" name="Rectangle 3"/>
+          <p:cNvSpPr/>
+          <p:nvPr/>
+        </p:nvSpPr>
+        <p:spPr>
+          <a:xfrm>
+            <a:off x="0" y="6096000"/>
+            <a:ext cx="9144000" cy="762000"/>
+          </a:xfrm>
+          <a:prstGeom prst="rect">
+            <a:avLst/>
+          </a:prstGeom>
+          <a:solidFill>
+            <a:schemeClr val="tx1">
+              <a:lumMod val="85000"/>
+              <a:lumOff val="15000"/>
+            </a:schemeClr>
+          </a:solidFill>
+        </p:spPr>
+        <p:style>
+          <a:lnRef idx="2">
+            <a:schemeClr val="accent1">
+              <a:shade val="50000"/>
+            </a:schemeClr>
+          </a:lnRef>
+          <a:fillRef idx="1">
+            <a:schemeClr val="accent1"/>
+          </a:fillRef>
+          <a:effectRef idx="0">
+            <a:schemeClr val="accent1"/>
+          </a:effectRef>
+          <a:fontRef idx="minor">
+            <a:schemeClr val="lt1"/>
+          </a:fontRef>
+        </p:style>
+        <p:txBody>
+          <a:bodyPr rtlCol="0" anchor="ctr"/>
+          <a:lstStyle/>
+          <a:p>
+            <a:pPr algn="ctr"/>
+            <a:endParaRPr lang="en-US"/>
+          </a:p>
+        </p:txBody>
+      </p:sp>
+      <p:pic>
+        <p:nvPicPr>
+          <p:cNvPr id="1027" name="Picture 3"/>
+          <p:cNvPicPr>
+            <a:picLocks noChangeAspect="1" noChangeArrowheads="1"/>
+          </p:cNvPicPr>
+          <p:nvPr/>
+        </p:nvPicPr>
+        <p:blipFill>
+          <a:blip r:embed="rId3" cstate="print"/>
+          <a:srcRect/>
+          <a:stretch>
+            <a:fillRect/>
+          </a:stretch>
+        </p:blipFill>
+        <p:spPr bwMode="auto">
+          <a:xfrm>
+            <a:off x="228600" y="6248400"/>
+            <a:ext cx="1371600" cy="410346"/>
+          </a:xfrm>
+          <a:prstGeom prst="rect">
+            <a:avLst/>
+          </a:prstGeom>
+          <a:noFill/>
+          <a:ln w="9525">
+            <a:noFill/>
+            <a:miter lim="800000"/>
+            <a:headEnd/>
+            <a:tailEnd/>
+          </a:ln>
+          <a:effectLst/>
+        </p:spPr>
+      </p:pic>
+      <p:sp>
+        <p:nvSpPr>
+          <p:cNvPr id="10" name="TextBox 9"/>
+          <p:cNvSpPr txBox="1"/>
+          <p:nvPr/>
+        </p:nvSpPr>
+        <p:spPr>
+          <a:xfrm>
+            <a:off x="2057400" y="6324600"/>
+            <a:ext cx="4419600" cy="369332"/>
+          </a:xfrm>
+          <a:prstGeom prst="rect">
+            <a:avLst/>
+          </a:prstGeom>
+          <a:noFill/>
+        </p:spPr>
+        <p:txBody>
+          <a:bodyPr wrap="square" rtlCol="0">
+            <a:spAutoFit/>
+          </a:bodyPr>
+          <a:lstStyle/>
+          <a:p>
+            <a:r>
+              <a:rPr lang="en-US" dirty="0" smtClean="0">
+                <a:solidFill>
+                  <a:schemeClr val="bg1"/>
+                </a:solidFill>
+                <a:latin typeface="Verdana" pitchFamily="34" charset="0"/>
+                <a:ea typeface="Verdana" pitchFamily="34" charset="0"/>
+                <a:cs typeface="Verdana" pitchFamily="34" charset="0"/>
+              </a:rPr>
+              <a:t>Testing web applications &amp; services</a:t>
+            </a:r>
+            <a:endParaRPr lang="en-US" dirty="0">
+              <a:solidFill>
+                <a:schemeClr val="bg1"/>
+              </a:solidFill>
+              <a:latin typeface="Verdana" pitchFamily="34" charset="0"/>
+              <a:ea typeface="Verdana" pitchFamily="34" charset="0"/>
+              <a:cs typeface="Verdana" pitchFamily="34" charset="0"/>
+            </a:endParaRPr>
+          </a:p>
+        </p:txBody>
+      </p:sp>
+      <p:pic>
+        <p:nvPicPr>
+          <p:cNvPr id="1033" name="Picture 9"/>
+          <p:cNvPicPr>
+            <a:picLocks noChangeAspect="1" noChangeArrowheads="1"/>
+          </p:cNvPicPr>
+          <p:nvPr/>
+        </p:nvPicPr>
+        <p:blipFill>
+          <a:blip r:embed="rId4" cstate="print"/>
+          <a:srcRect/>
+          <a:stretch>
+            <a:fillRect/>
+          </a:stretch>
+        </p:blipFill>
+        <p:spPr bwMode="auto">
+          <a:xfrm>
+            <a:off x="6934202" y="6248400"/>
+            <a:ext cx="1981195" cy="431239"/>
+          </a:xfrm>
+          <a:prstGeom prst="rect">
+            <a:avLst/>
+          </a:prstGeom>
+          <a:noFill/>
+          <a:ln w="9525">
+            <a:noFill/>
+            <a:miter lim="800000"/>
+            <a:headEnd/>
+            <a:tailEnd/>
+          </a:ln>
+          <a:effectLst/>
+        </p:spPr>
+      </p:pic>
+      <p:sp>
+        <p:nvSpPr>
+          <p:cNvPr id="13" name="TextBox 12"/>
+          <p:cNvSpPr txBox="1"/>
+          <p:nvPr/>
+        </p:nvSpPr>
+        <p:spPr>
+          <a:xfrm>
+            <a:off x="7315200" y="0"/>
+            <a:ext cx="1828800" cy="584775"/>
+          </a:xfrm>
+          <a:prstGeom prst="rect">
+            <a:avLst/>
+          </a:prstGeom>
+          <a:solidFill>
+            <a:schemeClr val="bg2">
+              <a:lumMod val="75000"/>
+            </a:schemeClr>
+          </a:solidFill>
+        </p:spPr>
+        <p:txBody>
+          <a:bodyPr wrap="square" rtlCol="0">
+            <a:spAutoFit/>
+          </a:bodyPr>
+          <a:lstStyle/>
+          <a:p>
+            <a:r>
+              <a:rPr lang="en-US" sz="3200" dirty="0" smtClean="0"/>
+              <a:t>Networks</a:t>
+            </a:r>
+            <a:endParaRPr lang="en-US" sz="3200" dirty="0"/>
+          </a:p>
+        </p:txBody>
+      </p:sp>
+      <p:sp>
+        <p:nvSpPr>
+          <p:cNvPr id="8" name="TextBox 7"/>
+          <p:cNvSpPr txBox="1"/>
+          <p:nvPr/>
+        </p:nvSpPr>
+        <p:spPr>
+          <a:xfrm>
             <a:off x="0" y="990600"/>
             <a:ext cx="9144000" cy="830997"/>
           </a:xfrm>
@@ -9548,7 +12083,6 @@
               <a:rPr lang="en-US" sz="4800" dirty="0" smtClean="0"/>
               <a:t>Using ping, traceroute, </a:t>
             </a:r>
-            <a:endParaRPr lang="en-US" sz="4800" dirty="0" smtClean="0"/>
           </a:p>
           <a:p>
             <a:pPr algn="ctr"/>
@@ -9623,7 +12157,7 @@
     </p:spTree>
     <p:extLst>
       <p:ext uri="{BB962C8B-B14F-4D97-AF65-F5344CB8AC3E}">
-        <p14:creationId xmlns:p14="http://schemas.microsoft.com/office/powerpoint/2010/main" val="773758245"/>
+        <p14:creationId xmlns:p14="http://schemas.microsoft.com/office/powerpoint/2010/main" xmlns="" val="773758245"/>
       </p:ext>
     </p:extLst>
   </p:cSld>

</xml_diff>

<commit_message>
starting tools presentation and a few minor edits
</commit_message>
<xml_diff>
--- a/presentations/A technical understanding of the web.pptx
+++ b/presentations/A technical understanding of the web.pptx
@@ -210,7 +210,7 @@
             <a:fld id="{9FD516BE-303C-4073-A4FC-07E358FC6551}" type="datetimeFigureOut">
               <a:rPr lang="en-US" smtClean="0"/>
               <a:pPr/>
-              <a:t>3/14/2013</a:t>
+              <a:t>3/15/2013</a:t>
             </a:fld>
             <a:endParaRPr lang="en-US"/>
           </a:p>
@@ -381,7 +381,7 @@
     </p:spTree>
     <p:extLst>
       <p:ext uri="{BB962C8B-B14F-4D97-AF65-F5344CB8AC3E}">
-        <p14:creationId xmlns:p14="http://schemas.microsoft.com/office/powerpoint/2010/main" xmlns="" val="2576183043"/>
+        <p14:creationId xmlns="" xmlns:p14="http://schemas.microsoft.com/office/powerpoint/2010/main" val="2576183043"/>
       </p:ext>
     </p:extLst>
   </p:cSld>
@@ -5870,7 +5870,7 @@
             <a:fld id="{D6E9E5ED-425F-4E07-BCD6-7E079AD34B1B}" type="datetimeFigureOut">
               <a:rPr lang="en-US" smtClean="0"/>
               <a:pPr/>
-              <a:t>3/14/2013</a:t>
+              <a:t>3/15/2013</a:t>
             </a:fld>
             <a:endParaRPr lang="en-US"/>
           </a:p>
@@ -6037,7 +6037,7 @@
             <a:fld id="{D6E9E5ED-425F-4E07-BCD6-7E079AD34B1B}" type="datetimeFigureOut">
               <a:rPr lang="en-US" smtClean="0"/>
               <a:pPr/>
-              <a:t>3/14/2013</a:t>
+              <a:t>3/15/2013</a:t>
             </a:fld>
             <a:endParaRPr lang="en-US"/>
           </a:p>
@@ -6214,7 +6214,7 @@
             <a:fld id="{D6E9E5ED-425F-4E07-BCD6-7E079AD34B1B}" type="datetimeFigureOut">
               <a:rPr lang="en-US" smtClean="0"/>
               <a:pPr/>
-              <a:t>3/14/2013</a:t>
+              <a:t>3/15/2013</a:t>
             </a:fld>
             <a:endParaRPr lang="en-US"/>
           </a:p>
@@ -6381,7 +6381,7 @@
             <a:fld id="{D6E9E5ED-425F-4E07-BCD6-7E079AD34B1B}" type="datetimeFigureOut">
               <a:rPr lang="en-US" smtClean="0"/>
               <a:pPr/>
-              <a:t>3/14/2013</a:t>
+              <a:t>3/15/2013</a:t>
             </a:fld>
             <a:endParaRPr lang="en-US"/>
           </a:p>
@@ -6624,7 +6624,7 @@
             <a:fld id="{D6E9E5ED-425F-4E07-BCD6-7E079AD34B1B}" type="datetimeFigureOut">
               <a:rPr lang="en-US" smtClean="0"/>
               <a:pPr/>
-              <a:t>3/14/2013</a:t>
+              <a:t>3/15/2013</a:t>
             </a:fld>
             <a:endParaRPr lang="en-US"/>
           </a:p>
@@ -6909,7 +6909,7 @@
             <a:fld id="{D6E9E5ED-425F-4E07-BCD6-7E079AD34B1B}" type="datetimeFigureOut">
               <a:rPr lang="en-US" smtClean="0"/>
               <a:pPr/>
-              <a:t>3/14/2013</a:t>
+              <a:t>3/15/2013</a:t>
             </a:fld>
             <a:endParaRPr lang="en-US"/>
           </a:p>
@@ -7328,7 +7328,7 @@
             <a:fld id="{D6E9E5ED-425F-4E07-BCD6-7E079AD34B1B}" type="datetimeFigureOut">
               <a:rPr lang="en-US" smtClean="0"/>
               <a:pPr/>
-              <a:t>3/14/2013</a:t>
+              <a:t>3/15/2013</a:t>
             </a:fld>
             <a:endParaRPr lang="en-US"/>
           </a:p>
@@ -7443,7 +7443,7 @@
             <a:fld id="{D6E9E5ED-425F-4E07-BCD6-7E079AD34B1B}" type="datetimeFigureOut">
               <a:rPr lang="en-US" smtClean="0"/>
               <a:pPr/>
-              <a:t>3/14/2013</a:t>
+              <a:t>3/15/2013</a:t>
             </a:fld>
             <a:endParaRPr lang="en-US"/>
           </a:p>
@@ -7535,7 +7535,7 @@
             <a:fld id="{D6E9E5ED-425F-4E07-BCD6-7E079AD34B1B}" type="datetimeFigureOut">
               <a:rPr lang="en-US" smtClean="0"/>
               <a:pPr/>
-              <a:t>3/14/2013</a:t>
+              <a:t>3/15/2013</a:t>
             </a:fld>
             <a:endParaRPr lang="en-US"/>
           </a:p>
@@ -7809,7 +7809,7 @@
             <a:fld id="{D6E9E5ED-425F-4E07-BCD6-7E079AD34B1B}" type="datetimeFigureOut">
               <a:rPr lang="en-US" smtClean="0"/>
               <a:pPr/>
-              <a:t>3/14/2013</a:t>
+              <a:t>3/15/2013</a:t>
             </a:fld>
             <a:endParaRPr lang="en-US"/>
           </a:p>
@@ -8059,7 +8059,7 @@
             <a:fld id="{D6E9E5ED-425F-4E07-BCD6-7E079AD34B1B}" type="datetimeFigureOut">
               <a:rPr lang="en-US" smtClean="0"/>
               <a:pPr/>
-              <a:t>3/14/2013</a:t>
+              <a:t>3/15/2013</a:t>
             </a:fld>
             <a:endParaRPr lang="en-US"/>
           </a:p>
@@ -8269,7 +8269,7 @@
             <a:fld id="{D6E9E5ED-425F-4E07-BCD6-7E079AD34B1B}" type="datetimeFigureOut">
               <a:rPr lang="en-US" smtClean="0"/>
               <a:pPr/>
-              <a:t>3/14/2013</a:t>
+              <a:t>3/15/2013</a:t>
             </a:fld>
             <a:endParaRPr lang="en-US"/>
           </a:p>
@@ -8834,37 +8834,6 @@
           </a:p>
         </p:txBody>
       </p:sp>
-      <p:sp>
-        <p:nvSpPr>
-          <p:cNvPr id="7" name="TextBox 6"/>
-          <p:cNvSpPr txBox="1"/>
-          <p:nvPr/>
-        </p:nvSpPr>
-        <p:spPr>
-          <a:xfrm>
-            <a:off x="0" y="4648200"/>
-            <a:ext cx="9144000" cy="369332"/>
-          </a:xfrm>
-          <a:prstGeom prst="rect">
-            <a:avLst/>
-          </a:prstGeom>
-          <a:noFill/>
-        </p:spPr>
-        <p:txBody>
-          <a:bodyPr wrap="square" rtlCol="0">
-            <a:spAutoFit/>
-          </a:bodyPr>
-          <a:lstStyle/>
-          <a:p>
-            <a:pPr algn="ctr"/>
-            <a:r>
-              <a:rPr lang="en-US" dirty="0" smtClean="0"/>
-              <a:t>Day 1 – Section 2</a:t>
-            </a:r>
-            <a:endParaRPr lang="en-US" dirty="0"/>
-          </a:p>
-        </p:txBody>
-      </p:sp>
     </p:spTree>
   </p:cSld>
   <p:clrMapOvr>
@@ -9418,7 +9387,7 @@
           <a:blip r:embed="rId5" cstate="print">
             <a:extLst>
               <a:ext uri="{28A0092B-C50C-407E-A947-70E740481C1C}">
-                <a14:useLocalDpi xmlns:a14="http://schemas.microsoft.com/office/drawing/2010/main" xmlns="" val="0"/>
+                <a14:useLocalDpi xmlns="" xmlns:a14="http://schemas.microsoft.com/office/drawing/2010/main" val="0"/>
               </a:ext>
             </a:extLst>
           </a:blip>
@@ -9438,7 +9407,7 @@
           <a:noFill/>
           <a:extLst>
             <a:ext uri="{909E8E84-426E-40DD-AFC4-6F175D3DCCD1}">
-              <a14:hiddenFill xmlns:a14="http://schemas.microsoft.com/office/drawing/2010/main" xmlns="">
+              <a14:hiddenFill xmlns="" xmlns:a14="http://schemas.microsoft.com/office/drawing/2010/main">
                 <a:solidFill>
                   <a:srgbClr val="FFFFFF"/>
                 </a:solidFill>
@@ -9742,7 +9711,7 @@
           <a:blip r:embed="rId5" cstate="print">
             <a:extLst>
               <a:ext uri="{28A0092B-C50C-407E-A947-70E740481C1C}">
-                <a14:useLocalDpi xmlns:a14="http://schemas.microsoft.com/office/drawing/2010/main" xmlns="" val="0"/>
+                <a14:useLocalDpi xmlns="" xmlns:a14="http://schemas.microsoft.com/office/drawing/2010/main" val="0"/>
               </a:ext>
             </a:extLst>
           </a:blip>
@@ -9762,7 +9731,7 @@
           <a:noFill/>
           <a:extLst>
             <a:ext uri="{909E8E84-426E-40DD-AFC4-6F175D3DCCD1}">
-              <a14:hiddenFill xmlns:a14="http://schemas.microsoft.com/office/drawing/2010/main" xmlns="">
+              <a14:hiddenFill xmlns="" xmlns:a14="http://schemas.microsoft.com/office/drawing/2010/main">
                 <a:solidFill>
                   <a:srgbClr val="FFFFFF"/>
                 </a:solidFill>
@@ -10090,11 +10059,7 @@
           <a:p>
             <a:r>
               <a:rPr lang="en-US" sz="3600" dirty="0" smtClean="0"/>
-              <a:t>	</a:t>
-            </a:r>
-            <a:r>
-              <a:rPr lang="en-US" sz="3600" dirty="0" smtClean="0"/>
-              <a:t>Browser, Web Server, Database</a:t>
+              <a:t>	Browser, Web Server, Database</a:t>
             </a:r>
           </a:p>
           <a:p>
@@ -10108,7 +10073,6 @@
               <a:rPr lang="en-US" sz="3600" dirty="0" smtClean="0"/>
               <a:t>Clustering</a:t>
             </a:r>
-            <a:endParaRPr lang="en-US" sz="3600" dirty="0" smtClean="0"/>
           </a:p>
         </p:txBody>
       </p:sp>
@@ -10718,7 +10682,6 @@
               <a:rPr lang="en-US" sz="3600" dirty="0" smtClean="0"/>
               <a:t>Many clients</a:t>
             </a:r>
-            <a:endParaRPr lang="en-US" sz="3600" dirty="0" smtClean="0"/>
           </a:p>
           <a:p>
             <a:r>
@@ -11760,7 +11723,6 @@
               <a:rPr lang="en-US" sz="3600" dirty="0" smtClean="0"/>
               <a:t>Failover</a:t>
             </a:r>
-            <a:endParaRPr lang="en-US" sz="3600" dirty="0" smtClean="0"/>
           </a:p>
           <a:p>
             <a:pPr lvl="0"/>
@@ -11773,22 +11735,14 @@
             <a:pPr lvl="0"/>
             <a:r>
               <a:rPr lang="en-US" sz="3600" dirty="0" smtClean="0"/>
-              <a:t>Distributed </a:t>
-            </a:r>
+              <a:t>Distributed load</a:t>
+            </a:r>
+          </a:p>
+          <a:p>
+            <a:pPr lvl="0"/>
             <a:r>
               <a:rPr lang="en-US" sz="3600" dirty="0" smtClean="0"/>
-              <a:t>load</a:t>
-            </a:r>
-          </a:p>
-          <a:p>
-            <a:pPr lvl="0"/>
-            <a:r>
-              <a:rPr lang="en-US" sz="3600" dirty="0" smtClean="0"/>
-              <a:t>Fault </a:t>
-            </a:r>
-            <a:r>
-              <a:rPr lang="en-US" sz="3600" dirty="0" smtClean="0"/>
-              <a:t>tolerance</a:t>
+              <a:t>Fault tolerance</a:t>
             </a:r>
           </a:p>
           <a:p>
@@ -11797,7 +11751,6 @@
               <a:rPr lang="en-US" sz="3600" dirty="0" smtClean="0"/>
               <a:t>Isolation</a:t>
             </a:r>
-            <a:endParaRPr lang="en-US" sz="3600" dirty="0" smtClean="0"/>
           </a:p>
           <a:p>
             <a:endParaRPr lang="en-US" dirty="0"/>
@@ -12157,7 +12110,7 @@
     </p:spTree>
     <p:extLst>
       <p:ext uri="{BB962C8B-B14F-4D97-AF65-F5344CB8AC3E}">
-        <p14:creationId xmlns:p14="http://schemas.microsoft.com/office/powerpoint/2010/main" xmlns="" val="773758245"/>
+        <p14:creationId xmlns="" xmlns:p14="http://schemas.microsoft.com/office/powerpoint/2010/main" val="773758245"/>
       </p:ext>
     </p:extLst>
   </p:cSld>

</xml_diff>